<commit_message>
more progress on SC models and inference details
</commit_message>
<xml_diff>
--- a/Powerpoints/6 DiffnDiff (WIP).pptx
+++ b/Powerpoints/6 DiffnDiff (WIP).pptx
@@ -5,7 +5,7 @@
     <p:sldMasterId id="2147483648" r:id="rId1"/>
   </p:sldMasterIdLst>
   <p:notesMasterIdLst>
-    <p:notesMasterId r:id="rId55"/>
+    <p:notesMasterId r:id="rId57"/>
   </p:notesMasterIdLst>
   <p:sldIdLst>
     <p:sldId id="257" r:id="rId2"/>
@@ -32,35 +32,37 @@
     <p:sldId id="360" r:id="rId23"/>
     <p:sldId id="359" r:id="rId24"/>
     <p:sldId id="353" r:id="rId25"/>
-    <p:sldId id="356" r:id="rId26"/>
-    <p:sldId id="354" r:id="rId27"/>
-    <p:sldId id="317" r:id="rId28"/>
-    <p:sldId id="302" r:id="rId29"/>
-    <p:sldId id="307" r:id="rId30"/>
-    <p:sldId id="308" r:id="rId31"/>
-    <p:sldId id="309" r:id="rId32"/>
-    <p:sldId id="310" r:id="rId33"/>
-    <p:sldId id="311" r:id="rId34"/>
-    <p:sldId id="312" r:id="rId35"/>
-    <p:sldId id="313" r:id="rId36"/>
-    <p:sldId id="314" r:id="rId37"/>
-    <p:sldId id="315" r:id="rId38"/>
-    <p:sldId id="332" r:id="rId39"/>
-    <p:sldId id="329" r:id="rId40"/>
-    <p:sldId id="330" r:id="rId41"/>
-    <p:sldId id="331" r:id="rId42"/>
-    <p:sldId id="319" r:id="rId43"/>
-    <p:sldId id="316" r:id="rId44"/>
-    <p:sldId id="324" r:id="rId45"/>
-    <p:sldId id="325" r:id="rId46"/>
-    <p:sldId id="326" r:id="rId47"/>
-    <p:sldId id="327" r:id="rId48"/>
-    <p:sldId id="328" r:id="rId49"/>
-    <p:sldId id="333" r:id="rId50"/>
-    <p:sldId id="321" r:id="rId51"/>
-    <p:sldId id="322" r:id="rId52"/>
-    <p:sldId id="305" r:id="rId53"/>
-    <p:sldId id="323" r:id="rId54"/>
+    <p:sldId id="361" r:id="rId26"/>
+    <p:sldId id="362" r:id="rId27"/>
+    <p:sldId id="356" r:id="rId28"/>
+    <p:sldId id="354" r:id="rId29"/>
+    <p:sldId id="317" r:id="rId30"/>
+    <p:sldId id="302" r:id="rId31"/>
+    <p:sldId id="307" r:id="rId32"/>
+    <p:sldId id="308" r:id="rId33"/>
+    <p:sldId id="309" r:id="rId34"/>
+    <p:sldId id="310" r:id="rId35"/>
+    <p:sldId id="311" r:id="rId36"/>
+    <p:sldId id="312" r:id="rId37"/>
+    <p:sldId id="313" r:id="rId38"/>
+    <p:sldId id="314" r:id="rId39"/>
+    <p:sldId id="315" r:id="rId40"/>
+    <p:sldId id="332" r:id="rId41"/>
+    <p:sldId id="329" r:id="rId42"/>
+    <p:sldId id="330" r:id="rId43"/>
+    <p:sldId id="331" r:id="rId44"/>
+    <p:sldId id="319" r:id="rId45"/>
+    <p:sldId id="316" r:id="rId46"/>
+    <p:sldId id="324" r:id="rId47"/>
+    <p:sldId id="325" r:id="rId48"/>
+    <p:sldId id="326" r:id="rId49"/>
+    <p:sldId id="327" r:id="rId50"/>
+    <p:sldId id="328" r:id="rId51"/>
+    <p:sldId id="333" r:id="rId52"/>
+    <p:sldId id="321" r:id="rId53"/>
+    <p:sldId id="322" r:id="rId54"/>
+    <p:sldId id="305" r:id="rId55"/>
+    <p:sldId id="323" r:id="rId56"/>
   </p:sldIdLst>
   <p:sldSz cx="12192000" cy="6858000"/>
   <p:notesSz cx="6858000" cy="9144000"/>
@@ -249,7 +251,7 @@
           <a:p>
             <a:fld id="{BC90CB22-C839-6149-99A7-A90D8892B5C9}" type="datetimeFigureOut">
               <a:rPr lang="en-US" smtClean="0"/>
-              <a:t>10/20/22</a:t>
+              <a:t>10/24/22</a:t>
             </a:fld>
             <a:endParaRPr lang="en-US"/>
           </a:p>
@@ -600,7 +602,7 @@
           <a:p>
             <a:fld id="{34814EBF-23B0-C640-95FE-808FB0AFD5B4}" type="slidenum">
               <a:rPr lang="en-US" smtClean="0"/>
-              <a:t>37</a:t>
+              <a:t>39</a:t>
             </a:fld>
             <a:endParaRPr lang="en-US"/>
           </a:p>
@@ -723,7 +725,7 @@
           <a:p>
             <a:fld id="{34814EBF-23B0-C640-95FE-808FB0AFD5B4}" type="slidenum">
               <a:rPr lang="en-US" smtClean="0"/>
-              <a:t>40</a:t>
+              <a:t>42</a:t>
             </a:fld>
             <a:endParaRPr lang="en-US"/>
           </a:p>
@@ -889,7 +891,7 @@
           <a:p>
             <a:fld id="{6A51730C-A43A-674C-AA66-C618CC514046}" type="datetimeFigureOut">
               <a:rPr lang="en-US" smtClean="0"/>
-              <a:t>10/20/22</a:t>
+              <a:t>10/24/22</a:t>
             </a:fld>
             <a:endParaRPr lang="en-US"/>
           </a:p>
@@ -1087,7 +1089,7 @@
           <a:p>
             <a:fld id="{6A51730C-A43A-674C-AA66-C618CC514046}" type="datetimeFigureOut">
               <a:rPr lang="en-US" smtClean="0"/>
-              <a:t>10/20/22</a:t>
+              <a:t>10/24/22</a:t>
             </a:fld>
             <a:endParaRPr lang="en-US"/>
           </a:p>
@@ -1295,7 +1297,7 @@
           <a:p>
             <a:fld id="{6A51730C-A43A-674C-AA66-C618CC514046}" type="datetimeFigureOut">
               <a:rPr lang="en-US" smtClean="0"/>
-              <a:t>10/20/22</a:t>
+              <a:t>10/24/22</a:t>
             </a:fld>
             <a:endParaRPr lang="en-US"/>
           </a:p>
@@ -1493,7 +1495,7 @@
           <a:p>
             <a:fld id="{6A51730C-A43A-674C-AA66-C618CC514046}" type="datetimeFigureOut">
               <a:rPr lang="en-US" smtClean="0"/>
-              <a:t>10/20/22</a:t>
+              <a:t>10/24/22</a:t>
             </a:fld>
             <a:endParaRPr lang="en-US"/>
           </a:p>
@@ -1768,7 +1770,7 @@
           <a:p>
             <a:fld id="{6A51730C-A43A-674C-AA66-C618CC514046}" type="datetimeFigureOut">
               <a:rPr lang="en-US" smtClean="0"/>
-              <a:t>10/20/22</a:t>
+              <a:t>10/24/22</a:t>
             </a:fld>
             <a:endParaRPr lang="en-US"/>
           </a:p>
@@ -2033,7 +2035,7 @@
           <a:p>
             <a:fld id="{6A51730C-A43A-674C-AA66-C618CC514046}" type="datetimeFigureOut">
               <a:rPr lang="en-US" smtClean="0"/>
-              <a:t>10/20/22</a:t>
+              <a:t>10/24/22</a:t>
             </a:fld>
             <a:endParaRPr lang="en-US"/>
           </a:p>
@@ -2445,7 +2447,7 @@
           <a:p>
             <a:fld id="{6A51730C-A43A-674C-AA66-C618CC514046}" type="datetimeFigureOut">
               <a:rPr lang="en-US" smtClean="0"/>
-              <a:t>10/20/22</a:t>
+              <a:t>10/24/22</a:t>
             </a:fld>
             <a:endParaRPr lang="en-US"/>
           </a:p>
@@ -2586,7 +2588,7 @@
           <a:p>
             <a:fld id="{6A51730C-A43A-674C-AA66-C618CC514046}" type="datetimeFigureOut">
               <a:rPr lang="en-US" smtClean="0"/>
-              <a:t>10/20/22</a:t>
+              <a:t>10/24/22</a:t>
             </a:fld>
             <a:endParaRPr lang="en-US"/>
           </a:p>
@@ -2699,7 +2701,7 @@
           <a:p>
             <a:fld id="{6A51730C-A43A-674C-AA66-C618CC514046}" type="datetimeFigureOut">
               <a:rPr lang="en-US" smtClean="0"/>
-              <a:t>10/20/22</a:t>
+              <a:t>10/24/22</a:t>
             </a:fld>
             <a:endParaRPr lang="en-US"/>
           </a:p>
@@ -3010,7 +3012,7 @@
           <a:p>
             <a:fld id="{6A51730C-A43A-674C-AA66-C618CC514046}" type="datetimeFigureOut">
               <a:rPr lang="en-US" smtClean="0"/>
-              <a:t>10/20/22</a:t>
+              <a:t>10/24/22</a:t>
             </a:fld>
             <a:endParaRPr lang="en-US"/>
           </a:p>
@@ -3298,7 +3300,7 @@
           <a:p>
             <a:fld id="{6A51730C-A43A-674C-AA66-C618CC514046}" type="datetimeFigureOut">
               <a:rPr lang="en-US" smtClean="0"/>
-              <a:t>10/20/22</a:t>
+              <a:t>10/24/22</a:t>
             </a:fld>
             <a:endParaRPr lang="en-US"/>
           </a:p>
@@ -3539,7 +3541,7 @@
           <a:p>
             <a:fld id="{6A51730C-A43A-674C-AA66-C618CC514046}" type="datetimeFigureOut">
               <a:rPr lang="en-US" smtClean="0"/>
-              <a:t>10/20/22</a:t>
+              <a:t>10/24/22</a:t>
             </a:fld>
             <a:endParaRPr lang="en-US"/>
           </a:p>
@@ -4083,8 +4085,8 @@
           </a:p>
         </p:txBody>
       </p:sp>
-      <mc:AlternateContent xmlns:mc="http://schemas.openxmlformats.org/markup-compatibility/2006">
-        <mc:Choice xmlns:a14="http://schemas.microsoft.com/office/drawing/2010/main" Requires="a14">
+      <mc:AlternateContent xmlns:mc="http://schemas.openxmlformats.org/markup-compatibility/2006" xmlns:a14="http://schemas.microsoft.com/office/drawing/2010/main">
+        <mc:Choice Requires="a14">
           <p:sp>
             <p:nvSpPr>
               <p:cNvPr id="3" name="Content Placeholder 2">
@@ -4717,7 +4719,7 @@
             </p:txBody>
           </p:sp>
         </mc:Choice>
-        <mc:Fallback>
+        <mc:Fallback xmlns="">
           <p:sp>
             <p:nvSpPr>
               <p:cNvPr id="3" name="Content Placeholder 2">
@@ -4819,8 +4821,8 @@
           </a:p>
         </p:txBody>
       </p:sp>
-      <mc:AlternateContent xmlns:mc="http://schemas.openxmlformats.org/markup-compatibility/2006">
-        <mc:Choice xmlns:a14="http://schemas.microsoft.com/office/drawing/2010/main" Requires="a14">
+      <mc:AlternateContent xmlns:mc="http://schemas.openxmlformats.org/markup-compatibility/2006" xmlns:a14="http://schemas.microsoft.com/office/drawing/2010/main">
+        <mc:Choice Requires="a14">
           <p:sp>
             <p:nvSpPr>
               <p:cNvPr id="3" name="Content Placeholder 2">
@@ -5493,13 +5495,7 @@
                             <a:rPr lang="en-US" b="0" i="1" smtClean="0">
                               <a:latin typeface="Cambria Math" panose="02040503050406030204" pitchFamily="18" charset="0"/>
                             </a:rPr>
-                            <m:t>=</m:t>
-                          </m:r>
-                          <m:r>
-                            <a:rPr lang="en-US" b="0" i="1" smtClean="0">
-                              <a:latin typeface="Cambria Math" panose="02040503050406030204" pitchFamily="18" charset="0"/>
-                            </a:rPr>
-                            <m:t>0</m:t>
+                            <m:t>=0</m:t>
                           </m:r>
                         </m:e>
                       </m:d>
@@ -5594,13 +5590,7 @@
                             <a:rPr lang="en-US" b="0" i="1" smtClean="0">
                               <a:latin typeface="Cambria Math" panose="02040503050406030204" pitchFamily="18" charset="0"/>
                             </a:rPr>
-                            <m:t>=</m:t>
-                          </m:r>
-                          <m:r>
-                            <a:rPr lang="en-US" b="0" i="1" smtClean="0">
-                              <a:latin typeface="Cambria Math" panose="02040503050406030204" pitchFamily="18" charset="0"/>
-                            </a:rPr>
-                            <m:t>0</m:t>
+                            <m:t>=0</m:t>
                           </m:r>
                         </m:e>
                       </m:d>
@@ -6439,7 +6429,7 @@
             </p:txBody>
           </p:sp>
         </mc:Choice>
-        <mc:Fallback>
+        <mc:Fallback xmlns="">
           <p:sp>
             <p:nvSpPr>
               <p:cNvPr id="3" name="Content Placeholder 2">
@@ -6542,8 +6532,8 @@
           </a:p>
         </p:txBody>
       </p:sp>
-      <mc:AlternateContent xmlns:mc="http://schemas.openxmlformats.org/markup-compatibility/2006">
-        <mc:Choice xmlns:a14="http://schemas.microsoft.com/office/drawing/2010/main" Requires="a14">
+      <mc:AlternateContent xmlns:mc="http://schemas.openxmlformats.org/markup-compatibility/2006" xmlns:a14="http://schemas.microsoft.com/office/drawing/2010/main">
+        <mc:Choice Requires="a14">
           <p:sp>
             <p:nvSpPr>
               <p:cNvPr id="3" name="Content Placeholder 2">
@@ -7476,7 +7466,7 @@
             </p:txBody>
           </p:sp>
         </mc:Choice>
-        <mc:Fallback>
+        <mc:Fallback xmlns="">
           <p:sp>
             <p:nvSpPr>
               <p:cNvPr id="3" name="Content Placeholder 2">
@@ -7579,8 +7569,8 @@
           </a:p>
         </p:txBody>
       </p:sp>
-      <mc:AlternateContent xmlns:mc="http://schemas.openxmlformats.org/markup-compatibility/2006">
-        <mc:Choice xmlns:a14="http://schemas.microsoft.com/office/drawing/2010/main" Requires="a14">
+      <mc:AlternateContent xmlns:mc="http://schemas.openxmlformats.org/markup-compatibility/2006" xmlns:a14="http://schemas.microsoft.com/office/drawing/2010/main">
+        <mc:Choice Requires="a14">
           <p:sp>
             <p:nvSpPr>
               <p:cNvPr id="3" name="Content Placeholder 2">
@@ -8034,7 +8024,7 @@
             </p:txBody>
           </p:sp>
         </mc:Choice>
-        <mc:Fallback>
+        <mc:Fallback xmlns="">
           <p:sp>
             <p:nvSpPr>
               <p:cNvPr id="3" name="Content Placeholder 2">
@@ -9744,8 +9734,8 @@
           </a:p>
         </p:txBody>
       </p:sp>
-      <mc:AlternateContent xmlns:mc="http://schemas.openxmlformats.org/markup-compatibility/2006">
-        <mc:Choice xmlns:a14="http://schemas.microsoft.com/office/drawing/2010/main" Requires="a14">
+      <mc:AlternateContent xmlns:mc="http://schemas.openxmlformats.org/markup-compatibility/2006" xmlns:a14="http://schemas.microsoft.com/office/drawing/2010/main">
+        <mc:Choice Requires="a14">
           <p:sp>
             <p:nvSpPr>
               <p:cNvPr id="3" name="Content Placeholder 2">
@@ -10201,7 +10191,7 @@
             </p:txBody>
           </p:sp>
         </mc:Choice>
-        <mc:Fallback>
+        <mc:Fallback xmlns="">
           <p:sp>
             <p:nvSpPr>
               <p:cNvPr id="3" name="Content Placeholder 2">
@@ -10299,8 +10289,8 @@
           </a:p>
         </p:txBody>
       </p:sp>
-      <mc:AlternateContent xmlns:mc="http://schemas.openxmlformats.org/markup-compatibility/2006">
-        <mc:Choice xmlns:a14="http://schemas.microsoft.com/office/drawing/2010/main" Requires="a14">
+      <mc:AlternateContent xmlns:mc="http://schemas.openxmlformats.org/markup-compatibility/2006" xmlns:a14="http://schemas.microsoft.com/office/drawing/2010/main">
+        <mc:Choice Requires="a14">
           <p:sp>
             <p:nvSpPr>
               <p:cNvPr id="3" name="Content Placeholder 2">
@@ -10629,7 +10619,7 @@
             </p:txBody>
           </p:sp>
         </mc:Choice>
-        <mc:Fallback>
+        <mc:Fallback xmlns="">
           <p:sp>
             <p:nvSpPr>
               <p:cNvPr id="3" name="Content Placeholder 2">
@@ -11317,8 +11307,8 @@
           </p:style>
         </p:cxnSp>
       </p:grpSp>
-      <mc:AlternateContent xmlns:mc="http://schemas.openxmlformats.org/markup-compatibility/2006">
-        <mc:Choice xmlns:a14="http://schemas.microsoft.com/office/drawing/2010/main" Requires="a14">
+      <mc:AlternateContent xmlns:mc="http://schemas.openxmlformats.org/markup-compatibility/2006" xmlns:a14="http://schemas.microsoft.com/office/drawing/2010/main">
+        <mc:Choice Requires="a14">
           <p:sp>
             <p:nvSpPr>
               <p:cNvPr id="10" name="TextBox 9">
@@ -11372,7 +11362,7 @@
             </p:txBody>
           </p:sp>
         </mc:Choice>
-        <mc:Fallback>
+        <mc:Fallback xmlns="">
           <p:sp>
             <p:nvSpPr>
               <p:cNvPr id="10" name="TextBox 9">
@@ -11417,8 +11407,8 @@
           </p:sp>
         </mc:Fallback>
       </mc:AlternateContent>
-      <mc:AlternateContent xmlns:mc="http://schemas.openxmlformats.org/markup-compatibility/2006">
-        <mc:Choice xmlns:a14="http://schemas.microsoft.com/office/drawing/2010/main" Requires="a14">
+      <mc:AlternateContent xmlns:mc="http://schemas.openxmlformats.org/markup-compatibility/2006" xmlns:a14="http://schemas.microsoft.com/office/drawing/2010/main">
+        <mc:Choice Requires="a14">
           <p:sp>
             <p:nvSpPr>
               <p:cNvPr id="11" name="TextBox 10">
@@ -11472,7 +11462,7 @@
             </p:txBody>
           </p:sp>
         </mc:Choice>
-        <mc:Fallback>
+        <mc:Fallback xmlns="">
           <p:sp>
             <p:nvSpPr>
               <p:cNvPr id="11" name="TextBox 10">
@@ -11517,8 +11507,8 @@
           </p:sp>
         </mc:Fallback>
       </mc:AlternateContent>
-      <mc:AlternateContent xmlns:mc="http://schemas.openxmlformats.org/markup-compatibility/2006">
-        <mc:Choice xmlns:a14="http://schemas.microsoft.com/office/drawing/2010/main" Requires="a14">
+      <mc:AlternateContent xmlns:mc="http://schemas.openxmlformats.org/markup-compatibility/2006" xmlns:a14="http://schemas.microsoft.com/office/drawing/2010/main">
+        <mc:Choice Requires="a14">
           <p:sp>
             <p:nvSpPr>
               <p:cNvPr id="12" name="TextBox 11">
@@ -11585,7 +11575,7 @@
             </p:txBody>
           </p:sp>
         </mc:Choice>
-        <mc:Fallback>
+        <mc:Fallback xmlns="">
           <p:sp>
             <p:nvSpPr>
               <p:cNvPr id="12" name="TextBox 11">
@@ -11772,8 +11762,8 @@
               </p:style>
             </p:cxnSp>
           </p:grpSp>
-          <mc:AlternateContent xmlns:mc="http://schemas.openxmlformats.org/markup-compatibility/2006">
-            <mc:Choice xmlns:a14="http://schemas.microsoft.com/office/drawing/2010/main" Requires="a14">
+          <mc:AlternateContent xmlns:mc="http://schemas.openxmlformats.org/markup-compatibility/2006" xmlns:a14="http://schemas.microsoft.com/office/drawing/2010/main">
+            <mc:Choice Requires="a14">
               <p:sp>
                 <p:nvSpPr>
                   <p:cNvPr id="28" name="TextBox 27">
@@ -11811,7 +11801,7 @@
                         <m:sSub>
                           <m:sSubPr>
                             <m:ctrlPr>
-                              <a:rPr lang="en-US" b="0" i="0" dirty="0" smtClean="0">
+                              <a:rPr lang="en-US" b="0" i="1" dirty="0" smtClean="0">
                                 <a:latin typeface="Cambria Math" panose="02040503050406030204" pitchFamily="18" charset="0"/>
                               </a:rPr>
                             </m:ctrlPr>
@@ -11858,7 +11848,7 @@
                 </p:txBody>
               </p:sp>
             </mc:Choice>
-            <mc:Fallback>
+            <mc:Fallback xmlns="">
               <p:sp>
                 <p:nvSpPr>
                   <p:cNvPr id="28" name="TextBox 27">
@@ -11964,8 +11954,8 @@
             <a:chExt cx="6211957" cy="1931487"/>
           </a:xfrm>
         </p:grpSpPr>
-        <mc:AlternateContent xmlns:mc="http://schemas.openxmlformats.org/markup-compatibility/2006">
-          <mc:Choice xmlns:a14="http://schemas.microsoft.com/office/drawing/2010/main" Requires="a14">
+        <mc:AlternateContent xmlns:mc="http://schemas.openxmlformats.org/markup-compatibility/2006" xmlns:a14="http://schemas.microsoft.com/office/drawing/2010/main">
+          <mc:Choice Requires="a14">
             <p:sp>
               <p:nvSpPr>
                 <p:cNvPr id="33" name="TextBox 32">
@@ -12021,7 +12011,7 @@
                       <m:sSub>
                         <m:sSubPr>
                           <m:ctrlPr>
-                            <a:rPr lang="en-US" b="0" i="0" dirty="0" smtClean="0">
+                            <a:rPr lang="en-US" b="0" i="1" dirty="0" smtClean="0">
                               <a:latin typeface="Cambria Math" panose="02040503050406030204" pitchFamily="18" charset="0"/>
                             </a:rPr>
                           </m:ctrlPr>
@@ -12068,7 +12058,7 @@
               </p:txBody>
             </p:sp>
           </mc:Choice>
-          <mc:Fallback>
+          <mc:Fallback xmlns="">
             <p:sp>
               <p:nvSpPr>
                 <p:cNvPr id="33" name="TextBox 32">
@@ -12348,8 +12338,8 @@
           </a:p>
         </p:txBody>
       </p:sp>
-      <mc:AlternateContent xmlns:mc="http://schemas.openxmlformats.org/markup-compatibility/2006">
-        <mc:Choice xmlns:a14="http://schemas.microsoft.com/office/drawing/2010/main" Requires="a14">
+      <mc:AlternateContent xmlns:mc="http://schemas.openxmlformats.org/markup-compatibility/2006" xmlns:a14="http://schemas.microsoft.com/office/drawing/2010/main">
+        <mc:Choice Requires="a14">
           <p:sp>
             <p:nvSpPr>
               <p:cNvPr id="3" name="Content Placeholder 2">
@@ -12983,7 +12973,7 @@
             </p:txBody>
           </p:sp>
         </mc:Choice>
-        <mc:Fallback>
+        <mc:Fallback xmlns="">
           <p:sp>
             <p:nvSpPr>
               <p:cNvPr id="3" name="Content Placeholder 2">
@@ -13081,8 +13071,8 @@
           </a:p>
         </p:txBody>
       </p:sp>
-      <mc:AlternateContent xmlns:mc="http://schemas.openxmlformats.org/markup-compatibility/2006">
-        <mc:Choice xmlns:a14="http://schemas.microsoft.com/office/drawing/2010/main" Requires="a14">
+      <mc:AlternateContent xmlns:mc="http://schemas.openxmlformats.org/markup-compatibility/2006" xmlns:a14="http://schemas.microsoft.com/office/drawing/2010/main">
+        <mc:Choice Requires="a14">
           <p:sp>
             <p:nvSpPr>
               <p:cNvPr id="3" name="Content Placeholder 2">
@@ -13113,7 +13103,7 @@
                     <m:d>
                       <m:dPr>
                         <m:ctrlPr>
-                          <a:rPr lang="en-US" b="0" i="0" dirty="0" smtClean="0">
+                          <a:rPr lang="en-US" b="0" i="1" dirty="0" smtClean="0">
                             <a:latin typeface="Cambria Math" panose="02040503050406030204" pitchFamily="18" charset="0"/>
                           </a:rPr>
                         </m:ctrlPr>
@@ -13496,7 +13486,7 @@
             </p:txBody>
           </p:sp>
         </mc:Choice>
-        <mc:Fallback>
+        <mc:Fallback xmlns="">
           <p:sp>
             <p:nvSpPr>
               <p:cNvPr id="3" name="Content Placeholder 2">
@@ -13594,60 +13584,157 @@
           </a:p>
         </p:txBody>
       </p:sp>
-      <p:sp>
-        <p:nvSpPr>
-          <p:cNvPr id="3" name="Content Placeholder 2">
-            <a:extLst>
-              <a:ext uri="{FF2B5EF4-FFF2-40B4-BE49-F238E27FC236}">
-                <a16:creationId xmlns:a16="http://schemas.microsoft.com/office/drawing/2014/main" id="{DB4F8C17-DBDC-CBA0-58E1-87ECE7DF7129}"/>
-              </a:ext>
-            </a:extLst>
-          </p:cNvPr>
-          <p:cNvSpPr>
-            <a:spLocks noGrp="1"/>
-          </p:cNvSpPr>
-          <p:nvPr>
-            <p:ph idx="1"/>
-          </p:nvPr>
-        </p:nvSpPr>
-        <p:spPr/>
-        <p:txBody>
-          <a:bodyPr/>
-          <a:lstStyle/>
-          <a:p>
-            <a:r>
-              <a:rPr lang="en-US" dirty="0"/>
-              <a:t>We want to have a data-driven way of identifying the ideal control group.</a:t>
-            </a:r>
-          </a:p>
-          <a:p>
-            <a:r>
-              <a:rPr lang="en-US" dirty="0"/>
-              <a:t>Since </a:t>
-            </a:r>
-            <a:r>
-              <a:rPr lang="en-US" dirty="0" err="1"/>
-              <a:t>DiD</a:t>
-            </a:r>
-            <a:r>
-              <a:rPr lang="en-US" dirty="0"/>
-              <a:t> uses all the control units in our data, we may find ourselves on a time-consuming and likely non-rigorous data-mining exercise to find units that pass the parallel trends test.</a:t>
-            </a:r>
-          </a:p>
-          <a:p>
-            <a:r>
-              <a:rPr lang="en-US" dirty="0"/>
-              <a:t>SC identifies the relevant control units and how important they are.</a:t>
-            </a:r>
-          </a:p>
-          <a:p>
-            <a:endParaRPr lang="en-US" dirty="0"/>
-          </a:p>
-          <a:p>
-            <a:endParaRPr lang="en-US" dirty="0"/>
-          </a:p>
-        </p:txBody>
-      </p:sp>
+      <mc:AlternateContent xmlns:mc="http://schemas.openxmlformats.org/markup-compatibility/2006" xmlns:a14="http://schemas.microsoft.com/office/drawing/2010/main">
+        <mc:Choice Requires="a14">
+          <p:sp>
+            <p:nvSpPr>
+              <p:cNvPr id="3" name="Content Placeholder 2">
+                <a:extLst>
+                  <a:ext uri="{FF2B5EF4-FFF2-40B4-BE49-F238E27FC236}">
+                    <a16:creationId xmlns:a16="http://schemas.microsoft.com/office/drawing/2014/main" id="{DB4F8C17-DBDC-CBA0-58E1-87ECE7DF7129}"/>
+                  </a:ext>
+                </a:extLst>
+              </p:cNvPr>
+              <p:cNvSpPr>
+                <a:spLocks noGrp="1"/>
+              </p:cNvSpPr>
+              <p:nvPr>
+                <p:ph idx="1"/>
+              </p:nvPr>
+            </p:nvSpPr>
+            <p:spPr/>
+            <p:txBody>
+              <a:bodyPr/>
+              <a:lstStyle/>
+              <a:p>
+                <a:r>
+                  <a:rPr lang="en-US" dirty="0"/>
+                  <a:t>We want to have a data-driven way of identifying the ideal control group.</a:t>
+                </a:r>
+              </a:p>
+              <a:p>
+                <a:r>
+                  <a:rPr lang="en-US" dirty="0"/>
+                  <a:t>Since </a:t>
+                </a:r>
+                <a:r>
+                  <a:rPr lang="en-US" dirty="0" err="1"/>
+                  <a:t>DiD</a:t>
+                </a:r>
+                <a:r>
+                  <a:rPr lang="en-US" dirty="0"/>
+                  <a:t> uses all the control units in our data, we may find ourselves on a time-consuming and likely non-rigorous data-mining exercise to find units that pass the parallel trends test.</a:t>
+                </a:r>
+              </a:p>
+              <a:p>
+                <a:r>
+                  <a:rPr lang="en-US" dirty="0"/>
+                  <a:t>SC models have different approaches to identify the relevant control units and how important they are.</a:t>
+                </a:r>
+              </a:p>
+              <a:p>
+                <a:r>
+                  <a:rPr lang="en-US" dirty="0"/>
+                  <a:t>We will now go over two models that place more and less restrictions on estimating </a:t>
+                </a:r>
+                <a14:m>
+                  <m:oMath xmlns:m="http://schemas.openxmlformats.org/officeDocument/2006/math">
+                    <m:sSub>
+                      <m:sSubPr>
+                        <m:ctrlPr>
+                          <a:rPr lang="en-US" i="1" smtClean="0">
+                            <a:latin typeface="Cambria Math" panose="02040503050406030204" pitchFamily="18" charset="0"/>
+                          </a:rPr>
+                        </m:ctrlPr>
+                      </m:sSubPr>
+                      <m:e>
+                        <m:r>
+                          <a:rPr lang="en-US" b="0" i="1" smtClean="0">
+                            <a:latin typeface="Cambria Math" panose="02040503050406030204" pitchFamily="18" charset="0"/>
+                          </a:rPr>
+                          <m:t>(</m:t>
+                        </m:r>
+                        <m:r>
+                          <a:rPr lang="en-US" b="0" i="1" smtClean="0">
+                            <a:latin typeface="Cambria Math" panose="02040503050406030204" pitchFamily="18" charset="0"/>
+                          </a:rPr>
+                          <m:t>𝜇</m:t>
+                        </m:r>
+                        <m:r>
+                          <a:rPr lang="en-US" b="0" i="1" smtClean="0">
+                            <a:latin typeface="Cambria Math" panose="02040503050406030204" pitchFamily="18" charset="0"/>
+                          </a:rPr>
+                          <m:t>,</m:t>
+                        </m:r>
+                        <m:r>
+                          <a:rPr lang="en-US" i="1">
+                            <a:latin typeface="Cambria Math" panose="02040503050406030204" pitchFamily="18" charset="0"/>
+                          </a:rPr>
+                          <m:t>𝜔</m:t>
+                        </m:r>
+                      </m:e>
+                      <m:sub>
+                        <m:r>
+                          <a:rPr lang="en-US" i="1">
+                            <a:latin typeface="Cambria Math" panose="02040503050406030204" pitchFamily="18" charset="0"/>
+                          </a:rPr>
+                          <m:t>𝑖</m:t>
+                        </m:r>
+                      </m:sub>
+                    </m:sSub>
+                    <m:r>
+                      <a:rPr lang="en-US" b="0" i="1" smtClean="0">
+                        <a:latin typeface="Cambria Math" panose="02040503050406030204" pitchFamily="18" charset="0"/>
+                      </a:rPr>
+                      <m:t>)</m:t>
+                    </m:r>
+                  </m:oMath>
+                </a14:m>
+                <a:endParaRPr lang="en-US" dirty="0"/>
+              </a:p>
+            </p:txBody>
+          </p:sp>
+        </mc:Choice>
+        <mc:Fallback xmlns="">
+          <p:sp>
+            <p:nvSpPr>
+              <p:cNvPr id="3" name="Content Placeholder 2">
+                <a:extLst>
+                  <a:ext uri="{FF2B5EF4-FFF2-40B4-BE49-F238E27FC236}">
+                    <a16:creationId xmlns:a16="http://schemas.microsoft.com/office/drawing/2014/main" id="{DB4F8C17-DBDC-CBA0-58E1-87ECE7DF7129}"/>
+                  </a:ext>
+                </a:extLst>
+              </p:cNvPr>
+              <p:cNvSpPr>
+                <a:spLocks noGrp="1" noRot="1" noChangeAspect="1" noMove="1" noResize="1" noEditPoints="1" noAdjustHandles="1" noChangeArrowheads="1" noChangeShapeType="1" noTextEdit="1"/>
+              </p:cNvSpPr>
+              <p:nvPr>
+                <p:ph idx="1"/>
+              </p:nvPr>
+            </p:nvSpPr>
+            <p:spPr>
+              <a:blipFill>
+                <a:blip r:embed="rId2"/>
+                <a:stretch>
+                  <a:fillRect l="-1086" t="-2326" r="-965"/>
+                </a:stretch>
+              </a:blipFill>
+            </p:spPr>
+            <p:txBody>
+              <a:bodyPr/>
+              <a:lstStyle/>
+              <a:p>
+                <a:r>
+                  <a:rPr lang="en-US">
+                    <a:noFill/>
+                  </a:rPr>
+                  <a:t> </a:t>
+                </a:r>
+              </a:p>
+            </p:txBody>
+          </p:sp>
+        </mc:Fallback>
+      </mc:AlternateContent>
     </p:spTree>
     <p:extLst>
       <p:ext uri="{BB962C8B-B14F-4D97-AF65-F5344CB8AC3E}">
@@ -13701,7 +13788,7 @@
           <a:p>
             <a:r>
               <a:rPr lang="en-US" dirty="0"/>
-              <a:t>Estimating SC – Abadie, Diamond, </a:t>
+              <a:t>Abadie, Diamond, </a:t>
             </a:r>
             <a:r>
               <a:rPr lang="en-US" dirty="0" err="1"/>
@@ -13714,31 +13801,335 @@
           </a:p>
         </p:txBody>
       </p:sp>
-      <p:sp>
-        <p:nvSpPr>
-          <p:cNvPr id="3" name="Content Placeholder 2">
-            <a:extLst>
-              <a:ext uri="{FF2B5EF4-FFF2-40B4-BE49-F238E27FC236}">
-                <a16:creationId xmlns:a16="http://schemas.microsoft.com/office/drawing/2014/main" id="{77370F68-B8F4-4156-795B-117B4E517A00}"/>
-              </a:ext>
-            </a:extLst>
-          </p:cNvPr>
-          <p:cNvSpPr>
-            <a:spLocks noGrp="1"/>
-          </p:cNvSpPr>
-          <p:nvPr>
-            <p:ph idx="1"/>
-          </p:nvPr>
-        </p:nvSpPr>
-        <p:spPr/>
-        <p:txBody>
-          <a:bodyPr/>
-          <a:lstStyle/>
-          <a:p>
-            <a:endParaRPr lang="en-US"/>
-          </a:p>
-        </p:txBody>
-      </p:sp>
+      <mc:AlternateContent xmlns:mc="http://schemas.openxmlformats.org/markup-compatibility/2006">
+        <mc:Choice xmlns:a14="http://schemas.microsoft.com/office/drawing/2010/main" Requires="a14">
+          <p:sp>
+            <p:nvSpPr>
+              <p:cNvPr id="3" name="Content Placeholder 2">
+                <a:extLst>
+                  <a:ext uri="{FF2B5EF4-FFF2-40B4-BE49-F238E27FC236}">
+                    <a16:creationId xmlns:a16="http://schemas.microsoft.com/office/drawing/2014/main" id="{77370F68-B8F4-4156-795B-117B4E517A00}"/>
+                  </a:ext>
+                </a:extLst>
+              </p:cNvPr>
+              <p:cNvSpPr>
+                <a:spLocks noGrp="1"/>
+              </p:cNvSpPr>
+              <p:nvPr>
+                <p:ph idx="1"/>
+              </p:nvPr>
+            </p:nvSpPr>
+            <p:spPr/>
+            <p:txBody>
+              <a:bodyPr/>
+              <a:lstStyle/>
+              <a:p>
+                <a:r>
+                  <a:rPr lang="en-US" dirty="0"/>
+                  <a:t>This is a more restrictive approach to estimating the weights </a:t>
+                </a:r>
+                <a14:m>
+                  <m:oMath xmlns:m="http://schemas.openxmlformats.org/officeDocument/2006/math">
+                    <m:r>
+                      <a:rPr lang="en-US" b="0" i="0" dirty="0" smtClean="0">
+                        <a:latin typeface="Cambria Math" panose="02040503050406030204" pitchFamily="18" charset="0"/>
+                      </a:rPr>
+                      <m:t>(</m:t>
+                    </m:r>
+                    <m:r>
+                      <a:rPr lang="en-US" b="0" i="1" dirty="0" smtClean="0">
+                        <a:latin typeface="Cambria Math" panose="02040503050406030204" pitchFamily="18" charset="0"/>
+                      </a:rPr>
+                      <m:t>𝜇</m:t>
+                    </m:r>
+                    <m:r>
+                      <a:rPr lang="en-US" b="0" i="1" dirty="0" smtClean="0">
+                        <a:latin typeface="Cambria Math" panose="02040503050406030204" pitchFamily="18" charset="0"/>
+                      </a:rPr>
+                      <m:t>,</m:t>
+                    </m:r>
+                    <m:sSub>
+                      <m:sSubPr>
+                        <m:ctrlPr>
+                          <a:rPr lang="en-US" i="1">
+                            <a:latin typeface="Cambria Math" panose="02040503050406030204" pitchFamily="18" charset="0"/>
+                          </a:rPr>
+                        </m:ctrlPr>
+                      </m:sSubPr>
+                      <m:e>
+                        <m:r>
+                          <a:rPr lang="en-US" i="1">
+                            <a:latin typeface="Cambria Math" panose="02040503050406030204" pitchFamily="18" charset="0"/>
+                          </a:rPr>
+                          <m:t>𝜔</m:t>
+                        </m:r>
+                      </m:e>
+                      <m:sub>
+                        <m:r>
+                          <a:rPr lang="en-US" i="1">
+                            <a:latin typeface="Cambria Math" panose="02040503050406030204" pitchFamily="18" charset="0"/>
+                          </a:rPr>
+                          <m:t>𝑖</m:t>
+                        </m:r>
+                      </m:sub>
+                    </m:sSub>
+                    <m:r>
+                      <a:rPr lang="en-US" b="0" i="1" smtClean="0">
+                        <a:latin typeface="Cambria Math" panose="02040503050406030204" pitchFamily="18" charset="0"/>
+                      </a:rPr>
+                      <m:t>)</m:t>
+                    </m:r>
+                  </m:oMath>
+                </a14:m>
+                <a:r>
+                  <a:rPr lang="en-US" dirty="0"/>
+                  <a:t>. These restrictions allow us to find a unique solution for </a:t>
+                </a:r>
+                <a14:m>
+                  <m:oMath xmlns:m="http://schemas.openxmlformats.org/officeDocument/2006/math">
+                    <m:d>
+                      <m:dPr>
+                        <m:ctrlPr>
+                          <a:rPr lang="en-US" i="1" dirty="0">
+                            <a:latin typeface="Cambria Math" panose="02040503050406030204" pitchFamily="18" charset="0"/>
+                          </a:rPr>
+                        </m:ctrlPr>
+                      </m:dPr>
+                      <m:e>
+                        <m:r>
+                          <a:rPr lang="en-US" i="1" dirty="0">
+                            <a:latin typeface="Cambria Math" panose="02040503050406030204" pitchFamily="18" charset="0"/>
+                          </a:rPr>
+                          <m:t>𝜇</m:t>
+                        </m:r>
+                        <m:r>
+                          <a:rPr lang="en-US" i="1" dirty="0">
+                            <a:latin typeface="Cambria Math" panose="02040503050406030204" pitchFamily="18" charset="0"/>
+                          </a:rPr>
+                          <m:t>,</m:t>
+                        </m:r>
+                        <m:sSub>
+                          <m:sSubPr>
+                            <m:ctrlPr>
+                              <a:rPr lang="en-US" i="1">
+                                <a:latin typeface="Cambria Math" panose="02040503050406030204" pitchFamily="18" charset="0"/>
+                              </a:rPr>
+                            </m:ctrlPr>
+                          </m:sSubPr>
+                          <m:e>
+                            <m:r>
+                              <a:rPr lang="en-US" i="1">
+                                <a:latin typeface="Cambria Math" panose="02040503050406030204" pitchFamily="18" charset="0"/>
+                              </a:rPr>
+                              <m:t>𝜔</m:t>
+                            </m:r>
+                          </m:e>
+                          <m:sub>
+                            <m:r>
+                              <a:rPr lang="en-US" i="1">
+                                <a:latin typeface="Cambria Math" panose="02040503050406030204" pitchFamily="18" charset="0"/>
+                              </a:rPr>
+                              <m:t>𝑖</m:t>
+                            </m:r>
+                          </m:sub>
+                        </m:sSub>
+                      </m:e>
+                    </m:d>
+                  </m:oMath>
+                </a14:m>
+                <a:r>
+                  <a:rPr lang="en-US" dirty="0"/>
+                  <a:t> to predict pre-trends.</a:t>
+                </a:r>
+              </a:p>
+              <a:p>
+                <a:r>
+                  <a:rPr lang="en-US" dirty="0"/>
+                  <a:t>Our restrictions are (1) </a:t>
+                </a:r>
+                <a14:m>
+                  <m:oMath xmlns:m="http://schemas.openxmlformats.org/officeDocument/2006/math">
+                    <m:r>
+                      <a:rPr lang="en-US" b="0" i="1" dirty="0" smtClean="0">
+                        <a:latin typeface="Cambria Math" panose="02040503050406030204" pitchFamily="18" charset="0"/>
+                      </a:rPr>
+                      <m:t>𝜇</m:t>
+                    </m:r>
+                    <m:r>
+                      <a:rPr lang="en-US" b="0" i="1" dirty="0" smtClean="0">
+                        <a:latin typeface="Cambria Math" panose="02040503050406030204" pitchFamily="18" charset="0"/>
+                      </a:rPr>
+                      <m:t>=0</m:t>
+                    </m:r>
+                  </m:oMath>
+                </a14:m>
+                <a:r>
+                  <a:rPr lang="en-US" dirty="0"/>
+                  <a:t>; (2) </a:t>
+                </a:r>
+                <a14:m>
+                  <m:oMath xmlns:m="http://schemas.openxmlformats.org/officeDocument/2006/math">
+                    <m:sSub>
+                      <m:sSubPr>
+                        <m:ctrlPr>
+                          <a:rPr lang="en-US" i="1" smtClean="0">
+                            <a:latin typeface="Cambria Math" panose="02040503050406030204" pitchFamily="18" charset="0"/>
+                          </a:rPr>
+                        </m:ctrlPr>
+                      </m:sSubPr>
+                      <m:e>
+                        <m:r>
+                          <a:rPr lang="en-US" i="1">
+                            <a:latin typeface="Cambria Math" panose="02040503050406030204" pitchFamily="18" charset="0"/>
+                          </a:rPr>
+                          <m:t>𝜔</m:t>
+                        </m:r>
+                      </m:e>
+                      <m:sub>
+                        <m:r>
+                          <a:rPr lang="en-US" i="1">
+                            <a:latin typeface="Cambria Math" panose="02040503050406030204" pitchFamily="18" charset="0"/>
+                          </a:rPr>
+                          <m:t>𝑖</m:t>
+                        </m:r>
+                      </m:sub>
+                    </m:sSub>
+                    <m:r>
+                      <a:rPr lang="en-US" b="0" i="1" smtClean="0">
+                        <a:latin typeface="Cambria Math" panose="02040503050406030204" pitchFamily="18" charset="0"/>
+                      </a:rPr>
+                      <m:t>&gt;0</m:t>
+                    </m:r>
+                  </m:oMath>
+                </a14:m>
+                <a:r>
+                  <a:rPr lang="en-US" dirty="0"/>
+                  <a:t>; and (3) </a:t>
+                </a:r>
+                <a14:m>
+                  <m:oMath xmlns:m="http://schemas.openxmlformats.org/officeDocument/2006/math">
+                    <m:nary>
+                      <m:naryPr>
+                        <m:chr m:val="∑"/>
+                        <m:supHide m:val="on"/>
+                        <m:ctrlPr>
+                          <a:rPr lang="en-US" b="0" i="1" smtClean="0">
+                            <a:latin typeface="Cambria Math" panose="02040503050406030204" pitchFamily="18" charset="0"/>
+                          </a:rPr>
+                        </m:ctrlPr>
+                      </m:naryPr>
+                      <m:sub>
+                        <m:r>
+                          <a:rPr lang="en-US" b="0" i="1" smtClean="0">
+                            <a:latin typeface="Cambria Math" panose="02040503050406030204" pitchFamily="18" charset="0"/>
+                          </a:rPr>
+                          <m:t>𝑖</m:t>
+                        </m:r>
+                      </m:sub>
+                      <m:sup/>
+                      <m:e>
+                        <m:sSub>
+                          <m:sSubPr>
+                            <m:ctrlPr>
+                              <a:rPr lang="en-US" b="0" i="1" smtClean="0">
+                                <a:latin typeface="Cambria Math" panose="02040503050406030204" pitchFamily="18" charset="0"/>
+                              </a:rPr>
+                            </m:ctrlPr>
+                          </m:sSubPr>
+                          <m:e>
+                            <m:r>
+                              <a:rPr lang="en-US" b="0" i="1" smtClean="0">
+                                <a:latin typeface="Cambria Math" panose="02040503050406030204" pitchFamily="18" charset="0"/>
+                              </a:rPr>
+                              <m:t>𝜔</m:t>
+                            </m:r>
+                          </m:e>
+                          <m:sub>
+                            <m:r>
+                              <a:rPr lang="en-US" b="0" i="1" smtClean="0">
+                                <a:latin typeface="Cambria Math" panose="02040503050406030204" pitchFamily="18" charset="0"/>
+                              </a:rPr>
+                              <m:t>𝑖</m:t>
+                            </m:r>
+                          </m:sub>
+                        </m:sSub>
+                      </m:e>
+                    </m:nary>
+                    <m:r>
+                      <a:rPr lang="en-US" b="0" i="1" smtClean="0">
+                        <a:latin typeface="Cambria Math" panose="02040503050406030204" pitchFamily="18" charset="0"/>
+                      </a:rPr>
+                      <m:t>=1</m:t>
+                    </m:r>
+                  </m:oMath>
+                </a14:m>
+                <a:r>
+                  <a:rPr lang="en-US" dirty="0"/>
+                  <a:t>.</a:t>
+                </a:r>
+              </a:p>
+              <a:p>
+                <a:r>
+                  <a:rPr lang="en-US" dirty="0"/>
+                  <a:t>These restrictions mean that only a few units will have strictly positive weights, giving us a more interpretable result. </a:t>
+                </a:r>
+              </a:p>
+              <a:p>
+                <a:pPr lvl="1"/>
+                <a:r>
+                  <a:rPr lang="en-US" dirty="0"/>
+                  <a:t>For example, we can find that out of 100 stores, only three stores are needed to predict the outcome of the treated store.</a:t>
+                </a:r>
+              </a:p>
+              <a:p>
+                <a:pPr marL="0" indent="0">
+                  <a:buNone/>
+                </a:pPr>
+                <a:endParaRPr lang="en-US" dirty="0"/>
+              </a:p>
+            </p:txBody>
+          </p:sp>
+        </mc:Choice>
+        <mc:Fallback>
+          <p:sp>
+            <p:nvSpPr>
+              <p:cNvPr id="3" name="Content Placeholder 2">
+                <a:extLst>
+                  <a:ext uri="{FF2B5EF4-FFF2-40B4-BE49-F238E27FC236}">
+                    <a16:creationId xmlns:a16="http://schemas.microsoft.com/office/drawing/2014/main" id="{77370F68-B8F4-4156-795B-117B4E517A00}"/>
+                  </a:ext>
+                </a:extLst>
+              </p:cNvPr>
+              <p:cNvSpPr>
+                <a:spLocks noGrp="1" noRot="1" noChangeAspect="1" noMove="1" noResize="1" noEditPoints="1" noAdjustHandles="1" noChangeArrowheads="1" noChangeShapeType="1" noTextEdit="1"/>
+              </p:cNvSpPr>
+              <p:nvPr>
+                <p:ph idx="1"/>
+              </p:nvPr>
+            </p:nvSpPr>
+            <p:spPr>
+              <a:blipFill>
+                <a:blip r:embed="rId2"/>
+                <a:stretch>
+                  <a:fillRect l="-1086" t="-2326" r="-1689"/>
+                </a:stretch>
+              </a:blipFill>
+            </p:spPr>
+            <p:txBody>
+              <a:bodyPr/>
+              <a:lstStyle/>
+              <a:p>
+                <a:r>
+                  <a:rPr lang="en-US">
+                    <a:noFill/>
+                  </a:rPr>
+                  <a:t> </a:t>
+                </a:r>
+              </a:p>
+            </p:txBody>
+          </p:sp>
+        </mc:Fallback>
+      </mc:AlternateContent>
     </p:spTree>
     <p:extLst>
       <p:ext uri="{BB962C8B-B14F-4D97-AF65-F5344CB8AC3E}">
@@ -13753,6 +14144,677 @@
 </file>
 
 <file path=ppt/slides/slide25.xml><?xml version="1.0" encoding="utf-8"?>
+<p:sld xmlns:a="http://schemas.openxmlformats.org/drawingml/2006/main" xmlns:r="http://schemas.openxmlformats.org/officeDocument/2006/relationships" xmlns:p="http://schemas.openxmlformats.org/presentationml/2006/main">
+  <p:cSld>
+    <p:spTree>
+      <p:nvGrpSpPr>
+        <p:cNvPr id="1" name=""/>
+        <p:cNvGrpSpPr/>
+        <p:nvPr/>
+      </p:nvGrpSpPr>
+      <p:grpSpPr>
+        <a:xfrm>
+          <a:off x="0" y="0"/>
+          <a:ext cx="0" cy="0"/>
+          <a:chOff x="0" y="0"/>
+          <a:chExt cx="0" cy="0"/>
+        </a:xfrm>
+      </p:grpSpPr>
+      <p:sp>
+        <p:nvSpPr>
+          <p:cNvPr id="2" name="Title 1">
+            <a:extLst>
+              <a:ext uri="{FF2B5EF4-FFF2-40B4-BE49-F238E27FC236}">
+                <a16:creationId xmlns:a16="http://schemas.microsoft.com/office/drawing/2014/main" id="{95526AFE-DF7F-1E9E-C100-517887E372D0}"/>
+              </a:ext>
+            </a:extLst>
+          </p:cNvPr>
+          <p:cNvSpPr>
+            <a:spLocks noGrp="1"/>
+          </p:cNvSpPr>
+          <p:nvPr>
+            <p:ph type="title"/>
+          </p:nvPr>
+        </p:nvSpPr>
+        <p:spPr/>
+        <p:txBody>
+          <a:bodyPr/>
+          <a:lstStyle/>
+          <a:p>
+            <a:r>
+              <a:rPr lang="en-US" dirty="0" err="1"/>
+              <a:t>Doudchenko</a:t>
+            </a:r>
+            <a:r>
+              <a:rPr lang="en-US" dirty="0"/>
+              <a:t> and </a:t>
+            </a:r>
+            <a:r>
+              <a:rPr lang="en-US" dirty="0" err="1"/>
+              <a:t>Imbens</a:t>
+            </a:r>
+            <a:r>
+              <a:rPr lang="en-US" dirty="0"/>
+              <a:t> 2016 – DI </a:t>
+            </a:r>
+          </a:p>
+        </p:txBody>
+      </p:sp>
+      <mc:AlternateContent xmlns:mc="http://schemas.openxmlformats.org/markup-compatibility/2006">
+        <mc:Choice xmlns:a14="http://schemas.microsoft.com/office/drawing/2010/main" Requires="a14">
+          <p:sp>
+            <p:nvSpPr>
+              <p:cNvPr id="3" name="Content Placeholder 2">
+                <a:extLst>
+                  <a:ext uri="{FF2B5EF4-FFF2-40B4-BE49-F238E27FC236}">
+                    <a16:creationId xmlns:a16="http://schemas.microsoft.com/office/drawing/2014/main" id="{5F9E89DB-1EFD-2BD4-322B-942D7B2BDE50}"/>
+                  </a:ext>
+                </a:extLst>
+              </p:cNvPr>
+              <p:cNvSpPr>
+                <a:spLocks noGrp="1"/>
+              </p:cNvSpPr>
+              <p:nvPr>
+                <p:ph idx="1"/>
+              </p:nvPr>
+            </p:nvSpPr>
+            <p:spPr/>
+            <p:txBody>
+              <a:bodyPr/>
+              <a:lstStyle/>
+              <a:p>
+                <a:r>
+                  <a:rPr lang="en-US" dirty="0"/>
+                  <a:t>A less restrictive SC model uses cross-validation with an elastic net regression to allow a more flexible way of estimating </a:t>
+                </a:r>
+                <a14:m>
+                  <m:oMath xmlns:m="http://schemas.openxmlformats.org/officeDocument/2006/math">
+                    <m:d>
+                      <m:dPr>
+                        <m:ctrlPr>
+                          <a:rPr lang="en-US" i="1" dirty="0" smtClean="0">
+                            <a:latin typeface="Cambria Math" panose="02040503050406030204" pitchFamily="18" charset="0"/>
+                          </a:rPr>
+                        </m:ctrlPr>
+                      </m:dPr>
+                      <m:e>
+                        <m:r>
+                          <a:rPr lang="en-US" i="1" dirty="0">
+                            <a:latin typeface="Cambria Math" panose="02040503050406030204" pitchFamily="18" charset="0"/>
+                          </a:rPr>
+                          <m:t>𝜇</m:t>
+                        </m:r>
+                        <m:r>
+                          <a:rPr lang="en-US" i="1" dirty="0">
+                            <a:latin typeface="Cambria Math" panose="02040503050406030204" pitchFamily="18" charset="0"/>
+                          </a:rPr>
+                          <m:t>,</m:t>
+                        </m:r>
+                        <m:sSub>
+                          <m:sSubPr>
+                            <m:ctrlPr>
+                              <a:rPr lang="en-US" i="1">
+                                <a:latin typeface="Cambria Math" panose="02040503050406030204" pitchFamily="18" charset="0"/>
+                              </a:rPr>
+                            </m:ctrlPr>
+                          </m:sSubPr>
+                          <m:e>
+                            <m:r>
+                              <a:rPr lang="en-US" i="1">
+                                <a:latin typeface="Cambria Math" panose="02040503050406030204" pitchFamily="18" charset="0"/>
+                              </a:rPr>
+                              <m:t>𝜔</m:t>
+                            </m:r>
+                          </m:e>
+                          <m:sub>
+                            <m:r>
+                              <a:rPr lang="en-US" i="1">
+                                <a:latin typeface="Cambria Math" panose="02040503050406030204" pitchFamily="18" charset="0"/>
+                              </a:rPr>
+                              <m:t>𝑖</m:t>
+                            </m:r>
+                          </m:sub>
+                        </m:sSub>
+                      </m:e>
+                    </m:d>
+                  </m:oMath>
+                </a14:m>
+                <a:r>
+                  <a:rPr lang="en-US" dirty="0"/>
+                  <a:t>.</a:t>
+                </a:r>
+              </a:p>
+              <a:p>
+                <a:r>
+                  <a:rPr lang="en-US" dirty="0"/>
+                  <a:t>Compared to ADH:</a:t>
+                </a:r>
+              </a:p>
+              <a:p>
+                <a:pPr marL="514350" indent="-514350">
+                  <a:buFont typeface="+mj-lt"/>
+                  <a:buAutoNum type="arabicPeriod"/>
+                </a:pPr>
+                <a:r>
+                  <a:rPr lang="en-US" dirty="0"/>
+                  <a:t>DI allows for </a:t>
+                </a:r>
+                <a14:m>
+                  <m:oMath xmlns:m="http://schemas.openxmlformats.org/officeDocument/2006/math">
+                    <m:r>
+                      <a:rPr lang="en-US" b="0" i="1" dirty="0" smtClean="0">
+                        <a:latin typeface="Cambria Math" panose="02040503050406030204" pitchFamily="18" charset="0"/>
+                      </a:rPr>
+                      <m:t>𝜇</m:t>
+                    </m:r>
+                  </m:oMath>
+                </a14:m>
+                <a:r>
+                  <a:rPr lang="en-US" dirty="0"/>
+                  <a:t> to take on any value, allowing us to predict the trend of a treatment unit that is outside the range of other control units (</a:t>
+                </a:r>
+                <a:r>
+                  <a:rPr lang="en-US" dirty="0" err="1"/>
+                  <a:t>ie</a:t>
+                </a:r>
+                <a:r>
+                  <a:rPr lang="en-US" dirty="0"/>
+                  <a:t>, stores with the lowest or highest sales); and</a:t>
+                </a:r>
+              </a:p>
+              <a:p>
+                <a:pPr marL="514350" indent="-514350">
+                  <a:buFont typeface="+mj-lt"/>
+                  <a:buAutoNum type="arabicPeriod"/>
+                </a:pPr>
+                <a14:m>
+                  <m:oMath xmlns:m="http://schemas.openxmlformats.org/officeDocument/2006/math">
+                    <m:sSub>
+                      <m:sSubPr>
+                        <m:ctrlPr>
+                          <a:rPr lang="en-US" b="0" i="1" dirty="0" smtClean="0">
+                            <a:latin typeface="Cambria Math" panose="02040503050406030204" pitchFamily="18" charset="0"/>
+                          </a:rPr>
+                        </m:ctrlPr>
+                      </m:sSubPr>
+                      <m:e>
+                        <m:r>
+                          <a:rPr lang="en-US" b="0" i="1" dirty="0" smtClean="0">
+                            <a:latin typeface="Cambria Math" panose="02040503050406030204" pitchFamily="18" charset="0"/>
+                          </a:rPr>
+                          <m:t>𝜔</m:t>
+                        </m:r>
+                      </m:e>
+                      <m:sub>
+                        <m:r>
+                          <a:rPr lang="en-US" b="0" i="1" dirty="0" smtClean="0">
+                            <a:latin typeface="Cambria Math" panose="02040503050406030204" pitchFamily="18" charset="0"/>
+                          </a:rPr>
+                          <m:t>𝑖</m:t>
+                        </m:r>
+                      </m:sub>
+                    </m:sSub>
+                  </m:oMath>
+                </a14:m>
+                <a:r>
+                  <a:rPr lang="en-US" dirty="0"/>
+                  <a:t> can be positive or negative, and do not necessarily need to add up to one. This allows additional precision to estimating the pre-trend.</a:t>
+                </a:r>
+              </a:p>
+              <a:p>
+                <a:endParaRPr lang="en-US" dirty="0"/>
+              </a:p>
+            </p:txBody>
+          </p:sp>
+        </mc:Choice>
+        <mc:Fallback>
+          <p:sp>
+            <p:nvSpPr>
+              <p:cNvPr id="3" name="Content Placeholder 2">
+                <a:extLst>
+                  <a:ext uri="{FF2B5EF4-FFF2-40B4-BE49-F238E27FC236}">
+                    <a16:creationId xmlns:a16="http://schemas.microsoft.com/office/drawing/2014/main" id="{5F9E89DB-1EFD-2BD4-322B-942D7B2BDE50}"/>
+                  </a:ext>
+                </a:extLst>
+              </p:cNvPr>
+              <p:cNvSpPr>
+                <a:spLocks noGrp="1" noRot="1" noChangeAspect="1" noMove="1" noResize="1" noEditPoints="1" noAdjustHandles="1" noChangeArrowheads="1" noChangeShapeType="1" noTextEdit="1"/>
+              </p:cNvSpPr>
+              <p:nvPr>
+                <p:ph idx="1"/>
+              </p:nvPr>
+            </p:nvSpPr>
+            <p:spPr>
+              <a:blipFill>
+                <a:blip r:embed="rId2"/>
+                <a:stretch>
+                  <a:fillRect l="-1206" t="-2326" r="-1327"/>
+                </a:stretch>
+              </a:blipFill>
+            </p:spPr>
+            <p:txBody>
+              <a:bodyPr/>
+              <a:lstStyle/>
+              <a:p>
+                <a:r>
+                  <a:rPr lang="en-US">
+                    <a:noFill/>
+                  </a:rPr>
+                  <a:t> </a:t>
+                </a:r>
+              </a:p>
+            </p:txBody>
+          </p:sp>
+        </mc:Fallback>
+      </mc:AlternateContent>
+    </p:spTree>
+    <p:extLst>
+      <p:ext uri="{BB962C8B-B14F-4D97-AF65-F5344CB8AC3E}">
+        <p14:creationId xmlns:p14="http://schemas.microsoft.com/office/powerpoint/2010/main" val="22557769"/>
+      </p:ext>
+    </p:extLst>
+  </p:cSld>
+  <p:clrMapOvr>
+    <a:masterClrMapping/>
+  </p:clrMapOvr>
+</p:sld>
+</file>
+
+<file path=ppt/slides/slide26.xml><?xml version="1.0" encoding="utf-8"?>
+<p:sld xmlns:a="http://schemas.openxmlformats.org/drawingml/2006/main" xmlns:r="http://schemas.openxmlformats.org/officeDocument/2006/relationships" xmlns:p="http://schemas.openxmlformats.org/presentationml/2006/main">
+  <p:cSld>
+    <p:spTree>
+      <p:nvGrpSpPr>
+        <p:cNvPr id="1" name=""/>
+        <p:cNvGrpSpPr/>
+        <p:nvPr/>
+      </p:nvGrpSpPr>
+      <p:grpSpPr>
+        <a:xfrm>
+          <a:off x="0" y="0"/>
+          <a:ext cx="0" cy="0"/>
+          <a:chOff x="0" y="0"/>
+          <a:chExt cx="0" cy="0"/>
+        </a:xfrm>
+      </p:grpSpPr>
+      <p:sp>
+        <p:nvSpPr>
+          <p:cNvPr id="2" name="Title 1">
+            <a:extLst>
+              <a:ext uri="{FF2B5EF4-FFF2-40B4-BE49-F238E27FC236}">
+                <a16:creationId xmlns:a16="http://schemas.microsoft.com/office/drawing/2014/main" id="{8D581354-28B2-92F4-69C1-63159DB2279C}"/>
+              </a:ext>
+            </a:extLst>
+          </p:cNvPr>
+          <p:cNvSpPr>
+            <a:spLocks noGrp="1"/>
+          </p:cNvSpPr>
+          <p:nvPr>
+            <p:ph type="title"/>
+          </p:nvPr>
+        </p:nvSpPr>
+        <p:spPr/>
+        <p:txBody>
+          <a:bodyPr/>
+          <a:lstStyle/>
+          <a:p>
+            <a:r>
+              <a:rPr lang="en-US" dirty="0"/>
+              <a:t>How does inference work?</a:t>
+            </a:r>
+          </a:p>
+        </p:txBody>
+      </p:sp>
+      <mc:AlternateContent xmlns:mc="http://schemas.openxmlformats.org/markup-compatibility/2006">
+        <mc:Choice xmlns:a14="http://schemas.microsoft.com/office/drawing/2010/main" Requires="a14">
+          <p:sp>
+            <p:nvSpPr>
+              <p:cNvPr id="3" name="Content Placeholder 2">
+                <a:extLst>
+                  <a:ext uri="{FF2B5EF4-FFF2-40B4-BE49-F238E27FC236}">
+                    <a16:creationId xmlns:a16="http://schemas.microsoft.com/office/drawing/2014/main" id="{F7097B67-9A3D-C2EB-7C6B-402C42DD0180}"/>
+                  </a:ext>
+                </a:extLst>
+              </p:cNvPr>
+              <p:cNvSpPr>
+                <a:spLocks noGrp="1"/>
+              </p:cNvSpPr>
+              <p:nvPr>
+                <p:ph idx="1"/>
+              </p:nvPr>
+            </p:nvSpPr>
+            <p:spPr/>
+            <p:txBody>
+              <a:bodyPr/>
+              <a:lstStyle/>
+              <a:p>
+                <a:r>
+                  <a:rPr lang="en-US" dirty="0"/>
+                  <a:t>Once we have a set of estimates </a:t>
+                </a:r>
+                <a14:m>
+                  <m:oMath xmlns:m="http://schemas.openxmlformats.org/officeDocument/2006/math">
+                    <m:d>
+                      <m:dPr>
+                        <m:ctrlPr>
+                          <a:rPr lang="en-US" i="1" dirty="0" smtClean="0">
+                            <a:latin typeface="Cambria Math" panose="02040503050406030204" pitchFamily="18" charset="0"/>
+                          </a:rPr>
+                        </m:ctrlPr>
+                      </m:dPr>
+                      <m:e>
+                        <m:r>
+                          <a:rPr lang="en-US" i="1" dirty="0">
+                            <a:latin typeface="Cambria Math" panose="02040503050406030204" pitchFamily="18" charset="0"/>
+                          </a:rPr>
+                          <m:t>𝜇</m:t>
+                        </m:r>
+                        <m:r>
+                          <a:rPr lang="en-US" i="1" dirty="0">
+                            <a:latin typeface="Cambria Math" panose="02040503050406030204" pitchFamily="18" charset="0"/>
+                          </a:rPr>
+                          <m:t>,</m:t>
+                        </m:r>
+                        <m:sSub>
+                          <m:sSubPr>
+                            <m:ctrlPr>
+                              <a:rPr lang="en-US" i="1">
+                                <a:latin typeface="Cambria Math" panose="02040503050406030204" pitchFamily="18" charset="0"/>
+                              </a:rPr>
+                            </m:ctrlPr>
+                          </m:sSubPr>
+                          <m:e>
+                            <m:r>
+                              <a:rPr lang="en-US" i="1">
+                                <a:latin typeface="Cambria Math" panose="02040503050406030204" pitchFamily="18" charset="0"/>
+                              </a:rPr>
+                              <m:t>𝜔</m:t>
+                            </m:r>
+                          </m:e>
+                          <m:sub>
+                            <m:r>
+                              <a:rPr lang="en-US" i="1">
+                                <a:latin typeface="Cambria Math" panose="02040503050406030204" pitchFamily="18" charset="0"/>
+                              </a:rPr>
+                              <m:t>𝑖</m:t>
+                            </m:r>
+                          </m:sub>
+                        </m:sSub>
+                      </m:e>
+                    </m:d>
+                  </m:oMath>
+                </a14:m>
+                <a:r>
+                  <a:rPr lang="en-US" dirty="0"/>
+                  <a:t>, we can estimate the treatment effect on the treated:</a:t>
+                </a:r>
+              </a:p>
+              <a:p>
+                <a:pPr marL="0" indent="0">
+                  <a:buNone/>
+                </a:pPr>
+                <a14:m>
+                  <m:oMathPara xmlns:m="http://schemas.openxmlformats.org/officeDocument/2006/math">
+                    <m:oMathParaPr>
+                      <m:jc m:val="centerGroup"/>
+                    </m:oMathParaPr>
+                    <m:oMath xmlns:m="http://schemas.openxmlformats.org/officeDocument/2006/math">
+                      <m:r>
+                        <a:rPr lang="en-US" b="0" i="1" dirty="0" smtClean="0">
+                          <a:latin typeface="Cambria Math" panose="02040503050406030204" pitchFamily="18" charset="0"/>
+                        </a:rPr>
+                        <m:t>𝜏</m:t>
+                      </m:r>
+                      <m:r>
+                        <a:rPr lang="en-US" b="0" i="1" dirty="0" smtClean="0">
+                          <a:latin typeface="Cambria Math" panose="02040503050406030204" pitchFamily="18" charset="0"/>
+                        </a:rPr>
+                        <m:t>=</m:t>
+                      </m:r>
+                      <m:nary>
+                        <m:naryPr>
+                          <m:chr m:val="∑"/>
+                          <m:supHide m:val="on"/>
+                          <m:ctrlPr>
+                            <a:rPr lang="en-US" b="0" i="1" dirty="0" smtClean="0">
+                              <a:latin typeface="Cambria Math" panose="02040503050406030204" pitchFamily="18" charset="0"/>
+                            </a:rPr>
+                          </m:ctrlPr>
+                        </m:naryPr>
+                        <m:sub>
+                          <m:r>
+                            <a:rPr lang="en-US" b="0" i="1" dirty="0" smtClean="0">
+                              <a:latin typeface="Cambria Math" panose="02040503050406030204" pitchFamily="18" charset="0"/>
+                            </a:rPr>
+                            <m:t>𝑡</m:t>
+                          </m:r>
+                          <m:r>
+                            <a:rPr lang="en-US" b="0" i="1" dirty="0" smtClean="0">
+                              <a:latin typeface="Cambria Math" panose="02040503050406030204" pitchFamily="18" charset="0"/>
+                            </a:rPr>
+                            <m:t>”≥0</m:t>
+                          </m:r>
+                        </m:sub>
+                        <m:sup/>
+                        <m:e>
+                          <m:sSub>
+                            <m:sSubPr>
+                              <m:ctrlPr>
+                                <a:rPr lang="en-US" b="0" i="1" dirty="0" smtClean="0">
+                                  <a:latin typeface="Cambria Math" panose="02040503050406030204" pitchFamily="18" charset="0"/>
+                                </a:rPr>
+                              </m:ctrlPr>
+                            </m:sSubPr>
+                            <m:e>
+                              <m:r>
+                                <a:rPr lang="en-US" b="0" i="1" dirty="0" smtClean="0">
+                                  <a:latin typeface="Cambria Math" panose="02040503050406030204" pitchFamily="18" charset="0"/>
+                                </a:rPr>
+                                <m:t>𝑌</m:t>
+                              </m:r>
+                            </m:e>
+                            <m:sub>
+                              <m:r>
+                                <a:rPr lang="en-US" b="0" i="1" dirty="0" smtClean="0">
+                                  <a:latin typeface="Cambria Math" panose="02040503050406030204" pitchFamily="18" charset="0"/>
+                                </a:rPr>
+                                <m:t>0</m:t>
+                              </m:r>
+                              <m:r>
+                                <a:rPr lang="en-US" b="0" i="1" dirty="0" smtClean="0">
+                                  <a:latin typeface="Cambria Math" panose="02040503050406030204" pitchFamily="18" charset="0"/>
+                                </a:rPr>
+                                <m:t>𝑡</m:t>
+                              </m:r>
+                              <m:r>
+                                <a:rPr lang="en-US" b="0" i="1" dirty="0" smtClean="0">
+                                  <a:latin typeface="Cambria Math" panose="02040503050406030204" pitchFamily="18" charset="0"/>
+                                </a:rPr>
+                                <m:t>”</m:t>
+                              </m:r>
+                            </m:sub>
+                          </m:sSub>
+                          <m:r>
+                            <a:rPr lang="en-US" b="0" i="1" dirty="0" smtClean="0">
+                              <a:latin typeface="Cambria Math" panose="02040503050406030204" pitchFamily="18" charset="0"/>
+                            </a:rPr>
+                            <m:t>(1)</m:t>
+                          </m:r>
+                        </m:e>
+                      </m:nary>
+                      <m:r>
+                        <a:rPr lang="en-US" b="0" i="1" dirty="0" smtClean="0">
+                          <a:latin typeface="Cambria Math" panose="02040503050406030204" pitchFamily="18" charset="0"/>
+                        </a:rPr>
+                        <m:t>−</m:t>
+                      </m:r>
+                      <m:nary>
+                        <m:naryPr>
+                          <m:chr m:val="∑"/>
+                          <m:supHide m:val="on"/>
+                          <m:ctrlPr>
+                            <a:rPr lang="en-US" b="0" i="1" dirty="0" smtClean="0">
+                              <a:latin typeface="Cambria Math" panose="02040503050406030204" pitchFamily="18" charset="0"/>
+                            </a:rPr>
+                          </m:ctrlPr>
+                        </m:naryPr>
+                        <m:sub>
+                          <m:r>
+                            <a:rPr lang="en-US" b="0" i="1" dirty="0" smtClean="0">
+                              <a:latin typeface="Cambria Math" panose="02040503050406030204" pitchFamily="18" charset="0"/>
+                            </a:rPr>
+                            <m:t>𝑡</m:t>
+                          </m:r>
+                          <m:r>
+                            <a:rPr lang="en-US" b="0" i="1" dirty="0" smtClean="0">
+                              <a:latin typeface="Cambria Math" panose="02040503050406030204" pitchFamily="18" charset="0"/>
+                            </a:rPr>
+                            <m:t>”≥0</m:t>
+                          </m:r>
+                        </m:sub>
+                        <m:sup/>
+                        <m:e>
+                          <m:acc>
+                            <m:accPr>
+                              <m:chr m:val="̂"/>
+                              <m:ctrlPr>
+                                <a:rPr lang="en-US" b="0" i="1" dirty="0" smtClean="0">
+                                  <a:latin typeface="Cambria Math" panose="02040503050406030204" pitchFamily="18" charset="0"/>
+                                </a:rPr>
+                              </m:ctrlPr>
+                            </m:accPr>
+                            <m:e>
+                              <m:sSub>
+                                <m:sSubPr>
+                                  <m:ctrlPr>
+                                    <a:rPr lang="en-US" i="1" dirty="0">
+                                      <a:latin typeface="Cambria Math" panose="02040503050406030204" pitchFamily="18" charset="0"/>
+                                    </a:rPr>
+                                  </m:ctrlPr>
+                                </m:sSubPr>
+                                <m:e>
+                                  <m:r>
+                                    <a:rPr lang="en-US" i="1" dirty="0">
+                                      <a:latin typeface="Cambria Math" panose="02040503050406030204" pitchFamily="18" charset="0"/>
+                                    </a:rPr>
+                                    <m:t>𝑌</m:t>
+                                  </m:r>
+                                </m:e>
+                                <m:sub>
+                                  <m:r>
+                                    <a:rPr lang="en-US" i="1" dirty="0">
+                                      <a:latin typeface="Cambria Math" panose="02040503050406030204" pitchFamily="18" charset="0"/>
+                                    </a:rPr>
+                                    <m:t>0</m:t>
+                                  </m:r>
+                                  <m:r>
+                                    <a:rPr lang="en-US" i="1" dirty="0">
+                                      <a:latin typeface="Cambria Math" panose="02040503050406030204" pitchFamily="18" charset="0"/>
+                                    </a:rPr>
+                                    <m:t>𝑡</m:t>
+                                  </m:r>
+                                  <m:r>
+                                    <a:rPr lang="en-US" i="1" dirty="0">
+                                      <a:latin typeface="Cambria Math" panose="02040503050406030204" pitchFamily="18" charset="0"/>
+                                    </a:rPr>
+                                    <m:t>”</m:t>
+                                  </m:r>
+                                </m:sub>
+                              </m:sSub>
+                            </m:e>
+                          </m:acc>
+                          <m:d>
+                            <m:dPr>
+                              <m:ctrlPr>
+                                <a:rPr lang="en-US" i="1" dirty="0">
+                                  <a:latin typeface="Cambria Math" panose="02040503050406030204" pitchFamily="18" charset="0"/>
+                                </a:rPr>
+                              </m:ctrlPr>
+                            </m:dPr>
+                            <m:e>
+                              <m:r>
+                                <a:rPr lang="en-US" i="1" dirty="0">
+                                  <a:latin typeface="Cambria Math" panose="02040503050406030204" pitchFamily="18" charset="0"/>
+                                </a:rPr>
+                                <m:t>0</m:t>
+                              </m:r>
+                            </m:e>
+                          </m:d>
+                        </m:e>
+                      </m:nary>
+                    </m:oMath>
+                  </m:oMathPara>
+                </a14:m>
+                <a:endParaRPr lang="en-US" dirty="0"/>
+              </a:p>
+              <a:p>
+                <a:r>
+                  <a:rPr lang="en-US" dirty="0"/>
+                  <a:t>How do we do inference and get a p-value</a:t>
+                </a:r>
+                <a:r>
+                  <a:rPr lang="en-US"/>
+                  <a:t>/confidence-interval?</a:t>
+                </a:r>
+                <a:endParaRPr lang="en-US" dirty="0"/>
+              </a:p>
+            </p:txBody>
+          </p:sp>
+        </mc:Choice>
+        <mc:Fallback>
+          <p:sp>
+            <p:nvSpPr>
+              <p:cNvPr id="3" name="Content Placeholder 2">
+                <a:extLst>
+                  <a:ext uri="{FF2B5EF4-FFF2-40B4-BE49-F238E27FC236}">
+                    <a16:creationId xmlns:a16="http://schemas.microsoft.com/office/drawing/2014/main" id="{F7097B67-9A3D-C2EB-7C6B-402C42DD0180}"/>
+                  </a:ext>
+                </a:extLst>
+              </p:cNvPr>
+              <p:cNvSpPr>
+                <a:spLocks noGrp="1" noRot="1" noChangeAspect="1" noMove="1" noResize="1" noEditPoints="1" noAdjustHandles="1" noChangeArrowheads="1" noChangeShapeType="1" noTextEdit="1"/>
+              </p:cNvSpPr>
+              <p:nvPr>
+                <p:ph idx="1"/>
+              </p:nvPr>
+            </p:nvSpPr>
+            <p:spPr>
+              <a:blipFill>
+                <a:blip r:embed="rId2"/>
+                <a:stretch>
+                  <a:fillRect l="-1086" t="-18314"/>
+                </a:stretch>
+              </a:blipFill>
+            </p:spPr>
+            <p:txBody>
+              <a:bodyPr/>
+              <a:lstStyle/>
+              <a:p>
+                <a:r>
+                  <a:rPr lang="en-US">
+                    <a:noFill/>
+                  </a:rPr>
+                  <a:t> </a:t>
+                </a:r>
+              </a:p>
+            </p:txBody>
+          </p:sp>
+        </mc:Fallback>
+      </mc:AlternateContent>
+    </p:spTree>
+    <p:extLst>
+      <p:ext uri="{BB962C8B-B14F-4D97-AF65-F5344CB8AC3E}">
+        <p14:creationId xmlns:p14="http://schemas.microsoft.com/office/powerpoint/2010/main" val="2548315957"/>
+      </p:ext>
+    </p:extLst>
+  </p:cSld>
+  <p:clrMapOvr>
+    <a:masterClrMapping/>
+  </p:clrMapOvr>
+</p:sld>
+</file>
+
+<file path=ppt/slides/slide27.xml><?xml version="1.0" encoding="utf-8"?>
 <p:sld xmlns:a="http://schemas.openxmlformats.org/drawingml/2006/main" xmlns:r="http://schemas.openxmlformats.org/officeDocument/2006/relationships" xmlns:p="http://schemas.openxmlformats.org/presentationml/2006/main">
   <p:cSld>
     <p:spTree>
@@ -14133,7 +15195,7 @@
 </p:sld>
 </file>
 
-<file path=ppt/slides/slide26.xml><?xml version="1.0" encoding="utf-8"?>
+<file path=ppt/slides/slide28.xml><?xml version="1.0" encoding="utf-8"?>
 <p:sld xmlns:a="http://schemas.openxmlformats.org/drawingml/2006/main" xmlns:r="http://schemas.openxmlformats.org/officeDocument/2006/relationships" xmlns:p="http://schemas.openxmlformats.org/presentationml/2006/main">
   <p:cSld>
     <p:spTree>
@@ -14216,7 +15278,7 @@
 </p:sld>
 </file>
 
-<file path=ppt/slides/slide27.xml><?xml version="1.0" encoding="utf-8"?>
+<file path=ppt/slides/slide29.xml><?xml version="1.0" encoding="utf-8"?>
 <p:sld xmlns:a="http://schemas.openxmlformats.org/drawingml/2006/main" xmlns:r="http://schemas.openxmlformats.org/officeDocument/2006/relationships" xmlns:p="http://schemas.openxmlformats.org/presentationml/2006/main">
   <p:cSld>
     <p:spTree>
@@ -14299,7 +15361,142 @@
 </p:sld>
 </file>
 
-<file path=ppt/slides/slide28.xml><?xml version="1.0" encoding="utf-8"?>
+<file path=ppt/slides/slide3.xml><?xml version="1.0" encoding="utf-8"?>
+<p:sld xmlns:a="http://schemas.openxmlformats.org/drawingml/2006/main" xmlns:r="http://schemas.openxmlformats.org/officeDocument/2006/relationships" xmlns:p="http://schemas.openxmlformats.org/presentationml/2006/main">
+  <p:cSld>
+    <p:spTree>
+      <p:nvGrpSpPr>
+        <p:cNvPr id="1" name=""/>
+        <p:cNvGrpSpPr/>
+        <p:nvPr/>
+      </p:nvGrpSpPr>
+      <p:grpSpPr>
+        <a:xfrm>
+          <a:off x="0" y="0"/>
+          <a:ext cx="0" cy="0"/>
+          <a:chOff x="0" y="0"/>
+          <a:chExt cx="0" cy="0"/>
+        </a:xfrm>
+      </p:grpSpPr>
+      <p:sp>
+        <p:nvSpPr>
+          <p:cNvPr id="2" name="Title 1">
+            <a:extLst>
+              <a:ext uri="{FF2B5EF4-FFF2-40B4-BE49-F238E27FC236}">
+                <a16:creationId xmlns:a16="http://schemas.microsoft.com/office/drawing/2014/main" id="{8D743B44-8F3E-9A48-977A-B0F4304BD9F7}"/>
+              </a:ext>
+            </a:extLst>
+          </p:cNvPr>
+          <p:cNvSpPr>
+            <a:spLocks noGrp="1"/>
+          </p:cNvSpPr>
+          <p:nvPr>
+            <p:ph type="title"/>
+          </p:nvPr>
+        </p:nvSpPr>
+        <p:spPr/>
+        <p:txBody>
+          <a:bodyPr/>
+          <a:lstStyle/>
+          <a:p>
+            <a:r>
+              <a:rPr lang="en-US" dirty="0"/>
+              <a:t>Overview</a:t>
+            </a:r>
+          </a:p>
+        </p:txBody>
+      </p:sp>
+      <p:sp>
+        <p:nvSpPr>
+          <p:cNvPr id="3" name="Content Placeholder 2">
+            <a:extLst>
+              <a:ext uri="{FF2B5EF4-FFF2-40B4-BE49-F238E27FC236}">
+                <a16:creationId xmlns:a16="http://schemas.microsoft.com/office/drawing/2014/main" id="{BE00AD45-E807-C644-8514-9D2CE7B7F813}"/>
+              </a:ext>
+            </a:extLst>
+          </p:cNvPr>
+          <p:cNvSpPr>
+            <a:spLocks noGrp="1"/>
+          </p:cNvSpPr>
+          <p:nvPr>
+            <p:ph idx="1"/>
+          </p:nvPr>
+        </p:nvSpPr>
+        <p:spPr/>
+        <p:txBody>
+          <a:bodyPr>
+            <a:normAutofit/>
+          </a:bodyPr>
+          <a:lstStyle/>
+          <a:p>
+            <a:r>
+              <a:rPr lang="en-US" dirty="0"/>
+              <a:t>This presentation will primarily cover how panel models can be used for causal inference, particularly difference-in-difference (</a:t>
+            </a:r>
+            <a:r>
+              <a:rPr lang="en-US" dirty="0" err="1"/>
+              <a:t>DiD</a:t>
+            </a:r>
+            <a:r>
+              <a:rPr lang="en-US" dirty="0"/>
+              <a:t>) and synthetic control-style models (SC).</a:t>
+            </a:r>
+          </a:p>
+          <a:p>
+            <a:r>
+              <a:rPr lang="en-US" dirty="0"/>
+              <a:t>We will also discuss the role of prediction in panel models</a:t>
+            </a:r>
+          </a:p>
+          <a:p>
+            <a:r>
+              <a:rPr lang="en-US" dirty="0" err="1"/>
+              <a:t>DiD</a:t>
+            </a:r>
+            <a:r>
+              <a:rPr lang="en-US" dirty="0"/>
+              <a:t> is the most popular quasi-experimental design in economics for causal inference.</a:t>
+            </a:r>
+          </a:p>
+          <a:p>
+            <a:pPr lvl="1"/>
+            <a:r>
+              <a:rPr lang="en-US" dirty="0"/>
+              <a:t>One quarter of NBER Working Paper series used diff-in-diff; and 16% of articles in top five economic journals (</a:t>
+            </a:r>
+            <a:r>
+              <a:rPr lang="en-US" dirty="0">
+                <a:hlinkClick r:id="rId2"/>
+              </a:rPr>
+              <a:t>Currie et al, 2020</a:t>
+            </a:r>
+            <a:r>
+              <a:rPr lang="en-US" dirty="0"/>
+              <a:t>)</a:t>
+            </a:r>
+          </a:p>
+          <a:p>
+            <a:r>
+              <a:rPr lang="en-US" dirty="0"/>
+              <a:t>It exploits panel data to estimate causal impacts</a:t>
+            </a:r>
+          </a:p>
+        </p:txBody>
+      </p:sp>
+    </p:spTree>
+    <p:extLst>
+      <p:ext uri="{BB962C8B-B14F-4D97-AF65-F5344CB8AC3E}">
+        <p14:creationId xmlns:p14="http://schemas.microsoft.com/office/powerpoint/2010/main" val="314643715"/>
+      </p:ext>
+    </p:extLst>
+  </p:cSld>
+  <p:clrMapOvr>
+    <a:masterClrMapping/>
+  </p:clrMapOvr>
+</p:sld>
+</file>
+
+<file path=ppt/slides/slide30.xml><?xml version="1.0" encoding="utf-8"?>
 <p:sld xmlns:a="http://schemas.openxmlformats.org/drawingml/2006/main" xmlns:r="http://schemas.openxmlformats.org/officeDocument/2006/relationships" xmlns:p="http://schemas.openxmlformats.org/presentationml/2006/main">
   <p:cSld>
     <p:spTree>
@@ -14395,7 +15592,7 @@
 </p:sld>
 </file>
 
-<file path=ppt/slides/slide29.xml><?xml version="1.0" encoding="utf-8"?>
+<file path=ppt/slides/slide31.xml><?xml version="1.0" encoding="utf-8"?>
 <p:sld xmlns:a="http://schemas.openxmlformats.org/drawingml/2006/main" xmlns:r="http://schemas.openxmlformats.org/officeDocument/2006/relationships" xmlns:p="http://schemas.openxmlformats.org/presentationml/2006/main">
   <p:cSld>
     <p:spTree>
@@ -15100,142 +16297,7 @@
 </p:sld>
 </file>
 
-<file path=ppt/slides/slide3.xml><?xml version="1.0" encoding="utf-8"?>
-<p:sld xmlns:a="http://schemas.openxmlformats.org/drawingml/2006/main" xmlns:r="http://schemas.openxmlformats.org/officeDocument/2006/relationships" xmlns:p="http://schemas.openxmlformats.org/presentationml/2006/main">
-  <p:cSld>
-    <p:spTree>
-      <p:nvGrpSpPr>
-        <p:cNvPr id="1" name=""/>
-        <p:cNvGrpSpPr/>
-        <p:nvPr/>
-      </p:nvGrpSpPr>
-      <p:grpSpPr>
-        <a:xfrm>
-          <a:off x="0" y="0"/>
-          <a:ext cx="0" cy="0"/>
-          <a:chOff x="0" y="0"/>
-          <a:chExt cx="0" cy="0"/>
-        </a:xfrm>
-      </p:grpSpPr>
-      <p:sp>
-        <p:nvSpPr>
-          <p:cNvPr id="2" name="Title 1">
-            <a:extLst>
-              <a:ext uri="{FF2B5EF4-FFF2-40B4-BE49-F238E27FC236}">
-                <a16:creationId xmlns:a16="http://schemas.microsoft.com/office/drawing/2014/main" id="{8D743B44-8F3E-9A48-977A-B0F4304BD9F7}"/>
-              </a:ext>
-            </a:extLst>
-          </p:cNvPr>
-          <p:cNvSpPr>
-            <a:spLocks noGrp="1"/>
-          </p:cNvSpPr>
-          <p:nvPr>
-            <p:ph type="title"/>
-          </p:nvPr>
-        </p:nvSpPr>
-        <p:spPr/>
-        <p:txBody>
-          <a:bodyPr/>
-          <a:lstStyle/>
-          <a:p>
-            <a:r>
-              <a:rPr lang="en-US" dirty="0"/>
-              <a:t>Overview</a:t>
-            </a:r>
-          </a:p>
-        </p:txBody>
-      </p:sp>
-      <p:sp>
-        <p:nvSpPr>
-          <p:cNvPr id="3" name="Content Placeholder 2">
-            <a:extLst>
-              <a:ext uri="{FF2B5EF4-FFF2-40B4-BE49-F238E27FC236}">
-                <a16:creationId xmlns:a16="http://schemas.microsoft.com/office/drawing/2014/main" id="{BE00AD45-E807-C644-8514-9D2CE7B7F813}"/>
-              </a:ext>
-            </a:extLst>
-          </p:cNvPr>
-          <p:cNvSpPr>
-            <a:spLocks noGrp="1"/>
-          </p:cNvSpPr>
-          <p:nvPr>
-            <p:ph idx="1"/>
-          </p:nvPr>
-        </p:nvSpPr>
-        <p:spPr/>
-        <p:txBody>
-          <a:bodyPr>
-            <a:normAutofit/>
-          </a:bodyPr>
-          <a:lstStyle/>
-          <a:p>
-            <a:r>
-              <a:rPr lang="en-US" dirty="0"/>
-              <a:t>This presentation will primarily cover how panel models can be used for causal inference, particularly difference-in-difference (</a:t>
-            </a:r>
-            <a:r>
-              <a:rPr lang="en-US" dirty="0" err="1"/>
-              <a:t>DiD</a:t>
-            </a:r>
-            <a:r>
-              <a:rPr lang="en-US" dirty="0"/>
-              <a:t>) and synthetic control-style models (SC).</a:t>
-            </a:r>
-          </a:p>
-          <a:p>
-            <a:r>
-              <a:rPr lang="en-US" dirty="0"/>
-              <a:t>We will also discuss the role of prediction in panel models</a:t>
-            </a:r>
-          </a:p>
-          <a:p>
-            <a:r>
-              <a:rPr lang="en-US" dirty="0" err="1"/>
-              <a:t>DiD</a:t>
-            </a:r>
-            <a:r>
-              <a:rPr lang="en-US" dirty="0"/>
-              <a:t> is the most popular quasi-experimental design in economics for causal inference.</a:t>
-            </a:r>
-          </a:p>
-          <a:p>
-            <a:pPr lvl="1"/>
-            <a:r>
-              <a:rPr lang="en-US" dirty="0"/>
-              <a:t>One quarter of NBER Working Paper series used diff-in-diff; and 16% of articles in top five economic journals (</a:t>
-            </a:r>
-            <a:r>
-              <a:rPr lang="en-US" dirty="0">
-                <a:hlinkClick r:id="rId2"/>
-              </a:rPr>
-              <a:t>Currie et al, 2020</a:t>
-            </a:r>
-            <a:r>
-              <a:rPr lang="en-US" dirty="0"/>
-              <a:t>)</a:t>
-            </a:r>
-          </a:p>
-          <a:p>
-            <a:r>
-              <a:rPr lang="en-US" dirty="0"/>
-              <a:t>It exploits panel data to estimate causal impacts</a:t>
-            </a:r>
-          </a:p>
-        </p:txBody>
-      </p:sp>
-    </p:spTree>
-    <p:extLst>
-      <p:ext uri="{BB962C8B-B14F-4D97-AF65-F5344CB8AC3E}">
-        <p14:creationId xmlns:p14="http://schemas.microsoft.com/office/powerpoint/2010/main" val="314643715"/>
-      </p:ext>
-    </p:extLst>
-  </p:cSld>
-  <p:clrMapOvr>
-    <a:masterClrMapping/>
-  </p:clrMapOvr>
-</p:sld>
-</file>
-
-<file path=ppt/slides/slide30.xml><?xml version="1.0" encoding="utf-8"?>
+<file path=ppt/slides/slide32.xml><?xml version="1.0" encoding="utf-8"?>
 <p:sld xmlns:a="http://schemas.openxmlformats.org/drawingml/2006/main" xmlns:r="http://schemas.openxmlformats.org/officeDocument/2006/relationships" xmlns:p="http://schemas.openxmlformats.org/presentationml/2006/main">
   <p:cSld>
     <p:spTree>
@@ -16074,7 +17136,7 @@
 </p:sld>
 </file>
 
-<file path=ppt/slides/slide31.xml><?xml version="1.0" encoding="utf-8"?>
+<file path=ppt/slides/slide33.xml><?xml version="1.0" encoding="utf-8"?>
 <p:sld xmlns:a="http://schemas.openxmlformats.org/drawingml/2006/main" xmlns:r="http://schemas.openxmlformats.org/officeDocument/2006/relationships" xmlns:p="http://schemas.openxmlformats.org/presentationml/2006/main">
   <p:cSld>
     <p:spTree>
@@ -16631,7 +17693,7 @@
 </p:sld>
 </file>
 
-<file path=ppt/slides/slide32.xml><?xml version="1.0" encoding="utf-8"?>
+<file path=ppt/slides/slide34.xml><?xml version="1.0" encoding="utf-8"?>
 <p:sld xmlns:a="http://schemas.openxmlformats.org/drawingml/2006/main" xmlns:r="http://schemas.openxmlformats.org/officeDocument/2006/relationships" xmlns:p="http://schemas.openxmlformats.org/presentationml/2006/main">
   <p:cSld>
     <p:spTree>
@@ -18303,7 +19365,7 @@
 </p:sld>
 </file>
 
-<file path=ppt/slides/slide33.xml><?xml version="1.0" encoding="utf-8"?>
+<file path=ppt/slides/slide35.xml><?xml version="1.0" encoding="utf-8"?>
 <p:sld xmlns:a="http://schemas.openxmlformats.org/drawingml/2006/main" xmlns:r="http://schemas.openxmlformats.org/officeDocument/2006/relationships" xmlns:p="http://schemas.openxmlformats.org/presentationml/2006/main">
   <p:cSld>
     <p:spTree>
@@ -19936,7 +20998,7 @@
 </p:sld>
 </file>
 
-<file path=ppt/slides/slide34.xml><?xml version="1.0" encoding="utf-8"?>
+<file path=ppt/slides/slide36.xml><?xml version="1.0" encoding="utf-8"?>
 <p:sld xmlns:a="http://schemas.openxmlformats.org/drawingml/2006/main" xmlns:r="http://schemas.openxmlformats.org/officeDocument/2006/relationships" xmlns:p="http://schemas.openxmlformats.org/presentationml/2006/main">
   <p:cSld>
     <p:spTree>
@@ -20058,7 +21120,7 @@
 </p:sld>
 </file>
 
-<file path=ppt/slides/slide35.xml><?xml version="1.0" encoding="utf-8"?>
+<file path=ppt/slides/slide37.xml><?xml version="1.0" encoding="utf-8"?>
 <p:sld xmlns:a="http://schemas.openxmlformats.org/drawingml/2006/main" xmlns:r="http://schemas.openxmlformats.org/officeDocument/2006/relationships" xmlns:p="http://schemas.openxmlformats.org/presentationml/2006/main">
   <p:cSld>
     <p:spTree>
@@ -22205,7 +23267,7 @@
 </p:sld>
 </file>
 
-<file path=ppt/slides/slide36.xml><?xml version="1.0" encoding="utf-8"?>
+<file path=ppt/slides/slide38.xml><?xml version="1.0" encoding="utf-8"?>
 <p:sld xmlns:a="http://schemas.openxmlformats.org/drawingml/2006/main" xmlns:r="http://schemas.openxmlformats.org/officeDocument/2006/relationships" xmlns:p="http://schemas.openxmlformats.org/presentationml/2006/main">
   <p:cSld>
     <p:spTree>
@@ -24388,7 +25450,7 @@
 </p:sld>
 </file>
 
-<file path=ppt/slides/slide37.xml><?xml version="1.0" encoding="utf-8"?>
+<file path=ppt/slides/slide39.xml><?xml version="1.0" encoding="utf-8"?>
 <p:sld xmlns:a="http://schemas.openxmlformats.org/drawingml/2006/main" xmlns:r="http://schemas.openxmlformats.org/officeDocument/2006/relationships" xmlns:p="http://schemas.openxmlformats.org/presentationml/2006/main">
   <p:cSld>
     <p:spTree>
@@ -25283,7 +26345,90 @@
 </p:sld>
 </file>
 
-<file path=ppt/slides/slide38.xml><?xml version="1.0" encoding="utf-8"?>
+<file path=ppt/slides/slide4.xml><?xml version="1.0" encoding="utf-8"?>
+<p:sld xmlns:a="http://schemas.openxmlformats.org/drawingml/2006/main" xmlns:r="http://schemas.openxmlformats.org/officeDocument/2006/relationships" xmlns:p="http://schemas.openxmlformats.org/presentationml/2006/main">
+  <p:cSld>
+    <p:spTree>
+      <p:nvGrpSpPr>
+        <p:cNvPr id="1" name=""/>
+        <p:cNvGrpSpPr/>
+        <p:nvPr/>
+      </p:nvGrpSpPr>
+      <p:grpSpPr>
+        <a:xfrm>
+          <a:off x="0" y="0"/>
+          <a:ext cx="0" cy="0"/>
+          <a:chOff x="0" y="0"/>
+          <a:chExt cx="0" cy="0"/>
+        </a:xfrm>
+      </p:grpSpPr>
+      <p:sp>
+        <p:nvSpPr>
+          <p:cNvPr id="2" name="Title 1">
+            <a:extLst>
+              <a:ext uri="{FF2B5EF4-FFF2-40B4-BE49-F238E27FC236}">
+                <a16:creationId xmlns:a16="http://schemas.microsoft.com/office/drawing/2014/main" id="{864D7FAD-5F9A-B22A-54C0-7675F1160B89}"/>
+              </a:ext>
+            </a:extLst>
+          </p:cNvPr>
+          <p:cNvSpPr>
+            <a:spLocks noGrp="1"/>
+          </p:cNvSpPr>
+          <p:nvPr>
+            <p:ph type="title"/>
+          </p:nvPr>
+        </p:nvSpPr>
+        <p:spPr/>
+        <p:txBody>
+          <a:bodyPr/>
+          <a:lstStyle/>
+          <a:p>
+            <a:r>
+              <a:rPr lang="en-US" dirty="0"/>
+              <a:t>Panel Data</a:t>
+            </a:r>
+          </a:p>
+        </p:txBody>
+      </p:sp>
+      <p:sp>
+        <p:nvSpPr>
+          <p:cNvPr id="3" name="Text Placeholder 2">
+            <a:extLst>
+              <a:ext uri="{FF2B5EF4-FFF2-40B4-BE49-F238E27FC236}">
+                <a16:creationId xmlns:a16="http://schemas.microsoft.com/office/drawing/2014/main" id="{971234BC-A8A6-76BA-6036-A2E7B653B008}"/>
+              </a:ext>
+            </a:extLst>
+          </p:cNvPr>
+          <p:cNvSpPr>
+            <a:spLocks noGrp="1"/>
+          </p:cNvSpPr>
+          <p:nvPr>
+            <p:ph type="body" idx="1"/>
+          </p:nvPr>
+        </p:nvSpPr>
+        <p:spPr/>
+        <p:txBody>
+          <a:bodyPr/>
+          <a:lstStyle/>
+          <a:p>
+            <a:endParaRPr lang="en-US"/>
+          </a:p>
+        </p:txBody>
+      </p:sp>
+    </p:spTree>
+    <p:extLst>
+      <p:ext uri="{BB962C8B-B14F-4D97-AF65-F5344CB8AC3E}">
+        <p14:creationId xmlns:p14="http://schemas.microsoft.com/office/powerpoint/2010/main" val="4092594043"/>
+      </p:ext>
+    </p:extLst>
+  </p:cSld>
+  <p:clrMapOvr>
+    <a:masterClrMapping/>
+  </p:clrMapOvr>
+</p:sld>
+</file>
+
+<file path=ppt/slides/slide40.xml><?xml version="1.0" encoding="utf-8"?>
 <p:sld xmlns:a="http://schemas.openxmlformats.org/drawingml/2006/main" xmlns:r="http://schemas.openxmlformats.org/officeDocument/2006/relationships" xmlns:p="http://schemas.openxmlformats.org/presentationml/2006/main">
   <p:cSld>
     <p:spTree>
@@ -25831,7 +26976,7 @@
 </p:sld>
 </file>
 
-<file path=ppt/slides/slide39.xml><?xml version="1.0" encoding="utf-8"?>
+<file path=ppt/slides/slide41.xml><?xml version="1.0" encoding="utf-8"?>
 <p:sld xmlns:a="http://schemas.openxmlformats.org/drawingml/2006/main" xmlns:r="http://schemas.openxmlformats.org/officeDocument/2006/relationships" xmlns:p="http://schemas.openxmlformats.org/presentationml/2006/main">
   <p:cSld>
     <p:spTree>
@@ -26103,90 +27248,7 @@
 </p:sld>
 </file>
 
-<file path=ppt/slides/slide4.xml><?xml version="1.0" encoding="utf-8"?>
-<p:sld xmlns:a="http://schemas.openxmlformats.org/drawingml/2006/main" xmlns:r="http://schemas.openxmlformats.org/officeDocument/2006/relationships" xmlns:p="http://schemas.openxmlformats.org/presentationml/2006/main">
-  <p:cSld>
-    <p:spTree>
-      <p:nvGrpSpPr>
-        <p:cNvPr id="1" name=""/>
-        <p:cNvGrpSpPr/>
-        <p:nvPr/>
-      </p:nvGrpSpPr>
-      <p:grpSpPr>
-        <a:xfrm>
-          <a:off x="0" y="0"/>
-          <a:ext cx="0" cy="0"/>
-          <a:chOff x="0" y="0"/>
-          <a:chExt cx="0" cy="0"/>
-        </a:xfrm>
-      </p:grpSpPr>
-      <p:sp>
-        <p:nvSpPr>
-          <p:cNvPr id="2" name="Title 1">
-            <a:extLst>
-              <a:ext uri="{FF2B5EF4-FFF2-40B4-BE49-F238E27FC236}">
-                <a16:creationId xmlns:a16="http://schemas.microsoft.com/office/drawing/2014/main" id="{864D7FAD-5F9A-B22A-54C0-7675F1160B89}"/>
-              </a:ext>
-            </a:extLst>
-          </p:cNvPr>
-          <p:cNvSpPr>
-            <a:spLocks noGrp="1"/>
-          </p:cNvSpPr>
-          <p:nvPr>
-            <p:ph type="title"/>
-          </p:nvPr>
-        </p:nvSpPr>
-        <p:spPr/>
-        <p:txBody>
-          <a:bodyPr/>
-          <a:lstStyle/>
-          <a:p>
-            <a:r>
-              <a:rPr lang="en-US" dirty="0"/>
-              <a:t>Panel Data</a:t>
-            </a:r>
-          </a:p>
-        </p:txBody>
-      </p:sp>
-      <p:sp>
-        <p:nvSpPr>
-          <p:cNvPr id="3" name="Text Placeholder 2">
-            <a:extLst>
-              <a:ext uri="{FF2B5EF4-FFF2-40B4-BE49-F238E27FC236}">
-                <a16:creationId xmlns:a16="http://schemas.microsoft.com/office/drawing/2014/main" id="{971234BC-A8A6-76BA-6036-A2E7B653B008}"/>
-              </a:ext>
-            </a:extLst>
-          </p:cNvPr>
-          <p:cNvSpPr>
-            <a:spLocks noGrp="1"/>
-          </p:cNvSpPr>
-          <p:nvPr>
-            <p:ph type="body" idx="1"/>
-          </p:nvPr>
-        </p:nvSpPr>
-        <p:spPr/>
-        <p:txBody>
-          <a:bodyPr/>
-          <a:lstStyle/>
-          <a:p>
-            <a:endParaRPr lang="en-US"/>
-          </a:p>
-        </p:txBody>
-      </p:sp>
-    </p:spTree>
-    <p:extLst>
-      <p:ext uri="{BB962C8B-B14F-4D97-AF65-F5344CB8AC3E}">
-        <p14:creationId xmlns:p14="http://schemas.microsoft.com/office/powerpoint/2010/main" val="4092594043"/>
-      </p:ext>
-    </p:extLst>
-  </p:cSld>
-  <p:clrMapOvr>
-    <a:masterClrMapping/>
-  </p:clrMapOvr>
-</p:sld>
-</file>
-
-<file path=ppt/slides/slide40.xml><?xml version="1.0" encoding="utf-8"?>
+<file path=ppt/slides/slide42.xml><?xml version="1.0" encoding="utf-8"?>
 <p:sld xmlns:a="http://schemas.openxmlformats.org/drawingml/2006/main" xmlns:r="http://schemas.openxmlformats.org/officeDocument/2006/relationships" xmlns:p="http://schemas.openxmlformats.org/presentationml/2006/main">
   <p:cSld>
     <p:spTree>
@@ -26679,7 +27741,7 @@
 </p:sld>
 </file>
 
-<file path=ppt/slides/slide41.xml><?xml version="1.0" encoding="utf-8"?>
+<file path=ppt/slides/slide43.xml><?xml version="1.0" encoding="utf-8"?>
 <p:sld xmlns:a="http://schemas.openxmlformats.org/drawingml/2006/main" xmlns:r="http://schemas.openxmlformats.org/officeDocument/2006/relationships" xmlns:p="http://schemas.openxmlformats.org/presentationml/2006/main">
   <p:cSld>
     <p:spTree>
@@ -27733,7 +28795,7 @@
 </p:sld>
 </file>
 
-<file path=ppt/slides/slide42.xml><?xml version="1.0" encoding="utf-8"?>
+<file path=ppt/slides/slide44.xml><?xml version="1.0" encoding="utf-8"?>
 <p:sld xmlns:a="http://schemas.openxmlformats.org/drawingml/2006/main" xmlns:r="http://schemas.openxmlformats.org/officeDocument/2006/relationships" xmlns:p="http://schemas.openxmlformats.org/presentationml/2006/main">
   <p:cSld>
     <p:spTree>
@@ -27816,7 +28878,7 @@
 </p:sld>
 </file>
 
-<file path=ppt/slides/slide43.xml><?xml version="1.0" encoding="utf-8"?>
+<file path=ppt/slides/slide45.xml><?xml version="1.0" encoding="utf-8"?>
 <p:sld xmlns:a="http://schemas.openxmlformats.org/drawingml/2006/main" xmlns:r="http://schemas.openxmlformats.org/officeDocument/2006/relationships" xmlns:p="http://schemas.openxmlformats.org/presentationml/2006/main">
   <p:cSld>
     <p:spTree>
@@ -27983,7 +29045,7 @@
 </p:sld>
 </file>
 
-<file path=ppt/slides/slide44.xml><?xml version="1.0" encoding="utf-8"?>
+<file path=ppt/slides/slide46.xml><?xml version="1.0" encoding="utf-8"?>
 <p:sld xmlns:a="http://schemas.openxmlformats.org/drawingml/2006/main" xmlns:r="http://schemas.openxmlformats.org/officeDocument/2006/relationships" xmlns:p="http://schemas.openxmlformats.org/presentationml/2006/main">
   <p:cSld>
     <p:spTree>
@@ -28830,7 +29892,7 @@
 </p:sld>
 </file>
 
-<file path=ppt/slides/slide45.xml><?xml version="1.0" encoding="utf-8"?>
+<file path=ppt/slides/slide47.xml><?xml version="1.0" encoding="utf-8"?>
 <p:sld xmlns:a="http://schemas.openxmlformats.org/drawingml/2006/main" xmlns:r="http://schemas.openxmlformats.org/officeDocument/2006/relationships" xmlns:p="http://schemas.openxmlformats.org/presentationml/2006/main">
   <p:cSld>
     <p:spTree>
@@ -29768,7 +30830,7 @@
 </p:sld>
 </file>
 
-<file path=ppt/slides/slide46.xml><?xml version="1.0" encoding="utf-8"?>
+<file path=ppt/slides/slide48.xml><?xml version="1.0" encoding="utf-8"?>
 <p:sld xmlns:a="http://schemas.openxmlformats.org/drawingml/2006/main" xmlns:r="http://schemas.openxmlformats.org/officeDocument/2006/relationships" xmlns:p="http://schemas.openxmlformats.org/presentationml/2006/main">
   <p:cSld>
     <p:spTree>
@@ -29860,7 +30922,7 @@
 </p:sld>
 </file>
 
-<file path=ppt/slides/slide47.xml><?xml version="1.0" encoding="utf-8"?>
+<file path=ppt/slides/slide49.xml><?xml version="1.0" encoding="utf-8"?>
 <p:sld xmlns:a="http://schemas.openxmlformats.org/drawingml/2006/main" xmlns:r="http://schemas.openxmlformats.org/officeDocument/2006/relationships" xmlns:p="http://schemas.openxmlformats.org/presentationml/2006/main">
   <p:cSld>
     <p:spTree>
@@ -30804,7 +31866,1054 @@
 </p:sld>
 </file>
 
-<file path=ppt/slides/slide48.xml><?xml version="1.0" encoding="utf-8"?>
+<file path=ppt/slides/slide5.xml><?xml version="1.0" encoding="utf-8"?>
+<p:sld xmlns:a="http://schemas.openxmlformats.org/drawingml/2006/main" xmlns:r="http://schemas.openxmlformats.org/officeDocument/2006/relationships" xmlns:p="http://schemas.openxmlformats.org/presentationml/2006/main">
+  <p:cSld>
+    <p:spTree>
+      <p:nvGrpSpPr>
+        <p:cNvPr id="1" name=""/>
+        <p:cNvGrpSpPr/>
+        <p:nvPr/>
+      </p:nvGrpSpPr>
+      <p:grpSpPr>
+        <a:xfrm>
+          <a:off x="0" y="0"/>
+          <a:ext cx="0" cy="0"/>
+          <a:chOff x="0" y="0"/>
+          <a:chExt cx="0" cy="0"/>
+        </a:xfrm>
+      </p:grpSpPr>
+      <p:sp>
+        <p:nvSpPr>
+          <p:cNvPr id="2" name="Title 1">
+            <a:extLst>
+              <a:ext uri="{FF2B5EF4-FFF2-40B4-BE49-F238E27FC236}">
+                <a16:creationId xmlns:a16="http://schemas.microsoft.com/office/drawing/2014/main" id="{8F3E3A31-C929-9471-D0A0-9A621F73217F}"/>
+              </a:ext>
+            </a:extLst>
+          </p:cNvPr>
+          <p:cNvSpPr>
+            <a:spLocks noGrp="1"/>
+          </p:cNvSpPr>
+          <p:nvPr>
+            <p:ph type="title"/>
+          </p:nvPr>
+        </p:nvSpPr>
+        <p:spPr/>
+        <p:txBody>
+          <a:bodyPr/>
+          <a:lstStyle/>
+          <a:p>
+            <a:r>
+              <a:rPr lang="en-US" dirty="0"/>
+              <a:t>The big picture</a:t>
+            </a:r>
+          </a:p>
+        </p:txBody>
+      </p:sp>
+      <p:sp>
+        <p:nvSpPr>
+          <p:cNvPr id="3" name="Content Placeholder 2">
+            <a:extLst>
+              <a:ext uri="{FF2B5EF4-FFF2-40B4-BE49-F238E27FC236}">
+                <a16:creationId xmlns:a16="http://schemas.microsoft.com/office/drawing/2014/main" id="{7D12C2C0-0B0C-E4E0-E5C9-6ED6B940A91D}"/>
+              </a:ext>
+            </a:extLst>
+          </p:cNvPr>
+          <p:cNvSpPr>
+            <a:spLocks noGrp="1"/>
+          </p:cNvSpPr>
+          <p:nvPr>
+            <p:ph idx="1"/>
+          </p:nvPr>
+        </p:nvSpPr>
+        <p:spPr>
+          <a:xfrm>
+            <a:off x="838200" y="1825624"/>
+            <a:ext cx="3672840" cy="4667239"/>
+          </a:xfrm>
+        </p:spPr>
+        <p:txBody>
+          <a:bodyPr>
+            <a:normAutofit lnSpcReduction="10000"/>
+          </a:bodyPr>
+          <a:lstStyle/>
+          <a:p>
+            <a:r>
+              <a:rPr lang="en-US" dirty="0"/>
+              <a:t>We track treated and control units over time, and see their outcomes before and after they are treated.</a:t>
+            </a:r>
+          </a:p>
+          <a:p>
+            <a:r>
+              <a:rPr lang="en-US" dirty="0"/>
+              <a:t>Before treatment, their outcomes have the </a:t>
+            </a:r>
+            <a:r>
+              <a:rPr lang="en-US" u="sng" dirty="0"/>
+              <a:t>exact same</a:t>
+            </a:r>
+            <a:r>
+              <a:rPr lang="en-US" dirty="0"/>
+              <a:t> trend.</a:t>
+            </a:r>
+          </a:p>
+          <a:p>
+            <a:r>
+              <a:rPr lang="en-US" dirty="0"/>
+              <a:t>We assume that the difference in trends after treatment is due to treatment.</a:t>
+            </a:r>
+          </a:p>
+        </p:txBody>
+      </p:sp>
+      <p:grpSp>
+        <p:nvGrpSpPr>
+          <p:cNvPr id="9" name="Group 8">
+            <a:extLst>
+              <a:ext uri="{FF2B5EF4-FFF2-40B4-BE49-F238E27FC236}">
+                <a16:creationId xmlns:a16="http://schemas.microsoft.com/office/drawing/2014/main" id="{4BA0EDC2-AD6C-AF3A-1602-704D4B103E9A}"/>
+              </a:ext>
+            </a:extLst>
+          </p:cNvPr>
+          <p:cNvGrpSpPr/>
+          <p:nvPr/>
+        </p:nvGrpSpPr>
+        <p:grpSpPr>
+          <a:xfrm>
+            <a:off x="4597180" y="1690688"/>
+            <a:ext cx="7508681" cy="3767455"/>
+            <a:chOff x="4597180" y="1690688"/>
+            <a:chExt cx="7508681" cy="3767455"/>
+          </a:xfrm>
+        </p:grpSpPr>
+        <p:cxnSp>
+          <p:nvCxnSpPr>
+            <p:cNvPr id="5" name="Straight Arrow Connector 4">
+              <a:extLst>
+                <a:ext uri="{FF2B5EF4-FFF2-40B4-BE49-F238E27FC236}">
+                  <a16:creationId xmlns:a16="http://schemas.microsoft.com/office/drawing/2014/main" id="{BE8E495F-8680-1ADC-CF34-E70F66290E18}"/>
+                </a:ext>
+              </a:extLst>
+            </p:cNvPr>
+            <p:cNvCxnSpPr/>
+            <p:nvPr/>
+          </p:nvCxnSpPr>
+          <p:spPr>
+            <a:xfrm flipV="1">
+              <a:off x="8847151" y="1690688"/>
+              <a:ext cx="0" cy="3767455"/>
+            </a:xfrm>
+            <a:prstGeom prst="straightConnector1">
+              <a:avLst/>
+            </a:prstGeom>
+            <a:ln w="38100">
+              <a:solidFill>
+                <a:schemeClr val="tx1"/>
+              </a:solidFill>
+              <a:tailEnd type="triangle"/>
+            </a:ln>
+          </p:spPr>
+          <p:style>
+            <a:lnRef idx="1">
+              <a:schemeClr val="accent1"/>
+            </a:lnRef>
+            <a:fillRef idx="0">
+              <a:schemeClr val="accent1"/>
+            </a:fillRef>
+            <a:effectRef idx="0">
+              <a:schemeClr val="accent1"/>
+            </a:effectRef>
+            <a:fontRef idx="minor">
+              <a:schemeClr val="tx1"/>
+            </a:fontRef>
+          </p:style>
+        </p:cxnSp>
+        <p:cxnSp>
+          <p:nvCxnSpPr>
+            <p:cNvPr id="6" name="Straight Arrow Connector 5">
+              <a:extLst>
+                <a:ext uri="{FF2B5EF4-FFF2-40B4-BE49-F238E27FC236}">
+                  <a16:creationId xmlns:a16="http://schemas.microsoft.com/office/drawing/2014/main" id="{75A93846-1185-281F-B86C-4C2C7793B136}"/>
+                </a:ext>
+              </a:extLst>
+            </p:cNvPr>
+            <p:cNvCxnSpPr>
+              <a:cxnSpLocks/>
+            </p:cNvCxnSpPr>
+            <p:nvPr/>
+          </p:nvCxnSpPr>
+          <p:spPr>
+            <a:xfrm flipH="1">
+              <a:off x="4597180" y="5024632"/>
+              <a:ext cx="7508681" cy="0"/>
+            </a:xfrm>
+            <a:prstGeom prst="straightConnector1">
+              <a:avLst/>
+            </a:prstGeom>
+            <a:ln w="38100">
+              <a:solidFill>
+                <a:schemeClr val="tx1"/>
+              </a:solidFill>
+              <a:headEnd type="triangle" w="med" len="med"/>
+              <a:tailEnd type="triangle" w="med" len="med"/>
+            </a:ln>
+          </p:spPr>
+          <p:style>
+            <a:lnRef idx="1">
+              <a:schemeClr val="accent1"/>
+            </a:lnRef>
+            <a:fillRef idx="0">
+              <a:schemeClr val="accent1"/>
+            </a:fillRef>
+            <a:effectRef idx="0">
+              <a:schemeClr val="accent1"/>
+            </a:effectRef>
+            <a:fontRef idx="minor">
+              <a:schemeClr val="tx1"/>
+            </a:fontRef>
+          </p:style>
+        </p:cxnSp>
+      </p:grpSp>
+      <mc:AlternateContent xmlns:mc="http://schemas.openxmlformats.org/markup-compatibility/2006" xmlns:a14="http://schemas.microsoft.com/office/drawing/2010/main">
+        <mc:Choice Requires="a14">
+          <p:sp>
+            <p:nvSpPr>
+              <p:cNvPr id="10" name="TextBox 9">
+                <a:extLst>
+                  <a:ext uri="{FF2B5EF4-FFF2-40B4-BE49-F238E27FC236}">
+                    <a16:creationId xmlns:a16="http://schemas.microsoft.com/office/drawing/2014/main" id="{8AF6BBD9-2648-997C-B880-C6596286D13D}"/>
+                  </a:ext>
+                </a:extLst>
+              </p:cNvPr>
+              <p:cNvSpPr txBox="1"/>
+              <p:nvPr/>
+            </p:nvSpPr>
+            <p:spPr>
+              <a:xfrm>
+                <a:off x="4661452" y="5347252"/>
+                <a:ext cx="2977610" cy="369332"/>
+              </a:xfrm>
+              <a:prstGeom prst="rect">
+                <a:avLst/>
+              </a:prstGeom>
+              <a:noFill/>
+            </p:spPr>
+            <p:txBody>
+              <a:bodyPr wrap="none" rtlCol="0">
+                <a:spAutoFit/>
+              </a:bodyPr>
+              <a:lstStyle/>
+              <a:p>
+                <a:r>
+                  <a:rPr lang="en-US" dirty="0"/>
+                  <a:t>Pre-Treatment Periods , </a:t>
+                </a:r>
+                <a14:m>
+                  <m:oMath xmlns:m="http://schemas.openxmlformats.org/officeDocument/2006/math">
+                    <m:r>
+                      <a:rPr lang="en-US" b="0" i="1" dirty="0" smtClean="0">
+                        <a:latin typeface="Cambria Math" panose="02040503050406030204" pitchFamily="18" charset="0"/>
+                      </a:rPr>
+                      <m:t>𝑡</m:t>
+                    </m:r>
+                    <m:r>
+                      <a:rPr lang="en-US" b="0" i="1" dirty="0" smtClean="0">
+                        <a:latin typeface="Cambria Math" panose="02040503050406030204" pitchFamily="18" charset="0"/>
+                      </a:rPr>
+                      <m:t>&lt;0</m:t>
+                    </m:r>
+                  </m:oMath>
+                </a14:m>
+                <a:endParaRPr lang="en-US" dirty="0"/>
+              </a:p>
+            </p:txBody>
+          </p:sp>
+        </mc:Choice>
+        <mc:Fallback xmlns="">
+          <p:sp>
+            <p:nvSpPr>
+              <p:cNvPr id="10" name="TextBox 9">
+                <a:extLst>
+                  <a:ext uri="{FF2B5EF4-FFF2-40B4-BE49-F238E27FC236}">
+                    <a16:creationId xmlns:a16="http://schemas.microsoft.com/office/drawing/2014/main" id="{8AF6BBD9-2648-997C-B880-C6596286D13D}"/>
+                  </a:ext>
+                </a:extLst>
+              </p:cNvPr>
+              <p:cNvSpPr txBox="1">
+                <a:spLocks noRot="1" noChangeAspect="1" noMove="1" noResize="1" noEditPoints="1" noAdjustHandles="1" noChangeArrowheads="1" noChangeShapeType="1" noTextEdit="1"/>
+              </p:cNvSpPr>
+              <p:nvPr/>
+            </p:nvSpPr>
+            <p:spPr>
+              <a:xfrm>
+                <a:off x="4661452" y="5347252"/>
+                <a:ext cx="2977610" cy="369332"/>
+              </a:xfrm>
+              <a:prstGeom prst="rect">
+                <a:avLst/>
+              </a:prstGeom>
+              <a:blipFill>
+                <a:blip r:embed="rId2"/>
+                <a:stretch>
+                  <a:fillRect l="-2128" t="-3226" b="-22581"/>
+                </a:stretch>
+              </a:blipFill>
+            </p:spPr>
+            <p:txBody>
+              <a:bodyPr/>
+              <a:lstStyle/>
+              <a:p>
+                <a:r>
+                  <a:rPr lang="en-US">
+                    <a:noFill/>
+                  </a:rPr>
+                  <a:t> </a:t>
+                </a:r>
+              </a:p>
+            </p:txBody>
+          </p:sp>
+        </mc:Fallback>
+      </mc:AlternateContent>
+      <mc:AlternateContent xmlns:mc="http://schemas.openxmlformats.org/markup-compatibility/2006" xmlns:a14="http://schemas.microsoft.com/office/drawing/2010/main">
+        <mc:Choice Requires="a14">
+          <p:sp>
+            <p:nvSpPr>
+              <p:cNvPr id="11" name="TextBox 10">
+                <a:extLst>
+                  <a:ext uri="{FF2B5EF4-FFF2-40B4-BE49-F238E27FC236}">
+                    <a16:creationId xmlns:a16="http://schemas.microsoft.com/office/drawing/2014/main" id="{35C54765-1528-3CF1-EE47-6C4589E7C979}"/>
+                  </a:ext>
+                </a:extLst>
+              </p:cNvPr>
+              <p:cNvSpPr txBox="1"/>
+              <p:nvPr/>
+            </p:nvSpPr>
+            <p:spPr>
+              <a:xfrm>
+                <a:off x="9077739" y="5347252"/>
+                <a:ext cx="3110595" cy="369332"/>
+              </a:xfrm>
+              <a:prstGeom prst="rect">
+                <a:avLst/>
+              </a:prstGeom>
+              <a:noFill/>
+            </p:spPr>
+            <p:txBody>
+              <a:bodyPr wrap="none" rtlCol="0">
+                <a:spAutoFit/>
+              </a:bodyPr>
+              <a:lstStyle/>
+              <a:p>
+                <a:r>
+                  <a:rPr lang="en-US" dirty="0"/>
+                  <a:t>Post-Treatment Periods , </a:t>
+                </a:r>
+                <a14:m>
+                  <m:oMath xmlns:m="http://schemas.openxmlformats.org/officeDocument/2006/math">
+                    <m:r>
+                      <a:rPr lang="en-US" b="0" i="1" dirty="0" smtClean="0">
+                        <a:latin typeface="Cambria Math" panose="02040503050406030204" pitchFamily="18" charset="0"/>
+                      </a:rPr>
+                      <m:t>𝑡</m:t>
+                    </m:r>
+                    <m:r>
+                      <a:rPr lang="en-US" b="0" i="1" dirty="0" smtClean="0">
+                        <a:latin typeface="Cambria Math" panose="02040503050406030204" pitchFamily="18" charset="0"/>
+                      </a:rPr>
+                      <m:t>≥0 </m:t>
+                    </m:r>
+                  </m:oMath>
+                </a14:m>
+                <a:endParaRPr lang="en-US" dirty="0"/>
+              </a:p>
+            </p:txBody>
+          </p:sp>
+        </mc:Choice>
+        <mc:Fallback xmlns="">
+          <p:sp>
+            <p:nvSpPr>
+              <p:cNvPr id="11" name="TextBox 10">
+                <a:extLst>
+                  <a:ext uri="{FF2B5EF4-FFF2-40B4-BE49-F238E27FC236}">
+                    <a16:creationId xmlns:a16="http://schemas.microsoft.com/office/drawing/2014/main" id="{35C54765-1528-3CF1-EE47-6C4589E7C979}"/>
+                  </a:ext>
+                </a:extLst>
+              </p:cNvPr>
+              <p:cNvSpPr txBox="1">
+                <a:spLocks noRot="1" noChangeAspect="1" noMove="1" noResize="1" noEditPoints="1" noAdjustHandles="1" noChangeArrowheads="1" noChangeShapeType="1" noTextEdit="1"/>
+              </p:cNvSpPr>
+              <p:nvPr/>
+            </p:nvSpPr>
+            <p:spPr>
+              <a:xfrm>
+                <a:off x="9077739" y="5347252"/>
+                <a:ext cx="3110595" cy="369332"/>
+              </a:xfrm>
+              <a:prstGeom prst="rect">
+                <a:avLst/>
+              </a:prstGeom>
+              <a:blipFill>
+                <a:blip r:embed="rId3"/>
+                <a:stretch>
+                  <a:fillRect l="-1626" t="-3226" b="-22581"/>
+                </a:stretch>
+              </a:blipFill>
+            </p:spPr>
+            <p:txBody>
+              <a:bodyPr/>
+              <a:lstStyle/>
+              <a:p>
+                <a:r>
+                  <a:rPr lang="en-US">
+                    <a:noFill/>
+                  </a:rPr>
+                  <a:t> </a:t>
+                </a:r>
+              </a:p>
+            </p:txBody>
+          </p:sp>
+        </mc:Fallback>
+      </mc:AlternateContent>
+      <mc:AlternateContent xmlns:mc="http://schemas.openxmlformats.org/markup-compatibility/2006" xmlns:a14="http://schemas.microsoft.com/office/drawing/2010/main">
+        <mc:Choice Requires="a14">
+          <p:sp>
+            <p:nvSpPr>
+              <p:cNvPr id="12" name="TextBox 11">
+                <a:extLst>
+                  <a:ext uri="{FF2B5EF4-FFF2-40B4-BE49-F238E27FC236}">
+                    <a16:creationId xmlns:a16="http://schemas.microsoft.com/office/drawing/2014/main" id="{33681B2F-705C-A98D-DA86-2D6744F55E28}"/>
+                  </a:ext>
+                </a:extLst>
+              </p:cNvPr>
+              <p:cNvSpPr txBox="1"/>
+              <p:nvPr/>
+            </p:nvSpPr>
+            <p:spPr>
+              <a:xfrm>
+                <a:off x="8151867" y="1288463"/>
+                <a:ext cx="1409617" cy="369332"/>
+              </a:xfrm>
+              <a:prstGeom prst="rect">
+                <a:avLst/>
+              </a:prstGeom>
+              <a:noFill/>
+            </p:spPr>
+            <p:txBody>
+              <a:bodyPr wrap="none" rtlCol="0">
+                <a:spAutoFit/>
+              </a:bodyPr>
+              <a:lstStyle/>
+              <a:p>
+                <a:r>
+                  <a:rPr lang="en-US" dirty="0"/>
+                  <a:t>Outcome, </a:t>
+                </a:r>
+                <a14:m>
+                  <m:oMath xmlns:m="http://schemas.openxmlformats.org/officeDocument/2006/math">
+                    <m:sSub>
+                      <m:sSubPr>
+                        <m:ctrlPr>
+                          <a:rPr lang="en-US" b="0" i="1" dirty="0" smtClean="0">
+                            <a:latin typeface="Cambria Math" panose="02040503050406030204" pitchFamily="18" charset="0"/>
+                          </a:rPr>
+                        </m:ctrlPr>
+                      </m:sSubPr>
+                      <m:e>
+                        <m:r>
+                          <a:rPr lang="en-US" b="0" i="1" dirty="0" smtClean="0">
+                            <a:latin typeface="Cambria Math" panose="02040503050406030204" pitchFamily="18" charset="0"/>
+                          </a:rPr>
+                          <m:t>𝑌</m:t>
+                        </m:r>
+                      </m:e>
+                      <m:sub>
+                        <m:r>
+                          <a:rPr lang="en-US" b="0" i="1" dirty="0" smtClean="0">
+                            <a:latin typeface="Cambria Math" panose="02040503050406030204" pitchFamily="18" charset="0"/>
+                          </a:rPr>
+                          <m:t>𝑖𝑡</m:t>
+                        </m:r>
+                      </m:sub>
+                    </m:sSub>
+                  </m:oMath>
+                </a14:m>
+                <a:endParaRPr lang="en-US" dirty="0"/>
+              </a:p>
+            </p:txBody>
+          </p:sp>
+        </mc:Choice>
+        <mc:Fallback xmlns="">
+          <p:sp>
+            <p:nvSpPr>
+              <p:cNvPr id="12" name="TextBox 11">
+                <a:extLst>
+                  <a:ext uri="{FF2B5EF4-FFF2-40B4-BE49-F238E27FC236}">
+                    <a16:creationId xmlns:a16="http://schemas.microsoft.com/office/drawing/2014/main" id="{33681B2F-705C-A98D-DA86-2D6744F55E28}"/>
+                  </a:ext>
+                </a:extLst>
+              </p:cNvPr>
+              <p:cNvSpPr txBox="1">
+                <a:spLocks noRot="1" noChangeAspect="1" noMove="1" noResize="1" noEditPoints="1" noAdjustHandles="1" noChangeArrowheads="1" noChangeShapeType="1" noTextEdit="1"/>
+              </p:cNvSpPr>
+              <p:nvPr/>
+            </p:nvSpPr>
+            <p:spPr>
+              <a:xfrm>
+                <a:off x="8151867" y="1288463"/>
+                <a:ext cx="1409617" cy="369332"/>
+              </a:xfrm>
+              <a:prstGeom prst="rect">
+                <a:avLst/>
+              </a:prstGeom>
+              <a:blipFill>
+                <a:blip r:embed="rId4"/>
+                <a:stretch>
+                  <a:fillRect l="-3571" t="-6667" b="-26667"/>
+                </a:stretch>
+              </a:blipFill>
+            </p:spPr>
+            <p:txBody>
+              <a:bodyPr/>
+              <a:lstStyle/>
+              <a:p>
+                <a:r>
+                  <a:rPr lang="en-US">
+                    <a:noFill/>
+                  </a:rPr>
+                  <a:t> </a:t>
+                </a:r>
+              </a:p>
+            </p:txBody>
+          </p:sp>
+        </mc:Fallback>
+      </mc:AlternateContent>
+      <p:grpSp>
+        <p:nvGrpSpPr>
+          <p:cNvPr id="30" name="Group 29">
+            <a:extLst>
+              <a:ext uri="{FF2B5EF4-FFF2-40B4-BE49-F238E27FC236}">
+                <a16:creationId xmlns:a16="http://schemas.microsoft.com/office/drawing/2014/main" id="{5653368C-4D7C-51C9-E2EF-6333B111947A}"/>
+              </a:ext>
+            </a:extLst>
+          </p:cNvPr>
+          <p:cNvGrpSpPr/>
+          <p:nvPr/>
+        </p:nvGrpSpPr>
+        <p:grpSpPr>
+          <a:xfrm>
+            <a:off x="4681330" y="2534478"/>
+            <a:ext cx="6211957" cy="1312253"/>
+            <a:chOff x="4681330" y="2534478"/>
+            <a:chExt cx="6211957" cy="1312253"/>
+          </a:xfrm>
+        </p:grpSpPr>
+        <p:grpSp>
+          <p:nvGrpSpPr>
+            <p:cNvPr id="27" name="Group 26">
+              <a:extLst>
+                <a:ext uri="{FF2B5EF4-FFF2-40B4-BE49-F238E27FC236}">
+                  <a16:creationId xmlns:a16="http://schemas.microsoft.com/office/drawing/2014/main" id="{77BCD3DF-E10C-2266-B43E-C594BAC92A12}"/>
+                </a:ext>
+              </a:extLst>
+            </p:cNvPr>
+            <p:cNvGrpSpPr/>
+            <p:nvPr/>
+          </p:nvGrpSpPr>
+          <p:grpSpPr>
+            <a:xfrm>
+              <a:off x="5188226" y="2534478"/>
+              <a:ext cx="5705061" cy="1039937"/>
+              <a:chOff x="5188226" y="2534478"/>
+              <a:chExt cx="5705061" cy="1039937"/>
+            </a:xfrm>
+          </p:grpSpPr>
+          <p:cxnSp>
+            <p:nvCxnSpPr>
+              <p:cNvPr id="24" name="Straight Connector 23">
+                <a:extLst>
+                  <a:ext uri="{FF2B5EF4-FFF2-40B4-BE49-F238E27FC236}">
+                    <a16:creationId xmlns:a16="http://schemas.microsoft.com/office/drawing/2014/main" id="{2655C7AD-AAC9-BC71-1672-80C52A66CDB4}"/>
+                  </a:ext>
+                </a:extLst>
+              </p:cNvPr>
+              <p:cNvCxnSpPr/>
+              <p:nvPr/>
+            </p:nvCxnSpPr>
+            <p:spPr>
+              <a:xfrm>
+                <a:off x="5188226" y="3574415"/>
+                <a:ext cx="3658925" cy="0"/>
+              </a:xfrm>
+              <a:prstGeom prst="line">
+                <a:avLst/>
+              </a:prstGeom>
+              <a:ln w="38100"/>
+            </p:spPr>
+            <p:style>
+              <a:lnRef idx="1">
+                <a:schemeClr val="accent1"/>
+              </a:lnRef>
+              <a:fillRef idx="0">
+                <a:schemeClr val="accent1"/>
+              </a:fillRef>
+              <a:effectRef idx="0">
+                <a:schemeClr val="accent1"/>
+              </a:effectRef>
+              <a:fontRef idx="minor">
+                <a:schemeClr val="tx1"/>
+              </a:fontRef>
+            </p:style>
+          </p:cxnSp>
+          <p:cxnSp>
+            <p:nvCxnSpPr>
+              <p:cNvPr id="25" name="Straight Connector 24">
+                <a:extLst>
+                  <a:ext uri="{FF2B5EF4-FFF2-40B4-BE49-F238E27FC236}">
+                    <a16:creationId xmlns:a16="http://schemas.microsoft.com/office/drawing/2014/main" id="{9DE45EE6-538E-6753-17D6-8D55413E465E}"/>
+                  </a:ext>
+                </a:extLst>
+              </p:cNvPr>
+              <p:cNvCxnSpPr>
+                <a:cxnSpLocks/>
+              </p:cNvCxnSpPr>
+              <p:nvPr/>
+            </p:nvCxnSpPr>
+            <p:spPr>
+              <a:xfrm flipV="1">
+                <a:off x="8856676" y="2534478"/>
+                <a:ext cx="2036611" cy="1039937"/>
+              </a:xfrm>
+              <a:prstGeom prst="line">
+                <a:avLst/>
+              </a:prstGeom>
+              <a:ln w="38100">
+                <a:headEnd type="none" w="med" len="med"/>
+                <a:tailEnd type="triangle" w="med" len="med"/>
+              </a:ln>
+            </p:spPr>
+            <p:style>
+              <a:lnRef idx="1">
+                <a:schemeClr val="accent1"/>
+              </a:lnRef>
+              <a:fillRef idx="0">
+                <a:schemeClr val="accent1"/>
+              </a:fillRef>
+              <a:effectRef idx="0">
+                <a:schemeClr val="accent1"/>
+              </a:effectRef>
+              <a:fontRef idx="minor">
+                <a:schemeClr val="tx1"/>
+              </a:fontRef>
+            </p:style>
+          </p:cxnSp>
+        </p:grpSp>
+        <mc:AlternateContent xmlns:mc="http://schemas.openxmlformats.org/markup-compatibility/2006" xmlns:a14="http://schemas.microsoft.com/office/drawing/2010/main">
+          <mc:Choice Requires="a14">
+            <p:sp>
+              <p:nvSpPr>
+                <p:cNvPr id="28" name="TextBox 27">
+                  <a:extLst>
+                    <a:ext uri="{FF2B5EF4-FFF2-40B4-BE49-F238E27FC236}">
+                      <a16:creationId xmlns:a16="http://schemas.microsoft.com/office/drawing/2014/main" id="{A2C92CAB-FA65-97BB-3F64-1FB0A539897E}"/>
+                    </a:ext>
+                  </a:extLst>
+                </p:cNvPr>
+                <p:cNvSpPr txBox="1"/>
+                <p:nvPr/>
+              </p:nvSpPr>
+              <p:spPr>
+                <a:xfrm>
+                  <a:off x="4681330" y="3200400"/>
+                  <a:ext cx="2144561" cy="646331"/>
+                </a:xfrm>
+                <a:prstGeom prst="rect">
+                  <a:avLst/>
+                </a:prstGeom>
+                <a:noFill/>
+              </p:spPr>
+              <p:txBody>
+                <a:bodyPr wrap="none" rtlCol="0">
+                  <a:spAutoFit/>
+                </a:bodyPr>
+                <a:lstStyle/>
+                <a:p>
+                  <a:r>
+                    <a:rPr lang="en-US" dirty="0"/>
+                    <a:t>Treated Unit, </a:t>
+                  </a:r>
+                  <a14:m>
+                    <m:oMath xmlns:m="http://schemas.openxmlformats.org/officeDocument/2006/math">
+                      <m:sSub>
+                        <m:sSubPr>
+                          <m:ctrlPr>
+                            <a:rPr lang="en-US" b="0" i="1" dirty="0" smtClean="0">
+                              <a:latin typeface="Cambria Math" panose="02040503050406030204" pitchFamily="18" charset="0"/>
+                            </a:rPr>
+                          </m:ctrlPr>
+                        </m:sSubPr>
+                        <m:e>
+                          <m:r>
+                            <m:rPr>
+                              <m:sty m:val="p"/>
+                            </m:rPr>
+                            <a:rPr lang="en-US" b="0" i="0" dirty="0" smtClean="0">
+                              <a:latin typeface="Cambria Math" panose="02040503050406030204" pitchFamily="18" charset="0"/>
+                            </a:rPr>
+                            <m:t>W</m:t>
+                          </m:r>
+                        </m:e>
+                        <m:sub>
+                          <m:r>
+                            <m:rPr>
+                              <m:sty m:val="p"/>
+                            </m:rPr>
+                            <a:rPr lang="en-US" b="0" i="0" dirty="0" smtClean="0">
+                              <a:latin typeface="Cambria Math" panose="02040503050406030204" pitchFamily="18" charset="0"/>
+                            </a:rPr>
+                            <m:t>i</m:t>
+                          </m:r>
+                        </m:sub>
+                      </m:sSub>
+                      <m:r>
+                        <a:rPr lang="en-US" b="0" i="1" dirty="0" smtClean="0">
+                          <a:latin typeface="Cambria Math" panose="02040503050406030204" pitchFamily="18" charset="0"/>
+                        </a:rPr>
+                        <m:t>=1</m:t>
+                      </m:r>
+                    </m:oMath>
+                  </a14:m>
+                  <a:endParaRPr lang="en-US" dirty="0"/>
+                </a:p>
+                <a:p>
+                  <a:r>
+                    <a:rPr lang="en-US" dirty="0"/>
+                    <a:t> </a:t>
+                  </a:r>
+                </a:p>
+              </p:txBody>
+            </p:sp>
+          </mc:Choice>
+          <mc:Fallback xmlns="">
+            <p:sp>
+              <p:nvSpPr>
+                <p:cNvPr id="28" name="TextBox 27">
+                  <a:extLst>
+                    <a:ext uri="{FF2B5EF4-FFF2-40B4-BE49-F238E27FC236}">
+                      <a16:creationId xmlns:a16="http://schemas.microsoft.com/office/drawing/2014/main" id="{A2C92CAB-FA65-97BB-3F64-1FB0A539897E}"/>
+                    </a:ext>
+                  </a:extLst>
+                </p:cNvPr>
+                <p:cNvSpPr txBox="1">
+                  <a:spLocks noRot="1" noChangeAspect="1" noMove="1" noResize="1" noEditPoints="1" noAdjustHandles="1" noChangeArrowheads="1" noChangeShapeType="1" noTextEdit="1"/>
+                </p:cNvSpPr>
+                <p:nvPr/>
+              </p:nvSpPr>
+              <p:spPr>
+                <a:xfrm>
+                  <a:off x="4681330" y="3200400"/>
+                  <a:ext cx="2144561" cy="646331"/>
+                </a:xfrm>
+                <a:prstGeom prst="rect">
+                  <a:avLst/>
+                </a:prstGeom>
+                <a:blipFill>
+                  <a:blip r:embed="rId5"/>
+                  <a:stretch>
+                    <a:fillRect l="-2353" t="-3922"/>
+                  </a:stretch>
+                </a:blipFill>
+              </p:spPr>
+              <p:txBody>
+                <a:bodyPr/>
+                <a:lstStyle/>
+                <a:p>
+                  <a:r>
+                    <a:rPr lang="en-US">
+                      <a:noFill/>
+                    </a:rPr>
+                    <a:t> </a:t>
+                  </a:r>
+                </a:p>
+              </p:txBody>
+            </p:sp>
+          </mc:Fallback>
+        </mc:AlternateContent>
+      </p:grpSp>
+      <p:grpSp>
+        <p:nvGrpSpPr>
+          <p:cNvPr id="31" name="Group 30">
+            <a:extLst>
+              <a:ext uri="{FF2B5EF4-FFF2-40B4-BE49-F238E27FC236}">
+                <a16:creationId xmlns:a16="http://schemas.microsoft.com/office/drawing/2014/main" id="{7CA571B0-E146-9618-CF3A-79A28C95FA81}"/>
+              </a:ext>
+            </a:extLst>
+          </p:cNvPr>
+          <p:cNvGrpSpPr/>
+          <p:nvPr/>
+        </p:nvGrpSpPr>
+        <p:grpSpPr>
+          <a:xfrm>
+            <a:off x="4690854" y="3637659"/>
+            <a:ext cx="6385008" cy="646331"/>
+            <a:chOff x="4690854" y="3571873"/>
+            <a:chExt cx="6385008" cy="646331"/>
+          </a:xfrm>
+        </p:grpSpPr>
+        <p:grpSp>
+          <p:nvGrpSpPr>
+            <p:cNvPr id="32" name="Group 31">
+              <a:extLst>
+                <a:ext uri="{FF2B5EF4-FFF2-40B4-BE49-F238E27FC236}">
+                  <a16:creationId xmlns:a16="http://schemas.microsoft.com/office/drawing/2014/main" id="{ED6683C6-023A-CAB8-0432-0B6B2A917D7A}"/>
+                </a:ext>
+              </a:extLst>
+            </p:cNvPr>
+            <p:cNvGrpSpPr/>
+            <p:nvPr/>
+          </p:nvGrpSpPr>
+          <p:grpSpPr>
+            <a:xfrm>
+              <a:off x="5188226" y="3574415"/>
+              <a:ext cx="5887636" cy="21874"/>
+              <a:chOff x="5188226" y="3574415"/>
+              <a:chExt cx="5887636" cy="21874"/>
+            </a:xfrm>
+          </p:grpSpPr>
+          <p:cxnSp>
+            <p:nvCxnSpPr>
+              <p:cNvPr id="34" name="Straight Connector 33">
+                <a:extLst>
+                  <a:ext uri="{FF2B5EF4-FFF2-40B4-BE49-F238E27FC236}">
+                    <a16:creationId xmlns:a16="http://schemas.microsoft.com/office/drawing/2014/main" id="{A19C91AD-6611-D351-B0D3-225BFDFB017F}"/>
+                  </a:ext>
+                </a:extLst>
+              </p:cNvPr>
+              <p:cNvCxnSpPr/>
+              <p:nvPr/>
+            </p:nvCxnSpPr>
+            <p:spPr>
+              <a:xfrm>
+                <a:off x="5188226" y="3574415"/>
+                <a:ext cx="3658925" cy="0"/>
+              </a:xfrm>
+              <a:prstGeom prst="line">
+                <a:avLst/>
+              </a:prstGeom>
+              <a:ln w="38100">
+                <a:solidFill>
+                  <a:srgbClr val="00B050"/>
+                </a:solidFill>
+                <a:prstDash val="dash"/>
+              </a:ln>
+            </p:spPr>
+            <p:style>
+              <a:lnRef idx="1">
+                <a:schemeClr val="accent1"/>
+              </a:lnRef>
+              <a:fillRef idx="0">
+                <a:schemeClr val="accent1"/>
+              </a:fillRef>
+              <a:effectRef idx="0">
+                <a:schemeClr val="accent1"/>
+              </a:effectRef>
+              <a:fontRef idx="minor">
+                <a:schemeClr val="tx1"/>
+              </a:fontRef>
+            </p:style>
+          </p:cxnSp>
+          <p:cxnSp>
+            <p:nvCxnSpPr>
+              <p:cNvPr id="35" name="Straight Connector 34">
+                <a:extLst>
+                  <a:ext uri="{FF2B5EF4-FFF2-40B4-BE49-F238E27FC236}">
+                    <a16:creationId xmlns:a16="http://schemas.microsoft.com/office/drawing/2014/main" id="{86C9D997-534B-AEF3-54FA-ECCDBB3D52B1}"/>
+                  </a:ext>
+                </a:extLst>
+              </p:cNvPr>
+              <p:cNvCxnSpPr>
+                <a:cxnSpLocks/>
+              </p:cNvCxnSpPr>
+              <p:nvPr/>
+            </p:nvCxnSpPr>
+            <p:spPr>
+              <a:xfrm>
+                <a:off x="8856676" y="3574415"/>
+                <a:ext cx="2219186" cy="21874"/>
+              </a:xfrm>
+              <a:prstGeom prst="line">
+                <a:avLst/>
+              </a:prstGeom>
+              <a:ln w="38100">
+                <a:solidFill>
+                  <a:srgbClr val="00B050"/>
+                </a:solidFill>
+                <a:prstDash val="dash"/>
+                <a:headEnd type="none" w="med" len="med"/>
+                <a:tailEnd type="triangle" w="med" len="med"/>
+              </a:ln>
+            </p:spPr>
+            <p:style>
+              <a:lnRef idx="1">
+                <a:schemeClr val="accent1"/>
+              </a:lnRef>
+              <a:fillRef idx="0">
+                <a:schemeClr val="accent1"/>
+              </a:fillRef>
+              <a:effectRef idx="0">
+                <a:schemeClr val="accent1"/>
+              </a:effectRef>
+              <a:fontRef idx="minor">
+                <a:schemeClr val="tx1"/>
+              </a:fontRef>
+            </p:style>
+          </p:cxnSp>
+        </p:grpSp>
+        <mc:AlternateContent xmlns:mc="http://schemas.openxmlformats.org/markup-compatibility/2006" xmlns:a14="http://schemas.microsoft.com/office/drawing/2010/main">
+          <mc:Choice Requires="a14">
+            <p:sp>
+              <p:nvSpPr>
+                <p:cNvPr id="33" name="TextBox 32">
+                  <a:extLst>
+                    <a:ext uri="{FF2B5EF4-FFF2-40B4-BE49-F238E27FC236}">
+                      <a16:creationId xmlns:a16="http://schemas.microsoft.com/office/drawing/2014/main" id="{BFF0A07E-6EA1-0602-C9C7-FD8B4489E6A9}"/>
+                    </a:ext>
+                  </a:extLst>
+                </p:cNvPr>
+                <p:cNvSpPr txBox="1"/>
+                <p:nvPr/>
+              </p:nvSpPr>
+              <p:spPr>
+                <a:xfrm>
+                  <a:off x="4690854" y="3571873"/>
+                  <a:ext cx="2638351" cy="646331"/>
+                </a:xfrm>
+                <a:prstGeom prst="rect">
+                  <a:avLst/>
+                </a:prstGeom>
+                <a:noFill/>
+              </p:spPr>
+              <p:txBody>
+                <a:bodyPr wrap="none" rtlCol="0">
+                  <a:spAutoFit/>
+                </a:bodyPr>
+                <a:lstStyle/>
+                <a:p>
+                  <a:r>
+                    <a:rPr lang="en-US" dirty="0"/>
+                    <a:t>Ideal Control Unit, </a:t>
+                  </a:r>
+                  <a14:m>
+                    <m:oMath xmlns:m="http://schemas.openxmlformats.org/officeDocument/2006/math">
+                      <m:sSub>
+                        <m:sSubPr>
+                          <m:ctrlPr>
+                            <a:rPr lang="en-US" b="0" i="1" dirty="0" smtClean="0">
+                              <a:latin typeface="Cambria Math" panose="02040503050406030204" pitchFamily="18" charset="0"/>
+                            </a:rPr>
+                          </m:ctrlPr>
+                        </m:sSubPr>
+                        <m:e>
+                          <m:r>
+                            <m:rPr>
+                              <m:sty m:val="p"/>
+                            </m:rPr>
+                            <a:rPr lang="en-US" b="0" i="0" dirty="0" smtClean="0">
+                              <a:latin typeface="Cambria Math" panose="02040503050406030204" pitchFamily="18" charset="0"/>
+                            </a:rPr>
+                            <m:t>W</m:t>
+                          </m:r>
+                        </m:e>
+                        <m:sub>
+                          <m:r>
+                            <m:rPr>
+                              <m:sty m:val="p"/>
+                            </m:rPr>
+                            <a:rPr lang="en-US" b="0" i="0" dirty="0" smtClean="0">
+                              <a:latin typeface="Cambria Math" panose="02040503050406030204" pitchFamily="18" charset="0"/>
+                            </a:rPr>
+                            <m:t>i</m:t>
+                          </m:r>
+                        </m:sub>
+                      </m:sSub>
+                      <m:r>
+                        <a:rPr lang="en-US" b="0" i="1" dirty="0" smtClean="0">
+                          <a:latin typeface="Cambria Math" panose="02040503050406030204" pitchFamily="18" charset="0"/>
+                        </a:rPr>
+                        <m:t>=0</m:t>
+                      </m:r>
+                    </m:oMath>
+                  </a14:m>
+                  <a:endParaRPr lang="en-US" dirty="0"/>
+                </a:p>
+                <a:p>
+                  <a:r>
+                    <a:rPr lang="en-US" dirty="0"/>
+                    <a:t> </a:t>
+                  </a:r>
+                </a:p>
+              </p:txBody>
+            </p:sp>
+          </mc:Choice>
+          <mc:Fallback xmlns="">
+            <p:sp>
+              <p:nvSpPr>
+                <p:cNvPr id="33" name="TextBox 32">
+                  <a:extLst>
+                    <a:ext uri="{FF2B5EF4-FFF2-40B4-BE49-F238E27FC236}">
+                      <a16:creationId xmlns:a16="http://schemas.microsoft.com/office/drawing/2014/main" id="{BFF0A07E-6EA1-0602-C9C7-FD8B4489E6A9}"/>
+                    </a:ext>
+                  </a:extLst>
+                </p:cNvPr>
+                <p:cNvSpPr txBox="1">
+                  <a:spLocks noRot="1" noChangeAspect="1" noMove="1" noResize="1" noEditPoints="1" noAdjustHandles="1" noChangeArrowheads="1" noChangeShapeType="1" noTextEdit="1"/>
+                </p:cNvSpPr>
+                <p:nvPr/>
+              </p:nvSpPr>
+              <p:spPr>
+                <a:xfrm>
+                  <a:off x="4690854" y="3571873"/>
+                  <a:ext cx="2638351" cy="646331"/>
+                </a:xfrm>
+                <a:prstGeom prst="rect">
+                  <a:avLst/>
+                </a:prstGeom>
+                <a:blipFill>
+                  <a:blip r:embed="rId6"/>
+                  <a:stretch>
+                    <a:fillRect l="-1923" t="-3846"/>
+                  </a:stretch>
+                </a:blipFill>
+              </p:spPr>
+              <p:txBody>
+                <a:bodyPr/>
+                <a:lstStyle/>
+                <a:p>
+                  <a:r>
+                    <a:rPr lang="en-US">
+                      <a:noFill/>
+                    </a:rPr>
+                    <a:t> </a:t>
+                  </a:r>
+                </a:p>
+              </p:txBody>
+            </p:sp>
+          </mc:Fallback>
+        </mc:AlternateContent>
+      </p:grpSp>
+    </p:spTree>
+    <p:extLst>
+      <p:ext uri="{BB962C8B-B14F-4D97-AF65-F5344CB8AC3E}">
+        <p14:creationId xmlns:p14="http://schemas.microsoft.com/office/powerpoint/2010/main" val="1825857170"/>
+      </p:ext>
+    </p:extLst>
+  </p:cSld>
+  <p:clrMapOvr>
+    <a:masterClrMapping/>
+  </p:clrMapOvr>
+</p:sld>
+</file>
+
+<file path=ppt/slides/slide50.xml><?xml version="1.0" encoding="utf-8"?>
 <p:sld xmlns:a="http://schemas.openxmlformats.org/drawingml/2006/main" xmlns:r="http://schemas.openxmlformats.org/officeDocument/2006/relationships" xmlns:p="http://schemas.openxmlformats.org/presentationml/2006/main">
   <p:cSld>
     <p:spTree>
@@ -31814,7 +33923,7 @@
 </p:sld>
 </file>
 
-<file path=ppt/slides/slide49.xml><?xml version="1.0" encoding="utf-8"?>
+<file path=ppt/slides/slide51.xml><?xml version="1.0" encoding="utf-8"?>
 <p:sld xmlns:a="http://schemas.openxmlformats.org/drawingml/2006/main" xmlns:r="http://schemas.openxmlformats.org/officeDocument/2006/relationships" xmlns:p="http://schemas.openxmlformats.org/presentationml/2006/main">
   <p:cSld>
     <p:spTree>
@@ -31894,1054 +34003,7 @@
 </p:sld>
 </file>
 
-<file path=ppt/slides/slide5.xml><?xml version="1.0" encoding="utf-8"?>
-<p:sld xmlns:a="http://schemas.openxmlformats.org/drawingml/2006/main" xmlns:r="http://schemas.openxmlformats.org/officeDocument/2006/relationships" xmlns:p="http://schemas.openxmlformats.org/presentationml/2006/main">
-  <p:cSld>
-    <p:spTree>
-      <p:nvGrpSpPr>
-        <p:cNvPr id="1" name=""/>
-        <p:cNvGrpSpPr/>
-        <p:nvPr/>
-      </p:nvGrpSpPr>
-      <p:grpSpPr>
-        <a:xfrm>
-          <a:off x="0" y="0"/>
-          <a:ext cx="0" cy="0"/>
-          <a:chOff x="0" y="0"/>
-          <a:chExt cx="0" cy="0"/>
-        </a:xfrm>
-      </p:grpSpPr>
-      <p:sp>
-        <p:nvSpPr>
-          <p:cNvPr id="2" name="Title 1">
-            <a:extLst>
-              <a:ext uri="{FF2B5EF4-FFF2-40B4-BE49-F238E27FC236}">
-                <a16:creationId xmlns:a16="http://schemas.microsoft.com/office/drawing/2014/main" id="{8F3E3A31-C929-9471-D0A0-9A621F73217F}"/>
-              </a:ext>
-            </a:extLst>
-          </p:cNvPr>
-          <p:cNvSpPr>
-            <a:spLocks noGrp="1"/>
-          </p:cNvSpPr>
-          <p:nvPr>
-            <p:ph type="title"/>
-          </p:nvPr>
-        </p:nvSpPr>
-        <p:spPr/>
-        <p:txBody>
-          <a:bodyPr/>
-          <a:lstStyle/>
-          <a:p>
-            <a:r>
-              <a:rPr lang="en-US" dirty="0"/>
-              <a:t>The big picture</a:t>
-            </a:r>
-          </a:p>
-        </p:txBody>
-      </p:sp>
-      <p:sp>
-        <p:nvSpPr>
-          <p:cNvPr id="3" name="Content Placeholder 2">
-            <a:extLst>
-              <a:ext uri="{FF2B5EF4-FFF2-40B4-BE49-F238E27FC236}">
-                <a16:creationId xmlns:a16="http://schemas.microsoft.com/office/drawing/2014/main" id="{7D12C2C0-0B0C-E4E0-E5C9-6ED6B940A91D}"/>
-              </a:ext>
-            </a:extLst>
-          </p:cNvPr>
-          <p:cNvSpPr>
-            <a:spLocks noGrp="1"/>
-          </p:cNvSpPr>
-          <p:nvPr>
-            <p:ph idx="1"/>
-          </p:nvPr>
-        </p:nvSpPr>
-        <p:spPr>
-          <a:xfrm>
-            <a:off x="838200" y="1825624"/>
-            <a:ext cx="3672840" cy="4667239"/>
-          </a:xfrm>
-        </p:spPr>
-        <p:txBody>
-          <a:bodyPr>
-            <a:normAutofit lnSpcReduction="10000"/>
-          </a:bodyPr>
-          <a:lstStyle/>
-          <a:p>
-            <a:r>
-              <a:rPr lang="en-US" dirty="0"/>
-              <a:t>We track treated and control units over time, and see their outcomes before and after they are treated.</a:t>
-            </a:r>
-          </a:p>
-          <a:p>
-            <a:r>
-              <a:rPr lang="en-US" dirty="0"/>
-              <a:t>Before treatment, their outcomes have the </a:t>
-            </a:r>
-            <a:r>
-              <a:rPr lang="en-US" u="sng" dirty="0"/>
-              <a:t>exact same</a:t>
-            </a:r>
-            <a:r>
-              <a:rPr lang="en-US" dirty="0"/>
-              <a:t> trend.</a:t>
-            </a:r>
-          </a:p>
-          <a:p>
-            <a:r>
-              <a:rPr lang="en-US" dirty="0"/>
-              <a:t>We assume that the difference in trends after treatment is due to treatment.</a:t>
-            </a:r>
-          </a:p>
-        </p:txBody>
-      </p:sp>
-      <p:grpSp>
-        <p:nvGrpSpPr>
-          <p:cNvPr id="9" name="Group 8">
-            <a:extLst>
-              <a:ext uri="{FF2B5EF4-FFF2-40B4-BE49-F238E27FC236}">
-                <a16:creationId xmlns:a16="http://schemas.microsoft.com/office/drawing/2014/main" id="{4BA0EDC2-AD6C-AF3A-1602-704D4B103E9A}"/>
-              </a:ext>
-            </a:extLst>
-          </p:cNvPr>
-          <p:cNvGrpSpPr/>
-          <p:nvPr/>
-        </p:nvGrpSpPr>
-        <p:grpSpPr>
-          <a:xfrm>
-            <a:off x="4597180" y="1690688"/>
-            <a:ext cx="7508681" cy="3767455"/>
-            <a:chOff x="4597180" y="1690688"/>
-            <a:chExt cx="7508681" cy="3767455"/>
-          </a:xfrm>
-        </p:grpSpPr>
-        <p:cxnSp>
-          <p:nvCxnSpPr>
-            <p:cNvPr id="5" name="Straight Arrow Connector 4">
-              <a:extLst>
-                <a:ext uri="{FF2B5EF4-FFF2-40B4-BE49-F238E27FC236}">
-                  <a16:creationId xmlns:a16="http://schemas.microsoft.com/office/drawing/2014/main" id="{BE8E495F-8680-1ADC-CF34-E70F66290E18}"/>
-                </a:ext>
-              </a:extLst>
-            </p:cNvPr>
-            <p:cNvCxnSpPr/>
-            <p:nvPr/>
-          </p:nvCxnSpPr>
-          <p:spPr>
-            <a:xfrm flipV="1">
-              <a:off x="8847151" y="1690688"/>
-              <a:ext cx="0" cy="3767455"/>
-            </a:xfrm>
-            <a:prstGeom prst="straightConnector1">
-              <a:avLst/>
-            </a:prstGeom>
-            <a:ln w="38100">
-              <a:solidFill>
-                <a:schemeClr val="tx1"/>
-              </a:solidFill>
-              <a:tailEnd type="triangle"/>
-            </a:ln>
-          </p:spPr>
-          <p:style>
-            <a:lnRef idx="1">
-              <a:schemeClr val="accent1"/>
-            </a:lnRef>
-            <a:fillRef idx="0">
-              <a:schemeClr val="accent1"/>
-            </a:fillRef>
-            <a:effectRef idx="0">
-              <a:schemeClr val="accent1"/>
-            </a:effectRef>
-            <a:fontRef idx="minor">
-              <a:schemeClr val="tx1"/>
-            </a:fontRef>
-          </p:style>
-        </p:cxnSp>
-        <p:cxnSp>
-          <p:nvCxnSpPr>
-            <p:cNvPr id="6" name="Straight Arrow Connector 5">
-              <a:extLst>
-                <a:ext uri="{FF2B5EF4-FFF2-40B4-BE49-F238E27FC236}">
-                  <a16:creationId xmlns:a16="http://schemas.microsoft.com/office/drawing/2014/main" id="{75A93846-1185-281F-B86C-4C2C7793B136}"/>
-                </a:ext>
-              </a:extLst>
-            </p:cNvPr>
-            <p:cNvCxnSpPr>
-              <a:cxnSpLocks/>
-            </p:cNvCxnSpPr>
-            <p:nvPr/>
-          </p:nvCxnSpPr>
-          <p:spPr>
-            <a:xfrm flipH="1">
-              <a:off x="4597180" y="5024632"/>
-              <a:ext cx="7508681" cy="0"/>
-            </a:xfrm>
-            <a:prstGeom prst="straightConnector1">
-              <a:avLst/>
-            </a:prstGeom>
-            <a:ln w="38100">
-              <a:solidFill>
-                <a:schemeClr val="tx1"/>
-              </a:solidFill>
-              <a:headEnd type="triangle" w="med" len="med"/>
-              <a:tailEnd type="triangle" w="med" len="med"/>
-            </a:ln>
-          </p:spPr>
-          <p:style>
-            <a:lnRef idx="1">
-              <a:schemeClr val="accent1"/>
-            </a:lnRef>
-            <a:fillRef idx="0">
-              <a:schemeClr val="accent1"/>
-            </a:fillRef>
-            <a:effectRef idx="0">
-              <a:schemeClr val="accent1"/>
-            </a:effectRef>
-            <a:fontRef idx="minor">
-              <a:schemeClr val="tx1"/>
-            </a:fontRef>
-          </p:style>
-        </p:cxnSp>
-      </p:grpSp>
-      <mc:AlternateContent xmlns:mc="http://schemas.openxmlformats.org/markup-compatibility/2006">
-        <mc:Choice xmlns:a14="http://schemas.microsoft.com/office/drawing/2010/main" Requires="a14">
-          <p:sp>
-            <p:nvSpPr>
-              <p:cNvPr id="10" name="TextBox 9">
-                <a:extLst>
-                  <a:ext uri="{FF2B5EF4-FFF2-40B4-BE49-F238E27FC236}">
-                    <a16:creationId xmlns:a16="http://schemas.microsoft.com/office/drawing/2014/main" id="{8AF6BBD9-2648-997C-B880-C6596286D13D}"/>
-                  </a:ext>
-                </a:extLst>
-              </p:cNvPr>
-              <p:cNvSpPr txBox="1"/>
-              <p:nvPr/>
-            </p:nvSpPr>
-            <p:spPr>
-              <a:xfrm>
-                <a:off x="4661452" y="5347252"/>
-                <a:ext cx="2977610" cy="369332"/>
-              </a:xfrm>
-              <a:prstGeom prst="rect">
-                <a:avLst/>
-              </a:prstGeom>
-              <a:noFill/>
-            </p:spPr>
-            <p:txBody>
-              <a:bodyPr wrap="none" rtlCol="0">
-                <a:spAutoFit/>
-              </a:bodyPr>
-              <a:lstStyle/>
-              <a:p>
-                <a:r>
-                  <a:rPr lang="en-US" dirty="0"/>
-                  <a:t>Pre-Treatment Periods , </a:t>
-                </a:r>
-                <a14:m>
-                  <m:oMath xmlns:m="http://schemas.openxmlformats.org/officeDocument/2006/math">
-                    <m:r>
-                      <a:rPr lang="en-US" b="0" i="1" dirty="0" smtClean="0">
-                        <a:latin typeface="Cambria Math" panose="02040503050406030204" pitchFamily="18" charset="0"/>
-                      </a:rPr>
-                      <m:t>𝑡</m:t>
-                    </m:r>
-                    <m:r>
-                      <a:rPr lang="en-US" b="0" i="1" dirty="0" smtClean="0">
-                        <a:latin typeface="Cambria Math" panose="02040503050406030204" pitchFamily="18" charset="0"/>
-                      </a:rPr>
-                      <m:t>&lt;0</m:t>
-                    </m:r>
-                  </m:oMath>
-                </a14:m>
-                <a:endParaRPr lang="en-US" dirty="0"/>
-              </a:p>
-            </p:txBody>
-          </p:sp>
-        </mc:Choice>
-        <mc:Fallback>
-          <p:sp>
-            <p:nvSpPr>
-              <p:cNvPr id="10" name="TextBox 9">
-                <a:extLst>
-                  <a:ext uri="{FF2B5EF4-FFF2-40B4-BE49-F238E27FC236}">
-                    <a16:creationId xmlns:a16="http://schemas.microsoft.com/office/drawing/2014/main" id="{8AF6BBD9-2648-997C-B880-C6596286D13D}"/>
-                  </a:ext>
-                </a:extLst>
-              </p:cNvPr>
-              <p:cNvSpPr txBox="1">
-                <a:spLocks noRot="1" noChangeAspect="1" noMove="1" noResize="1" noEditPoints="1" noAdjustHandles="1" noChangeArrowheads="1" noChangeShapeType="1" noTextEdit="1"/>
-              </p:cNvSpPr>
-              <p:nvPr/>
-            </p:nvSpPr>
-            <p:spPr>
-              <a:xfrm>
-                <a:off x="4661452" y="5347252"/>
-                <a:ext cx="2977610" cy="369332"/>
-              </a:xfrm>
-              <a:prstGeom prst="rect">
-                <a:avLst/>
-              </a:prstGeom>
-              <a:blipFill>
-                <a:blip r:embed="rId2"/>
-                <a:stretch>
-                  <a:fillRect l="-2128" t="-3226" b="-22581"/>
-                </a:stretch>
-              </a:blipFill>
-            </p:spPr>
-            <p:txBody>
-              <a:bodyPr/>
-              <a:lstStyle/>
-              <a:p>
-                <a:r>
-                  <a:rPr lang="en-US">
-                    <a:noFill/>
-                  </a:rPr>
-                  <a:t> </a:t>
-                </a:r>
-              </a:p>
-            </p:txBody>
-          </p:sp>
-        </mc:Fallback>
-      </mc:AlternateContent>
-      <mc:AlternateContent xmlns:mc="http://schemas.openxmlformats.org/markup-compatibility/2006">
-        <mc:Choice xmlns:a14="http://schemas.microsoft.com/office/drawing/2010/main" Requires="a14">
-          <p:sp>
-            <p:nvSpPr>
-              <p:cNvPr id="11" name="TextBox 10">
-                <a:extLst>
-                  <a:ext uri="{FF2B5EF4-FFF2-40B4-BE49-F238E27FC236}">
-                    <a16:creationId xmlns:a16="http://schemas.microsoft.com/office/drawing/2014/main" id="{35C54765-1528-3CF1-EE47-6C4589E7C979}"/>
-                  </a:ext>
-                </a:extLst>
-              </p:cNvPr>
-              <p:cNvSpPr txBox="1"/>
-              <p:nvPr/>
-            </p:nvSpPr>
-            <p:spPr>
-              <a:xfrm>
-                <a:off x="9077739" y="5347252"/>
-                <a:ext cx="3110595" cy="369332"/>
-              </a:xfrm>
-              <a:prstGeom prst="rect">
-                <a:avLst/>
-              </a:prstGeom>
-              <a:noFill/>
-            </p:spPr>
-            <p:txBody>
-              <a:bodyPr wrap="none" rtlCol="0">
-                <a:spAutoFit/>
-              </a:bodyPr>
-              <a:lstStyle/>
-              <a:p>
-                <a:r>
-                  <a:rPr lang="en-US" dirty="0"/>
-                  <a:t>Post-Treatment Periods , </a:t>
-                </a:r>
-                <a14:m>
-                  <m:oMath xmlns:m="http://schemas.openxmlformats.org/officeDocument/2006/math">
-                    <m:r>
-                      <a:rPr lang="en-US" b="0" i="1" dirty="0" smtClean="0">
-                        <a:latin typeface="Cambria Math" panose="02040503050406030204" pitchFamily="18" charset="0"/>
-                      </a:rPr>
-                      <m:t>𝑡</m:t>
-                    </m:r>
-                    <m:r>
-                      <a:rPr lang="en-US" b="0" i="1" dirty="0" smtClean="0">
-                        <a:latin typeface="Cambria Math" panose="02040503050406030204" pitchFamily="18" charset="0"/>
-                      </a:rPr>
-                      <m:t>≥0 </m:t>
-                    </m:r>
-                  </m:oMath>
-                </a14:m>
-                <a:endParaRPr lang="en-US" dirty="0"/>
-              </a:p>
-            </p:txBody>
-          </p:sp>
-        </mc:Choice>
-        <mc:Fallback>
-          <p:sp>
-            <p:nvSpPr>
-              <p:cNvPr id="11" name="TextBox 10">
-                <a:extLst>
-                  <a:ext uri="{FF2B5EF4-FFF2-40B4-BE49-F238E27FC236}">
-                    <a16:creationId xmlns:a16="http://schemas.microsoft.com/office/drawing/2014/main" id="{35C54765-1528-3CF1-EE47-6C4589E7C979}"/>
-                  </a:ext>
-                </a:extLst>
-              </p:cNvPr>
-              <p:cNvSpPr txBox="1">
-                <a:spLocks noRot="1" noChangeAspect="1" noMove="1" noResize="1" noEditPoints="1" noAdjustHandles="1" noChangeArrowheads="1" noChangeShapeType="1" noTextEdit="1"/>
-              </p:cNvSpPr>
-              <p:nvPr/>
-            </p:nvSpPr>
-            <p:spPr>
-              <a:xfrm>
-                <a:off x="9077739" y="5347252"/>
-                <a:ext cx="3110595" cy="369332"/>
-              </a:xfrm>
-              <a:prstGeom prst="rect">
-                <a:avLst/>
-              </a:prstGeom>
-              <a:blipFill>
-                <a:blip r:embed="rId3"/>
-                <a:stretch>
-                  <a:fillRect l="-1626" t="-3226" b="-22581"/>
-                </a:stretch>
-              </a:blipFill>
-            </p:spPr>
-            <p:txBody>
-              <a:bodyPr/>
-              <a:lstStyle/>
-              <a:p>
-                <a:r>
-                  <a:rPr lang="en-US">
-                    <a:noFill/>
-                  </a:rPr>
-                  <a:t> </a:t>
-                </a:r>
-              </a:p>
-            </p:txBody>
-          </p:sp>
-        </mc:Fallback>
-      </mc:AlternateContent>
-      <mc:AlternateContent xmlns:mc="http://schemas.openxmlformats.org/markup-compatibility/2006">
-        <mc:Choice xmlns:a14="http://schemas.microsoft.com/office/drawing/2010/main" Requires="a14">
-          <p:sp>
-            <p:nvSpPr>
-              <p:cNvPr id="12" name="TextBox 11">
-                <a:extLst>
-                  <a:ext uri="{FF2B5EF4-FFF2-40B4-BE49-F238E27FC236}">
-                    <a16:creationId xmlns:a16="http://schemas.microsoft.com/office/drawing/2014/main" id="{33681B2F-705C-A98D-DA86-2D6744F55E28}"/>
-                  </a:ext>
-                </a:extLst>
-              </p:cNvPr>
-              <p:cNvSpPr txBox="1"/>
-              <p:nvPr/>
-            </p:nvSpPr>
-            <p:spPr>
-              <a:xfrm>
-                <a:off x="8151867" y="1288463"/>
-                <a:ext cx="1409617" cy="369332"/>
-              </a:xfrm>
-              <a:prstGeom prst="rect">
-                <a:avLst/>
-              </a:prstGeom>
-              <a:noFill/>
-            </p:spPr>
-            <p:txBody>
-              <a:bodyPr wrap="none" rtlCol="0">
-                <a:spAutoFit/>
-              </a:bodyPr>
-              <a:lstStyle/>
-              <a:p>
-                <a:r>
-                  <a:rPr lang="en-US" dirty="0"/>
-                  <a:t>Outcome, </a:t>
-                </a:r>
-                <a14:m>
-                  <m:oMath xmlns:m="http://schemas.openxmlformats.org/officeDocument/2006/math">
-                    <m:sSub>
-                      <m:sSubPr>
-                        <m:ctrlPr>
-                          <a:rPr lang="en-US" b="0" i="1" dirty="0" smtClean="0">
-                            <a:latin typeface="Cambria Math" panose="02040503050406030204" pitchFamily="18" charset="0"/>
-                          </a:rPr>
-                        </m:ctrlPr>
-                      </m:sSubPr>
-                      <m:e>
-                        <m:r>
-                          <a:rPr lang="en-US" b="0" i="1" dirty="0" smtClean="0">
-                            <a:latin typeface="Cambria Math" panose="02040503050406030204" pitchFamily="18" charset="0"/>
-                          </a:rPr>
-                          <m:t>𝑌</m:t>
-                        </m:r>
-                      </m:e>
-                      <m:sub>
-                        <m:r>
-                          <a:rPr lang="en-US" b="0" i="1" dirty="0" smtClean="0">
-                            <a:latin typeface="Cambria Math" panose="02040503050406030204" pitchFamily="18" charset="0"/>
-                          </a:rPr>
-                          <m:t>𝑖𝑡</m:t>
-                        </m:r>
-                      </m:sub>
-                    </m:sSub>
-                  </m:oMath>
-                </a14:m>
-                <a:endParaRPr lang="en-US" dirty="0"/>
-              </a:p>
-            </p:txBody>
-          </p:sp>
-        </mc:Choice>
-        <mc:Fallback>
-          <p:sp>
-            <p:nvSpPr>
-              <p:cNvPr id="12" name="TextBox 11">
-                <a:extLst>
-                  <a:ext uri="{FF2B5EF4-FFF2-40B4-BE49-F238E27FC236}">
-                    <a16:creationId xmlns:a16="http://schemas.microsoft.com/office/drawing/2014/main" id="{33681B2F-705C-A98D-DA86-2D6744F55E28}"/>
-                  </a:ext>
-                </a:extLst>
-              </p:cNvPr>
-              <p:cNvSpPr txBox="1">
-                <a:spLocks noRot="1" noChangeAspect="1" noMove="1" noResize="1" noEditPoints="1" noAdjustHandles="1" noChangeArrowheads="1" noChangeShapeType="1" noTextEdit="1"/>
-              </p:cNvSpPr>
-              <p:nvPr/>
-            </p:nvSpPr>
-            <p:spPr>
-              <a:xfrm>
-                <a:off x="8151867" y="1288463"/>
-                <a:ext cx="1409617" cy="369332"/>
-              </a:xfrm>
-              <a:prstGeom prst="rect">
-                <a:avLst/>
-              </a:prstGeom>
-              <a:blipFill>
-                <a:blip r:embed="rId4"/>
-                <a:stretch>
-                  <a:fillRect l="-3571" t="-6667" b="-26667"/>
-                </a:stretch>
-              </a:blipFill>
-            </p:spPr>
-            <p:txBody>
-              <a:bodyPr/>
-              <a:lstStyle/>
-              <a:p>
-                <a:r>
-                  <a:rPr lang="en-US">
-                    <a:noFill/>
-                  </a:rPr>
-                  <a:t> </a:t>
-                </a:r>
-              </a:p>
-            </p:txBody>
-          </p:sp>
-        </mc:Fallback>
-      </mc:AlternateContent>
-      <p:grpSp>
-        <p:nvGrpSpPr>
-          <p:cNvPr id="30" name="Group 29">
-            <a:extLst>
-              <a:ext uri="{FF2B5EF4-FFF2-40B4-BE49-F238E27FC236}">
-                <a16:creationId xmlns:a16="http://schemas.microsoft.com/office/drawing/2014/main" id="{5653368C-4D7C-51C9-E2EF-6333B111947A}"/>
-              </a:ext>
-            </a:extLst>
-          </p:cNvPr>
-          <p:cNvGrpSpPr/>
-          <p:nvPr/>
-        </p:nvGrpSpPr>
-        <p:grpSpPr>
-          <a:xfrm>
-            <a:off x="4681330" y="2534478"/>
-            <a:ext cx="6211957" cy="1312253"/>
-            <a:chOff x="4681330" y="2534478"/>
-            <a:chExt cx="6211957" cy="1312253"/>
-          </a:xfrm>
-        </p:grpSpPr>
-        <p:grpSp>
-          <p:nvGrpSpPr>
-            <p:cNvPr id="27" name="Group 26">
-              <a:extLst>
-                <a:ext uri="{FF2B5EF4-FFF2-40B4-BE49-F238E27FC236}">
-                  <a16:creationId xmlns:a16="http://schemas.microsoft.com/office/drawing/2014/main" id="{77BCD3DF-E10C-2266-B43E-C594BAC92A12}"/>
-                </a:ext>
-              </a:extLst>
-            </p:cNvPr>
-            <p:cNvGrpSpPr/>
-            <p:nvPr/>
-          </p:nvGrpSpPr>
-          <p:grpSpPr>
-            <a:xfrm>
-              <a:off x="5188226" y="2534478"/>
-              <a:ext cx="5705061" cy="1039937"/>
-              <a:chOff x="5188226" y="2534478"/>
-              <a:chExt cx="5705061" cy="1039937"/>
-            </a:xfrm>
-          </p:grpSpPr>
-          <p:cxnSp>
-            <p:nvCxnSpPr>
-              <p:cNvPr id="24" name="Straight Connector 23">
-                <a:extLst>
-                  <a:ext uri="{FF2B5EF4-FFF2-40B4-BE49-F238E27FC236}">
-                    <a16:creationId xmlns:a16="http://schemas.microsoft.com/office/drawing/2014/main" id="{2655C7AD-AAC9-BC71-1672-80C52A66CDB4}"/>
-                  </a:ext>
-                </a:extLst>
-              </p:cNvPr>
-              <p:cNvCxnSpPr/>
-              <p:nvPr/>
-            </p:nvCxnSpPr>
-            <p:spPr>
-              <a:xfrm>
-                <a:off x="5188226" y="3574415"/>
-                <a:ext cx="3658925" cy="0"/>
-              </a:xfrm>
-              <a:prstGeom prst="line">
-                <a:avLst/>
-              </a:prstGeom>
-              <a:ln w="38100"/>
-            </p:spPr>
-            <p:style>
-              <a:lnRef idx="1">
-                <a:schemeClr val="accent1"/>
-              </a:lnRef>
-              <a:fillRef idx="0">
-                <a:schemeClr val="accent1"/>
-              </a:fillRef>
-              <a:effectRef idx="0">
-                <a:schemeClr val="accent1"/>
-              </a:effectRef>
-              <a:fontRef idx="minor">
-                <a:schemeClr val="tx1"/>
-              </a:fontRef>
-            </p:style>
-          </p:cxnSp>
-          <p:cxnSp>
-            <p:nvCxnSpPr>
-              <p:cNvPr id="25" name="Straight Connector 24">
-                <a:extLst>
-                  <a:ext uri="{FF2B5EF4-FFF2-40B4-BE49-F238E27FC236}">
-                    <a16:creationId xmlns:a16="http://schemas.microsoft.com/office/drawing/2014/main" id="{9DE45EE6-538E-6753-17D6-8D55413E465E}"/>
-                  </a:ext>
-                </a:extLst>
-              </p:cNvPr>
-              <p:cNvCxnSpPr>
-                <a:cxnSpLocks/>
-              </p:cNvCxnSpPr>
-              <p:nvPr/>
-            </p:nvCxnSpPr>
-            <p:spPr>
-              <a:xfrm flipV="1">
-                <a:off x="8856676" y="2534478"/>
-                <a:ext cx="2036611" cy="1039937"/>
-              </a:xfrm>
-              <a:prstGeom prst="line">
-                <a:avLst/>
-              </a:prstGeom>
-              <a:ln w="38100">
-                <a:headEnd type="none" w="med" len="med"/>
-                <a:tailEnd type="triangle" w="med" len="med"/>
-              </a:ln>
-            </p:spPr>
-            <p:style>
-              <a:lnRef idx="1">
-                <a:schemeClr val="accent1"/>
-              </a:lnRef>
-              <a:fillRef idx="0">
-                <a:schemeClr val="accent1"/>
-              </a:fillRef>
-              <a:effectRef idx="0">
-                <a:schemeClr val="accent1"/>
-              </a:effectRef>
-              <a:fontRef idx="minor">
-                <a:schemeClr val="tx1"/>
-              </a:fontRef>
-            </p:style>
-          </p:cxnSp>
-        </p:grpSp>
-        <mc:AlternateContent xmlns:mc="http://schemas.openxmlformats.org/markup-compatibility/2006">
-          <mc:Choice xmlns:a14="http://schemas.microsoft.com/office/drawing/2010/main" Requires="a14">
-            <p:sp>
-              <p:nvSpPr>
-                <p:cNvPr id="28" name="TextBox 27">
-                  <a:extLst>
-                    <a:ext uri="{FF2B5EF4-FFF2-40B4-BE49-F238E27FC236}">
-                      <a16:creationId xmlns:a16="http://schemas.microsoft.com/office/drawing/2014/main" id="{A2C92CAB-FA65-97BB-3F64-1FB0A539897E}"/>
-                    </a:ext>
-                  </a:extLst>
-                </p:cNvPr>
-                <p:cNvSpPr txBox="1"/>
-                <p:nvPr/>
-              </p:nvSpPr>
-              <p:spPr>
-                <a:xfrm>
-                  <a:off x="4681330" y="3200400"/>
-                  <a:ext cx="2144561" cy="646331"/>
-                </a:xfrm>
-                <a:prstGeom prst="rect">
-                  <a:avLst/>
-                </a:prstGeom>
-                <a:noFill/>
-              </p:spPr>
-              <p:txBody>
-                <a:bodyPr wrap="none" rtlCol="0">
-                  <a:spAutoFit/>
-                </a:bodyPr>
-                <a:lstStyle/>
-                <a:p>
-                  <a:r>
-                    <a:rPr lang="en-US" dirty="0"/>
-                    <a:t>Treated Unit, </a:t>
-                  </a:r>
-                  <a14:m>
-                    <m:oMath xmlns:m="http://schemas.openxmlformats.org/officeDocument/2006/math">
-                      <m:sSub>
-                        <m:sSubPr>
-                          <m:ctrlPr>
-                            <a:rPr lang="en-US" b="0" i="0" dirty="0" smtClean="0">
-                              <a:latin typeface="Cambria Math" panose="02040503050406030204" pitchFamily="18" charset="0"/>
-                            </a:rPr>
-                          </m:ctrlPr>
-                        </m:sSubPr>
-                        <m:e>
-                          <m:r>
-                            <m:rPr>
-                              <m:sty m:val="p"/>
-                            </m:rPr>
-                            <a:rPr lang="en-US" b="0" i="0" dirty="0" smtClean="0">
-                              <a:latin typeface="Cambria Math" panose="02040503050406030204" pitchFamily="18" charset="0"/>
-                            </a:rPr>
-                            <m:t>W</m:t>
-                          </m:r>
-                        </m:e>
-                        <m:sub>
-                          <m:r>
-                            <m:rPr>
-                              <m:sty m:val="p"/>
-                            </m:rPr>
-                            <a:rPr lang="en-US" b="0" i="0" dirty="0" smtClean="0">
-                              <a:latin typeface="Cambria Math" panose="02040503050406030204" pitchFamily="18" charset="0"/>
-                            </a:rPr>
-                            <m:t>i</m:t>
-                          </m:r>
-                        </m:sub>
-                      </m:sSub>
-                      <m:r>
-                        <a:rPr lang="en-US" b="0" i="1" dirty="0" smtClean="0">
-                          <a:latin typeface="Cambria Math" panose="02040503050406030204" pitchFamily="18" charset="0"/>
-                        </a:rPr>
-                        <m:t>=1</m:t>
-                      </m:r>
-                    </m:oMath>
-                  </a14:m>
-                  <a:endParaRPr lang="en-US" dirty="0"/>
-                </a:p>
-                <a:p>
-                  <a:r>
-                    <a:rPr lang="en-US" dirty="0"/>
-                    <a:t> </a:t>
-                  </a:r>
-                </a:p>
-              </p:txBody>
-            </p:sp>
-          </mc:Choice>
-          <mc:Fallback>
-            <p:sp>
-              <p:nvSpPr>
-                <p:cNvPr id="28" name="TextBox 27">
-                  <a:extLst>
-                    <a:ext uri="{FF2B5EF4-FFF2-40B4-BE49-F238E27FC236}">
-                      <a16:creationId xmlns:a16="http://schemas.microsoft.com/office/drawing/2014/main" id="{A2C92CAB-FA65-97BB-3F64-1FB0A539897E}"/>
-                    </a:ext>
-                  </a:extLst>
-                </p:cNvPr>
-                <p:cNvSpPr txBox="1">
-                  <a:spLocks noRot="1" noChangeAspect="1" noMove="1" noResize="1" noEditPoints="1" noAdjustHandles="1" noChangeArrowheads="1" noChangeShapeType="1" noTextEdit="1"/>
-                </p:cNvSpPr>
-                <p:nvPr/>
-              </p:nvSpPr>
-              <p:spPr>
-                <a:xfrm>
-                  <a:off x="4681330" y="3200400"/>
-                  <a:ext cx="2144561" cy="646331"/>
-                </a:xfrm>
-                <a:prstGeom prst="rect">
-                  <a:avLst/>
-                </a:prstGeom>
-                <a:blipFill>
-                  <a:blip r:embed="rId5"/>
-                  <a:stretch>
-                    <a:fillRect l="-2353" t="-3922"/>
-                  </a:stretch>
-                </a:blipFill>
-              </p:spPr>
-              <p:txBody>
-                <a:bodyPr/>
-                <a:lstStyle/>
-                <a:p>
-                  <a:r>
-                    <a:rPr lang="en-US">
-                      <a:noFill/>
-                    </a:rPr>
-                    <a:t> </a:t>
-                  </a:r>
-                </a:p>
-              </p:txBody>
-            </p:sp>
-          </mc:Fallback>
-        </mc:AlternateContent>
-      </p:grpSp>
-      <p:grpSp>
-        <p:nvGrpSpPr>
-          <p:cNvPr id="31" name="Group 30">
-            <a:extLst>
-              <a:ext uri="{FF2B5EF4-FFF2-40B4-BE49-F238E27FC236}">
-                <a16:creationId xmlns:a16="http://schemas.microsoft.com/office/drawing/2014/main" id="{7CA571B0-E146-9618-CF3A-79A28C95FA81}"/>
-              </a:ext>
-            </a:extLst>
-          </p:cNvPr>
-          <p:cNvGrpSpPr/>
-          <p:nvPr/>
-        </p:nvGrpSpPr>
-        <p:grpSpPr>
-          <a:xfrm>
-            <a:off x="4690854" y="3637659"/>
-            <a:ext cx="6385008" cy="646331"/>
-            <a:chOff x="4690854" y="3571873"/>
-            <a:chExt cx="6385008" cy="646331"/>
-          </a:xfrm>
-        </p:grpSpPr>
-        <p:grpSp>
-          <p:nvGrpSpPr>
-            <p:cNvPr id="32" name="Group 31">
-              <a:extLst>
-                <a:ext uri="{FF2B5EF4-FFF2-40B4-BE49-F238E27FC236}">
-                  <a16:creationId xmlns:a16="http://schemas.microsoft.com/office/drawing/2014/main" id="{ED6683C6-023A-CAB8-0432-0B6B2A917D7A}"/>
-                </a:ext>
-              </a:extLst>
-            </p:cNvPr>
-            <p:cNvGrpSpPr/>
-            <p:nvPr/>
-          </p:nvGrpSpPr>
-          <p:grpSpPr>
-            <a:xfrm>
-              <a:off x="5188226" y="3574415"/>
-              <a:ext cx="5887636" cy="21874"/>
-              <a:chOff x="5188226" y="3574415"/>
-              <a:chExt cx="5887636" cy="21874"/>
-            </a:xfrm>
-          </p:grpSpPr>
-          <p:cxnSp>
-            <p:nvCxnSpPr>
-              <p:cNvPr id="34" name="Straight Connector 33">
-                <a:extLst>
-                  <a:ext uri="{FF2B5EF4-FFF2-40B4-BE49-F238E27FC236}">
-                    <a16:creationId xmlns:a16="http://schemas.microsoft.com/office/drawing/2014/main" id="{A19C91AD-6611-D351-B0D3-225BFDFB017F}"/>
-                  </a:ext>
-                </a:extLst>
-              </p:cNvPr>
-              <p:cNvCxnSpPr/>
-              <p:nvPr/>
-            </p:nvCxnSpPr>
-            <p:spPr>
-              <a:xfrm>
-                <a:off x="5188226" y="3574415"/>
-                <a:ext cx="3658925" cy="0"/>
-              </a:xfrm>
-              <a:prstGeom prst="line">
-                <a:avLst/>
-              </a:prstGeom>
-              <a:ln w="38100">
-                <a:solidFill>
-                  <a:srgbClr val="00B050"/>
-                </a:solidFill>
-                <a:prstDash val="dash"/>
-              </a:ln>
-            </p:spPr>
-            <p:style>
-              <a:lnRef idx="1">
-                <a:schemeClr val="accent1"/>
-              </a:lnRef>
-              <a:fillRef idx="0">
-                <a:schemeClr val="accent1"/>
-              </a:fillRef>
-              <a:effectRef idx="0">
-                <a:schemeClr val="accent1"/>
-              </a:effectRef>
-              <a:fontRef idx="minor">
-                <a:schemeClr val="tx1"/>
-              </a:fontRef>
-            </p:style>
-          </p:cxnSp>
-          <p:cxnSp>
-            <p:nvCxnSpPr>
-              <p:cNvPr id="35" name="Straight Connector 34">
-                <a:extLst>
-                  <a:ext uri="{FF2B5EF4-FFF2-40B4-BE49-F238E27FC236}">
-                    <a16:creationId xmlns:a16="http://schemas.microsoft.com/office/drawing/2014/main" id="{86C9D997-534B-AEF3-54FA-ECCDBB3D52B1}"/>
-                  </a:ext>
-                </a:extLst>
-              </p:cNvPr>
-              <p:cNvCxnSpPr>
-                <a:cxnSpLocks/>
-              </p:cNvCxnSpPr>
-              <p:nvPr/>
-            </p:nvCxnSpPr>
-            <p:spPr>
-              <a:xfrm>
-                <a:off x="8856676" y="3574415"/>
-                <a:ext cx="2219186" cy="21874"/>
-              </a:xfrm>
-              <a:prstGeom prst="line">
-                <a:avLst/>
-              </a:prstGeom>
-              <a:ln w="38100">
-                <a:solidFill>
-                  <a:srgbClr val="00B050"/>
-                </a:solidFill>
-                <a:prstDash val="dash"/>
-                <a:headEnd type="none" w="med" len="med"/>
-                <a:tailEnd type="triangle" w="med" len="med"/>
-              </a:ln>
-            </p:spPr>
-            <p:style>
-              <a:lnRef idx="1">
-                <a:schemeClr val="accent1"/>
-              </a:lnRef>
-              <a:fillRef idx="0">
-                <a:schemeClr val="accent1"/>
-              </a:fillRef>
-              <a:effectRef idx="0">
-                <a:schemeClr val="accent1"/>
-              </a:effectRef>
-              <a:fontRef idx="minor">
-                <a:schemeClr val="tx1"/>
-              </a:fontRef>
-            </p:style>
-          </p:cxnSp>
-        </p:grpSp>
-        <mc:AlternateContent xmlns:mc="http://schemas.openxmlformats.org/markup-compatibility/2006">
-          <mc:Choice xmlns:a14="http://schemas.microsoft.com/office/drawing/2010/main" Requires="a14">
-            <p:sp>
-              <p:nvSpPr>
-                <p:cNvPr id="33" name="TextBox 32">
-                  <a:extLst>
-                    <a:ext uri="{FF2B5EF4-FFF2-40B4-BE49-F238E27FC236}">
-                      <a16:creationId xmlns:a16="http://schemas.microsoft.com/office/drawing/2014/main" id="{BFF0A07E-6EA1-0602-C9C7-FD8B4489E6A9}"/>
-                    </a:ext>
-                  </a:extLst>
-                </p:cNvPr>
-                <p:cNvSpPr txBox="1"/>
-                <p:nvPr/>
-              </p:nvSpPr>
-              <p:spPr>
-                <a:xfrm>
-                  <a:off x="4690854" y="3571873"/>
-                  <a:ext cx="2638351" cy="646331"/>
-                </a:xfrm>
-                <a:prstGeom prst="rect">
-                  <a:avLst/>
-                </a:prstGeom>
-                <a:noFill/>
-              </p:spPr>
-              <p:txBody>
-                <a:bodyPr wrap="none" rtlCol="0">
-                  <a:spAutoFit/>
-                </a:bodyPr>
-                <a:lstStyle/>
-                <a:p>
-                  <a:r>
-                    <a:rPr lang="en-US" dirty="0"/>
-                    <a:t>Ideal Control Unit, </a:t>
-                  </a:r>
-                  <a14:m>
-                    <m:oMath xmlns:m="http://schemas.openxmlformats.org/officeDocument/2006/math">
-                      <m:sSub>
-                        <m:sSubPr>
-                          <m:ctrlPr>
-                            <a:rPr lang="en-US" b="0" i="0" dirty="0" smtClean="0">
-                              <a:latin typeface="Cambria Math" panose="02040503050406030204" pitchFamily="18" charset="0"/>
-                            </a:rPr>
-                          </m:ctrlPr>
-                        </m:sSubPr>
-                        <m:e>
-                          <m:r>
-                            <m:rPr>
-                              <m:sty m:val="p"/>
-                            </m:rPr>
-                            <a:rPr lang="en-US" b="0" i="0" dirty="0" smtClean="0">
-                              <a:latin typeface="Cambria Math" panose="02040503050406030204" pitchFamily="18" charset="0"/>
-                            </a:rPr>
-                            <m:t>W</m:t>
-                          </m:r>
-                        </m:e>
-                        <m:sub>
-                          <m:r>
-                            <m:rPr>
-                              <m:sty m:val="p"/>
-                            </m:rPr>
-                            <a:rPr lang="en-US" b="0" i="0" dirty="0" smtClean="0">
-                              <a:latin typeface="Cambria Math" panose="02040503050406030204" pitchFamily="18" charset="0"/>
-                            </a:rPr>
-                            <m:t>i</m:t>
-                          </m:r>
-                        </m:sub>
-                      </m:sSub>
-                      <m:r>
-                        <a:rPr lang="en-US" b="0" i="1" dirty="0" smtClean="0">
-                          <a:latin typeface="Cambria Math" panose="02040503050406030204" pitchFamily="18" charset="0"/>
-                        </a:rPr>
-                        <m:t>=0</m:t>
-                      </m:r>
-                    </m:oMath>
-                  </a14:m>
-                  <a:endParaRPr lang="en-US" dirty="0"/>
-                </a:p>
-                <a:p>
-                  <a:r>
-                    <a:rPr lang="en-US" dirty="0"/>
-                    <a:t> </a:t>
-                  </a:r>
-                </a:p>
-              </p:txBody>
-            </p:sp>
-          </mc:Choice>
-          <mc:Fallback>
-            <p:sp>
-              <p:nvSpPr>
-                <p:cNvPr id="33" name="TextBox 32">
-                  <a:extLst>
-                    <a:ext uri="{FF2B5EF4-FFF2-40B4-BE49-F238E27FC236}">
-                      <a16:creationId xmlns:a16="http://schemas.microsoft.com/office/drawing/2014/main" id="{BFF0A07E-6EA1-0602-C9C7-FD8B4489E6A9}"/>
-                    </a:ext>
-                  </a:extLst>
-                </p:cNvPr>
-                <p:cNvSpPr txBox="1">
-                  <a:spLocks noRot="1" noChangeAspect="1" noMove="1" noResize="1" noEditPoints="1" noAdjustHandles="1" noChangeArrowheads="1" noChangeShapeType="1" noTextEdit="1"/>
-                </p:cNvSpPr>
-                <p:nvPr/>
-              </p:nvSpPr>
-              <p:spPr>
-                <a:xfrm>
-                  <a:off x="4690854" y="3571873"/>
-                  <a:ext cx="2638351" cy="646331"/>
-                </a:xfrm>
-                <a:prstGeom prst="rect">
-                  <a:avLst/>
-                </a:prstGeom>
-                <a:blipFill>
-                  <a:blip r:embed="rId6"/>
-                  <a:stretch>
-                    <a:fillRect l="-1923" t="-3846"/>
-                  </a:stretch>
-                </a:blipFill>
-              </p:spPr>
-              <p:txBody>
-                <a:bodyPr/>
-                <a:lstStyle/>
-                <a:p>
-                  <a:r>
-                    <a:rPr lang="en-US">
-                      <a:noFill/>
-                    </a:rPr>
-                    <a:t> </a:t>
-                  </a:r>
-                </a:p>
-              </p:txBody>
-            </p:sp>
-          </mc:Fallback>
-        </mc:AlternateContent>
-      </p:grpSp>
-    </p:spTree>
-    <p:extLst>
-      <p:ext uri="{BB962C8B-B14F-4D97-AF65-F5344CB8AC3E}">
-        <p14:creationId xmlns:p14="http://schemas.microsoft.com/office/powerpoint/2010/main" val="1825857170"/>
-      </p:ext>
-    </p:extLst>
-  </p:cSld>
-  <p:clrMapOvr>
-    <a:masterClrMapping/>
-  </p:clrMapOvr>
-</p:sld>
-</file>
-
-<file path=ppt/slides/slide50.xml><?xml version="1.0" encoding="utf-8"?>
+<file path=ppt/slides/slide52.xml><?xml version="1.0" encoding="utf-8"?>
 <p:sld xmlns:a="http://schemas.openxmlformats.org/drawingml/2006/main" xmlns:r="http://schemas.openxmlformats.org/officeDocument/2006/relationships" xmlns:p="http://schemas.openxmlformats.org/presentationml/2006/main">
   <p:cSld>
     <p:spTree>
@@ -33024,7 +34086,7 @@
 </p:sld>
 </file>
 
-<file path=ppt/slides/slide51.xml><?xml version="1.0" encoding="utf-8"?>
+<file path=ppt/slides/slide53.xml><?xml version="1.0" encoding="utf-8"?>
 <p:sld xmlns:a="http://schemas.openxmlformats.org/drawingml/2006/main" xmlns:r="http://schemas.openxmlformats.org/officeDocument/2006/relationships" xmlns:p="http://schemas.openxmlformats.org/presentationml/2006/main">
   <p:cSld>
     <p:spTree>
@@ -33107,7 +34169,7 @@
 </p:sld>
 </file>
 
-<file path=ppt/slides/slide52.xml><?xml version="1.0" encoding="utf-8"?>
+<file path=ppt/slides/slide54.xml><?xml version="1.0" encoding="utf-8"?>
 <p:sld xmlns:a="http://schemas.openxmlformats.org/drawingml/2006/main" xmlns:r="http://schemas.openxmlformats.org/officeDocument/2006/relationships" xmlns:p="http://schemas.openxmlformats.org/presentationml/2006/main">
   <p:cSld>
     <p:spTree>
@@ -33199,7 +34261,7 @@
 </p:sld>
 </file>
 
-<file path=ppt/slides/slide53.xml><?xml version="1.0" encoding="utf-8"?>
+<file path=ppt/slides/slide55.xml><?xml version="1.0" encoding="utf-8"?>
 <p:sld xmlns:a="http://schemas.openxmlformats.org/drawingml/2006/main" xmlns:r="http://schemas.openxmlformats.org/officeDocument/2006/relationships" xmlns:p="http://schemas.openxmlformats.org/presentationml/2006/main">
   <p:cSld>
     <p:spTree>
@@ -33476,8 +34538,8 @@
           </p:style>
         </p:cxnSp>
       </p:grpSp>
-      <mc:AlternateContent xmlns:mc="http://schemas.openxmlformats.org/markup-compatibility/2006">
-        <mc:Choice xmlns:a14="http://schemas.microsoft.com/office/drawing/2010/main" Requires="a14">
+      <mc:AlternateContent xmlns:mc="http://schemas.openxmlformats.org/markup-compatibility/2006" xmlns:a14="http://schemas.microsoft.com/office/drawing/2010/main">
+        <mc:Choice Requires="a14">
           <p:sp>
             <p:nvSpPr>
               <p:cNvPr id="10" name="TextBox 9">
@@ -33531,7 +34593,7 @@
             </p:txBody>
           </p:sp>
         </mc:Choice>
-        <mc:Fallback>
+        <mc:Fallback xmlns="">
           <p:sp>
             <p:nvSpPr>
               <p:cNvPr id="10" name="TextBox 9">
@@ -33576,8 +34638,8 @@
           </p:sp>
         </mc:Fallback>
       </mc:AlternateContent>
-      <mc:AlternateContent xmlns:mc="http://schemas.openxmlformats.org/markup-compatibility/2006">
-        <mc:Choice xmlns:a14="http://schemas.microsoft.com/office/drawing/2010/main" Requires="a14">
+      <mc:AlternateContent xmlns:mc="http://schemas.openxmlformats.org/markup-compatibility/2006" xmlns:a14="http://schemas.microsoft.com/office/drawing/2010/main">
+        <mc:Choice Requires="a14">
           <p:sp>
             <p:nvSpPr>
               <p:cNvPr id="11" name="TextBox 10">
@@ -33631,7 +34693,7 @@
             </p:txBody>
           </p:sp>
         </mc:Choice>
-        <mc:Fallback>
+        <mc:Fallback xmlns="">
           <p:sp>
             <p:nvSpPr>
               <p:cNvPr id="11" name="TextBox 10">
@@ -33676,8 +34738,8 @@
           </p:sp>
         </mc:Fallback>
       </mc:AlternateContent>
-      <mc:AlternateContent xmlns:mc="http://schemas.openxmlformats.org/markup-compatibility/2006">
-        <mc:Choice xmlns:a14="http://schemas.microsoft.com/office/drawing/2010/main" Requires="a14">
+      <mc:AlternateContent xmlns:mc="http://schemas.openxmlformats.org/markup-compatibility/2006" xmlns:a14="http://schemas.microsoft.com/office/drawing/2010/main">
+        <mc:Choice Requires="a14">
           <p:sp>
             <p:nvSpPr>
               <p:cNvPr id="12" name="TextBox 11">
@@ -33744,7 +34806,7 @@
             </p:txBody>
           </p:sp>
         </mc:Choice>
-        <mc:Fallback>
+        <mc:Fallback xmlns="">
           <p:sp>
             <p:nvSpPr>
               <p:cNvPr id="12" name="TextBox 11">
@@ -33909,8 +34971,8 @@
             </p:style>
           </p:cxnSp>
         </p:grpSp>
-        <mc:AlternateContent xmlns:mc="http://schemas.openxmlformats.org/markup-compatibility/2006">
-          <mc:Choice xmlns:a14="http://schemas.microsoft.com/office/drawing/2010/main" Requires="a14">
+        <mc:AlternateContent xmlns:mc="http://schemas.openxmlformats.org/markup-compatibility/2006" xmlns:a14="http://schemas.microsoft.com/office/drawing/2010/main">
+          <mc:Choice Requires="a14">
             <p:sp>
               <p:nvSpPr>
                 <p:cNvPr id="28" name="TextBox 27">
@@ -33948,7 +35010,7 @@
                       <m:sSub>
                         <m:sSubPr>
                           <m:ctrlPr>
-                            <a:rPr lang="en-US" b="0" i="0" dirty="0" smtClean="0">
+                            <a:rPr lang="en-US" b="0" i="1" dirty="0" smtClean="0">
                               <a:latin typeface="Cambria Math" panose="02040503050406030204" pitchFamily="18" charset="0"/>
                             </a:rPr>
                           </m:ctrlPr>
@@ -33995,7 +35057,7 @@
               </p:txBody>
             </p:sp>
           </mc:Choice>
-          <mc:Fallback>
+          <mc:Fallback xmlns="">
             <p:sp>
               <p:nvSpPr>
                 <p:cNvPr id="28" name="TextBox 27">
@@ -34170,8 +35232,8 @@
             </p:style>
           </p:cxnSp>
         </p:grpSp>
-        <mc:AlternateContent xmlns:mc="http://schemas.openxmlformats.org/markup-compatibility/2006">
-          <mc:Choice xmlns:a14="http://schemas.microsoft.com/office/drawing/2010/main" Requires="a14">
+        <mc:AlternateContent xmlns:mc="http://schemas.openxmlformats.org/markup-compatibility/2006" xmlns:a14="http://schemas.microsoft.com/office/drawing/2010/main">
+          <mc:Choice Requires="a14">
             <p:sp>
               <p:nvSpPr>
                 <p:cNvPr id="33" name="TextBox 32">
@@ -34209,7 +35271,7 @@
                       <m:sSub>
                         <m:sSubPr>
                           <m:ctrlPr>
-                            <a:rPr lang="en-US" b="0" i="0" dirty="0" smtClean="0">
+                            <a:rPr lang="en-US" b="0" i="1" dirty="0" smtClean="0">
                               <a:latin typeface="Cambria Math" panose="02040503050406030204" pitchFamily="18" charset="0"/>
                             </a:rPr>
                           </m:ctrlPr>
@@ -34256,7 +35318,7 @@
               </p:txBody>
             </p:sp>
           </mc:Choice>
-          <mc:Fallback>
+          <mc:Fallback xmlns="">
             <p:sp>
               <p:nvSpPr>
                 <p:cNvPr id="33" name="TextBox 32">
@@ -34525,8 +35587,8 @@
           </p:style>
         </p:cxnSp>
       </p:grpSp>
-      <mc:AlternateContent xmlns:mc="http://schemas.openxmlformats.org/markup-compatibility/2006">
-        <mc:Choice xmlns:a14="http://schemas.microsoft.com/office/drawing/2010/main" Requires="a14">
+      <mc:AlternateContent xmlns:mc="http://schemas.openxmlformats.org/markup-compatibility/2006" xmlns:a14="http://schemas.microsoft.com/office/drawing/2010/main">
+        <mc:Choice Requires="a14">
           <p:sp>
             <p:nvSpPr>
               <p:cNvPr id="10" name="TextBox 9">
@@ -34580,7 +35642,7 @@
             </p:txBody>
           </p:sp>
         </mc:Choice>
-        <mc:Fallback>
+        <mc:Fallback xmlns="">
           <p:sp>
             <p:nvSpPr>
               <p:cNvPr id="10" name="TextBox 9">
@@ -34625,8 +35687,8 @@
           </p:sp>
         </mc:Fallback>
       </mc:AlternateContent>
-      <mc:AlternateContent xmlns:mc="http://schemas.openxmlformats.org/markup-compatibility/2006">
-        <mc:Choice xmlns:a14="http://schemas.microsoft.com/office/drawing/2010/main" Requires="a14">
+      <mc:AlternateContent xmlns:mc="http://schemas.openxmlformats.org/markup-compatibility/2006" xmlns:a14="http://schemas.microsoft.com/office/drawing/2010/main">
+        <mc:Choice Requires="a14">
           <p:sp>
             <p:nvSpPr>
               <p:cNvPr id="11" name="TextBox 10">
@@ -34680,7 +35742,7 @@
             </p:txBody>
           </p:sp>
         </mc:Choice>
-        <mc:Fallback>
+        <mc:Fallback xmlns="">
           <p:sp>
             <p:nvSpPr>
               <p:cNvPr id="11" name="TextBox 10">
@@ -34725,8 +35787,8 @@
           </p:sp>
         </mc:Fallback>
       </mc:AlternateContent>
-      <mc:AlternateContent xmlns:mc="http://schemas.openxmlformats.org/markup-compatibility/2006">
-        <mc:Choice xmlns:a14="http://schemas.microsoft.com/office/drawing/2010/main" Requires="a14">
+      <mc:AlternateContent xmlns:mc="http://schemas.openxmlformats.org/markup-compatibility/2006" xmlns:a14="http://schemas.microsoft.com/office/drawing/2010/main">
+        <mc:Choice Requires="a14">
           <p:sp>
             <p:nvSpPr>
               <p:cNvPr id="12" name="TextBox 11">
@@ -34793,7 +35855,7 @@
             </p:txBody>
           </p:sp>
         </mc:Choice>
-        <mc:Fallback>
+        <mc:Fallback xmlns="">
           <p:sp>
             <p:nvSpPr>
               <p:cNvPr id="12" name="TextBox 11">
@@ -34958,8 +36020,8 @@
             </p:style>
           </p:cxnSp>
         </p:grpSp>
-        <mc:AlternateContent xmlns:mc="http://schemas.openxmlformats.org/markup-compatibility/2006">
-          <mc:Choice xmlns:a14="http://schemas.microsoft.com/office/drawing/2010/main" Requires="a14">
+        <mc:AlternateContent xmlns:mc="http://schemas.openxmlformats.org/markup-compatibility/2006" xmlns:a14="http://schemas.microsoft.com/office/drawing/2010/main">
+          <mc:Choice Requires="a14">
             <p:sp>
               <p:nvSpPr>
                 <p:cNvPr id="28" name="TextBox 27">
@@ -34997,7 +36059,7 @@
                       <m:sSub>
                         <m:sSubPr>
                           <m:ctrlPr>
-                            <a:rPr lang="en-US" b="0" i="0" dirty="0" smtClean="0">
+                            <a:rPr lang="en-US" b="0" i="1" dirty="0" smtClean="0">
                               <a:latin typeface="Cambria Math" panose="02040503050406030204" pitchFamily="18" charset="0"/>
                             </a:rPr>
                           </m:ctrlPr>
@@ -35044,7 +36106,7 @@
               </p:txBody>
             </p:sp>
           </mc:Choice>
-          <mc:Fallback>
+          <mc:Fallback xmlns="">
             <p:sp>
               <p:nvSpPr>
                 <p:cNvPr id="28" name="TextBox 27">
@@ -35567,8 +36629,8 @@
           </a:p>
         </p:txBody>
       </p:sp>
-      <mc:AlternateContent xmlns:mc="http://schemas.openxmlformats.org/markup-compatibility/2006">
-        <mc:Choice xmlns:a14="http://schemas.microsoft.com/office/drawing/2010/main" Requires="a14">
+      <mc:AlternateContent xmlns:mc="http://schemas.openxmlformats.org/markup-compatibility/2006" xmlns:a14="http://schemas.microsoft.com/office/drawing/2010/main">
+        <mc:Choice Requires="a14">
           <p:sp>
             <p:nvSpPr>
               <p:cNvPr id="3" name="Content Placeholder 2">
@@ -35658,7 +36720,7 @@
             </p:txBody>
           </p:sp>
         </mc:Choice>
-        <mc:Fallback>
+        <mc:Fallback xmlns="">
           <p:sp>
             <p:nvSpPr>
               <p:cNvPr id="3" name="Content Placeholder 2">
@@ -35810,8 +36872,8 @@
           </p:style>
         </p:cxnSp>
       </p:grpSp>
-      <mc:AlternateContent xmlns:mc="http://schemas.openxmlformats.org/markup-compatibility/2006">
-        <mc:Choice xmlns:a14="http://schemas.microsoft.com/office/drawing/2010/main" Requires="a14">
+      <mc:AlternateContent xmlns:mc="http://schemas.openxmlformats.org/markup-compatibility/2006" xmlns:a14="http://schemas.microsoft.com/office/drawing/2010/main">
+        <mc:Choice Requires="a14">
           <p:sp>
             <p:nvSpPr>
               <p:cNvPr id="10" name="TextBox 9">
@@ -35865,7 +36927,7 @@
             </p:txBody>
           </p:sp>
         </mc:Choice>
-        <mc:Fallback>
+        <mc:Fallback xmlns="">
           <p:sp>
             <p:nvSpPr>
               <p:cNvPr id="10" name="TextBox 9">
@@ -35910,8 +36972,8 @@
           </p:sp>
         </mc:Fallback>
       </mc:AlternateContent>
-      <mc:AlternateContent xmlns:mc="http://schemas.openxmlformats.org/markup-compatibility/2006">
-        <mc:Choice xmlns:a14="http://schemas.microsoft.com/office/drawing/2010/main" Requires="a14">
+      <mc:AlternateContent xmlns:mc="http://schemas.openxmlformats.org/markup-compatibility/2006" xmlns:a14="http://schemas.microsoft.com/office/drawing/2010/main">
+        <mc:Choice Requires="a14">
           <p:sp>
             <p:nvSpPr>
               <p:cNvPr id="11" name="TextBox 10">
@@ -35965,7 +37027,7 @@
             </p:txBody>
           </p:sp>
         </mc:Choice>
-        <mc:Fallback>
+        <mc:Fallback xmlns="">
           <p:sp>
             <p:nvSpPr>
               <p:cNvPr id="11" name="TextBox 10">
@@ -36010,8 +37072,8 @@
           </p:sp>
         </mc:Fallback>
       </mc:AlternateContent>
-      <mc:AlternateContent xmlns:mc="http://schemas.openxmlformats.org/markup-compatibility/2006">
-        <mc:Choice xmlns:a14="http://schemas.microsoft.com/office/drawing/2010/main" Requires="a14">
+      <mc:AlternateContent xmlns:mc="http://schemas.openxmlformats.org/markup-compatibility/2006" xmlns:a14="http://schemas.microsoft.com/office/drawing/2010/main">
+        <mc:Choice Requires="a14">
           <p:sp>
             <p:nvSpPr>
               <p:cNvPr id="12" name="TextBox 11">
@@ -36078,7 +37140,7 @@
             </p:txBody>
           </p:sp>
         </mc:Choice>
-        <mc:Fallback>
+        <mc:Fallback xmlns="">
           <p:sp>
             <p:nvSpPr>
               <p:cNvPr id="12" name="TextBox 11">
@@ -36265,8 +37327,8 @@
               </p:style>
             </p:cxnSp>
           </p:grpSp>
-          <mc:AlternateContent xmlns:mc="http://schemas.openxmlformats.org/markup-compatibility/2006">
-            <mc:Choice xmlns:a14="http://schemas.microsoft.com/office/drawing/2010/main" Requires="a14">
+          <mc:AlternateContent xmlns:mc="http://schemas.openxmlformats.org/markup-compatibility/2006" xmlns:a14="http://schemas.microsoft.com/office/drawing/2010/main">
+            <mc:Choice Requires="a14">
               <p:sp>
                 <p:nvSpPr>
                   <p:cNvPr id="28" name="TextBox 27">
@@ -36304,7 +37366,7 @@
                         <m:sSub>
                           <m:sSubPr>
                             <m:ctrlPr>
-                              <a:rPr lang="en-US" b="0" i="0" dirty="0" smtClean="0">
+                              <a:rPr lang="en-US" b="0" i="1" dirty="0" smtClean="0">
                                 <a:latin typeface="Cambria Math" panose="02040503050406030204" pitchFamily="18" charset="0"/>
                               </a:rPr>
                             </m:ctrlPr>
@@ -36351,7 +37413,7 @@
                 </p:txBody>
               </p:sp>
             </mc:Choice>
-            <mc:Fallback>
+            <mc:Fallback xmlns="">
               <p:sp>
                 <p:nvSpPr>
                   <p:cNvPr id="28" name="TextBox 27">
@@ -36457,8 +37519,8 @@
             <a:chExt cx="6211957" cy="1100490"/>
           </a:xfrm>
         </p:grpSpPr>
-        <mc:AlternateContent xmlns:mc="http://schemas.openxmlformats.org/markup-compatibility/2006">
-          <mc:Choice xmlns:a14="http://schemas.microsoft.com/office/drawing/2010/main" Requires="a14">
+        <mc:AlternateContent xmlns:mc="http://schemas.openxmlformats.org/markup-compatibility/2006" xmlns:a14="http://schemas.microsoft.com/office/drawing/2010/main">
+          <mc:Choice Requires="a14">
             <p:sp>
               <p:nvSpPr>
                 <p:cNvPr id="33" name="TextBox 32">
@@ -36496,7 +37558,7 @@
                       <m:sSub>
                         <m:sSubPr>
                           <m:ctrlPr>
-                            <a:rPr lang="en-US" b="0" i="0" dirty="0" smtClean="0">
+                            <a:rPr lang="en-US" b="0" i="1" dirty="0" smtClean="0">
                               <a:latin typeface="Cambria Math" panose="02040503050406030204" pitchFamily="18" charset="0"/>
                             </a:rPr>
                           </m:ctrlPr>
@@ -36543,7 +37605,7 @@
               </p:txBody>
             </p:sp>
           </mc:Choice>
-          <mc:Fallback>
+          <mc:Fallback xmlns="">
             <p:sp>
               <p:nvSpPr>
                 <p:cNvPr id="33" name="TextBox 32">

</xml_diff>

<commit_message>
SC DiD Panel Update
</commit_message>
<xml_diff>
--- a/Powerpoints/6 DiffnDiff (WIP).pptx
+++ b/Powerpoints/6 DiffnDiff (WIP).pptx
@@ -253,7 +253,7 @@
           <a:p>
             <a:fld id="{BC90CB22-C839-6149-99A7-A90D8892B5C9}" type="datetimeFigureOut">
               <a:rPr lang="en-US" smtClean="0"/>
-              <a:t>10/25/22</a:t>
+              <a:t>10/26/22</a:t>
             </a:fld>
             <a:endParaRPr lang="en-US"/>
           </a:p>
@@ -893,7 +893,7 @@
           <a:p>
             <a:fld id="{6A51730C-A43A-674C-AA66-C618CC514046}" type="datetimeFigureOut">
               <a:rPr lang="en-US" smtClean="0"/>
-              <a:t>10/25/22</a:t>
+              <a:t>10/26/22</a:t>
             </a:fld>
             <a:endParaRPr lang="en-US"/>
           </a:p>
@@ -1091,7 +1091,7 @@
           <a:p>
             <a:fld id="{6A51730C-A43A-674C-AA66-C618CC514046}" type="datetimeFigureOut">
               <a:rPr lang="en-US" smtClean="0"/>
-              <a:t>10/25/22</a:t>
+              <a:t>10/26/22</a:t>
             </a:fld>
             <a:endParaRPr lang="en-US"/>
           </a:p>
@@ -1299,7 +1299,7 @@
           <a:p>
             <a:fld id="{6A51730C-A43A-674C-AA66-C618CC514046}" type="datetimeFigureOut">
               <a:rPr lang="en-US" smtClean="0"/>
-              <a:t>10/25/22</a:t>
+              <a:t>10/26/22</a:t>
             </a:fld>
             <a:endParaRPr lang="en-US"/>
           </a:p>
@@ -1497,7 +1497,7 @@
           <a:p>
             <a:fld id="{6A51730C-A43A-674C-AA66-C618CC514046}" type="datetimeFigureOut">
               <a:rPr lang="en-US" smtClean="0"/>
-              <a:t>10/25/22</a:t>
+              <a:t>10/26/22</a:t>
             </a:fld>
             <a:endParaRPr lang="en-US"/>
           </a:p>
@@ -1772,7 +1772,7 @@
           <a:p>
             <a:fld id="{6A51730C-A43A-674C-AA66-C618CC514046}" type="datetimeFigureOut">
               <a:rPr lang="en-US" smtClean="0"/>
-              <a:t>10/25/22</a:t>
+              <a:t>10/26/22</a:t>
             </a:fld>
             <a:endParaRPr lang="en-US"/>
           </a:p>
@@ -2037,7 +2037,7 @@
           <a:p>
             <a:fld id="{6A51730C-A43A-674C-AA66-C618CC514046}" type="datetimeFigureOut">
               <a:rPr lang="en-US" smtClean="0"/>
-              <a:t>10/25/22</a:t>
+              <a:t>10/26/22</a:t>
             </a:fld>
             <a:endParaRPr lang="en-US"/>
           </a:p>
@@ -2449,7 +2449,7 @@
           <a:p>
             <a:fld id="{6A51730C-A43A-674C-AA66-C618CC514046}" type="datetimeFigureOut">
               <a:rPr lang="en-US" smtClean="0"/>
-              <a:t>10/25/22</a:t>
+              <a:t>10/26/22</a:t>
             </a:fld>
             <a:endParaRPr lang="en-US"/>
           </a:p>
@@ -2590,7 +2590,7 @@
           <a:p>
             <a:fld id="{6A51730C-A43A-674C-AA66-C618CC514046}" type="datetimeFigureOut">
               <a:rPr lang="en-US" smtClean="0"/>
-              <a:t>10/25/22</a:t>
+              <a:t>10/26/22</a:t>
             </a:fld>
             <a:endParaRPr lang="en-US"/>
           </a:p>
@@ -2703,7 +2703,7 @@
           <a:p>
             <a:fld id="{6A51730C-A43A-674C-AA66-C618CC514046}" type="datetimeFigureOut">
               <a:rPr lang="en-US" smtClean="0"/>
-              <a:t>10/25/22</a:t>
+              <a:t>10/26/22</a:t>
             </a:fld>
             <a:endParaRPr lang="en-US"/>
           </a:p>
@@ -3014,7 +3014,7 @@
           <a:p>
             <a:fld id="{6A51730C-A43A-674C-AA66-C618CC514046}" type="datetimeFigureOut">
               <a:rPr lang="en-US" smtClean="0"/>
-              <a:t>10/25/22</a:t>
+              <a:t>10/26/22</a:t>
             </a:fld>
             <a:endParaRPr lang="en-US"/>
           </a:p>
@@ -3302,7 +3302,7 @@
           <a:p>
             <a:fld id="{6A51730C-A43A-674C-AA66-C618CC514046}" type="datetimeFigureOut">
               <a:rPr lang="en-US" smtClean="0"/>
-              <a:t>10/25/22</a:t>
+              <a:t>10/26/22</a:t>
             </a:fld>
             <a:endParaRPr lang="en-US"/>
           </a:p>
@@ -3543,7 +3543,7 @@
           <a:p>
             <a:fld id="{6A51730C-A43A-674C-AA66-C618CC514046}" type="datetimeFigureOut">
               <a:rPr lang="en-US" smtClean="0"/>
-              <a:t>10/25/22</a:t>
+              <a:t>10/26/22</a:t>
             </a:fld>
             <a:endParaRPr lang="en-US"/>
           </a:p>
@@ -15034,8 +15034,8 @@
           </a:p>
         </p:txBody>
       </p:sp>
-      <mc:AlternateContent xmlns:mc="http://schemas.openxmlformats.org/markup-compatibility/2006">
-        <mc:Choice xmlns:a14="http://schemas.microsoft.com/office/drawing/2010/main" Requires="a14">
+      <mc:AlternateContent xmlns:mc="http://schemas.openxmlformats.org/markup-compatibility/2006" xmlns:a14="http://schemas.microsoft.com/office/drawing/2010/main">
+        <mc:Choice Requires="a14">
           <p:sp>
             <p:nvSpPr>
               <p:cNvPr id="3" name="Content Placeholder 2">
@@ -15215,7 +15215,7 @@
             </p:txBody>
           </p:sp>
         </mc:Choice>
-        <mc:Fallback>
+        <mc:Fallback xmlns="">
           <p:sp>
             <p:nvSpPr>
               <p:cNvPr id="3" name="Content Placeholder 2">
@@ -15358,10 +15358,9 @@
           <a:p>
             <a:pPr lvl="1"/>
             <a:r>
-              <a:rPr lang="en-US"/>
+              <a:rPr lang="en-US" dirty="0"/>
               <a:t>TBD</a:t>
             </a:r>
-            <a:endParaRPr lang="en-US" dirty="0"/>
           </a:p>
           <a:p>
             <a:r>
@@ -15480,14 +15479,14 @@
             <p:ph idx="1"/>
             <p:extLst>
               <p:ext uri="{D42A27DB-BD31-4B8C-83A1-F6EECF244321}">
-                <p14:modId xmlns:p14="http://schemas.microsoft.com/office/powerpoint/2010/main" val="1737288920"/>
+                <p14:modId xmlns:p14="http://schemas.microsoft.com/office/powerpoint/2010/main" val="3712397347"/>
               </p:ext>
             </p:extLst>
           </p:nvPr>
         </p:nvGraphicFramePr>
         <p:xfrm>
           <a:off x="838199" y="1825624"/>
-          <a:ext cx="10739513" cy="4197855"/>
+          <a:ext cx="10739513" cy="4263855"/>
         </p:xfrm>
         <a:graphic>
           <a:graphicData uri="http://schemas.openxmlformats.org/drawingml/2006/table">
@@ -15583,7 +15582,7 @@
                     <a:p>
                       <a:r>
                         <a:rPr lang="en-US" dirty="0"/>
-                        <a:t>Unweighted average of all potential controls</a:t>
+                        <a:t>Unweighted average of all potential controls, allowing for a time-invariant difference</a:t>
                       </a:r>
                     </a:p>
                   </a:txBody>
@@ -15596,8 +15595,13 @@
                     <a:p>
                       <a:r>
                         <a:rPr lang="en-US" dirty="0"/>
-                        <a:t>Weighted average for a subset of all potential controls</a:t>
+                        <a:t>Weighted average for a subset of all potential controls to exactly </a:t>
                       </a:r>
+                      <a:r>
+                        <a:rPr lang="en-US"/>
+                        <a:t>match treatment</a:t>
+                      </a:r>
+                      <a:endParaRPr lang="en-US" dirty="0"/>
                     </a:p>
                   </a:txBody>
                   <a:tcPr/>

</xml_diff>